<commit_message>
Minor tweaks. GUI improvements.
</commit_message>
<xml_diff>
--- a/media/workshop.pptx
+++ b/media/workshop.pptx
@@ -5,12 +5,13 @@
     <p:sldMasterId id="2147483648" r:id="rId1"/>
   </p:sldMasterIdLst>
   <p:notesMasterIdLst>
-    <p:notesMasterId r:id="rId5"/>
+    <p:notesMasterId r:id="rId6"/>
   </p:notesMasterIdLst>
   <p:sldIdLst>
     <p:sldId id="256" r:id="rId2"/>
     <p:sldId id="257" r:id="rId3"/>
     <p:sldId id="258" r:id="rId4"/>
+    <p:sldId id="259" r:id="rId5"/>
   </p:sldIdLst>
   <p:sldSz cx="12192000" cy="6858000"/>
   <p:notesSz cx="6858000" cy="9144000"/>
@@ -199,7 +200,7 @@
           <a:p>
             <a:fld id="{A48A8C48-B3E7-451F-AD3C-7C38A874ED0C}" type="datetimeFigureOut">
               <a:rPr lang="en-GB" smtClean="0"/>
-              <a:t>03/09/2024</a:t>
+              <a:t>06/09/2024</a:t>
             </a:fld>
             <a:endParaRPr lang="en-GB"/>
           </a:p>
@@ -700,7 +701,7 @@
           <a:p>
             <a:fld id="{31EAB4FA-2558-41C8-8840-1B5E58534D56}" type="datetimeFigureOut">
               <a:rPr lang="en-GB" smtClean="0"/>
-              <a:t>03/09/2024</a:t>
+              <a:t>06/09/2024</a:t>
             </a:fld>
             <a:endParaRPr lang="en-GB"/>
           </a:p>
@@ -900,7 +901,7 @@
           <a:p>
             <a:fld id="{31EAB4FA-2558-41C8-8840-1B5E58534D56}" type="datetimeFigureOut">
               <a:rPr lang="en-GB" smtClean="0"/>
-              <a:t>03/09/2024</a:t>
+              <a:t>06/09/2024</a:t>
             </a:fld>
             <a:endParaRPr lang="en-GB"/>
           </a:p>
@@ -1110,7 +1111,7 @@
           <a:p>
             <a:fld id="{31EAB4FA-2558-41C8-8840-1B5E58534D56}" type="datetimeFigureOut">
               <a:rPr lang="en-GB" smtClean="0"/>
-              <a:t>03/09/2024</a:t>
+              <a:t>06/09/2024</a:t>
             </a:fld>
             <a:endParaRPr lang="en-GB"/>
           </a:p>
@@ -1310,7 +1311,7 @@
           <a:p>
             <a:fld id="{31EAB4FA-2558-41C8-8840-1B5E58534D56}" type="datetimeFigureOut">
               <a:rPr lang="en-GB" smtClean="0"/>
-              <a:t>03/09/2024</a:t>
+              <a:t>06/09/2024</a:t>
             </a:fld>
             <a:endParaRPr lang="en-GB"/>
           </a:p>
@@ -1586,7 +1587,7 @@
           <a:p>
             <a:fld id="{31EAB4FA-2558-41C8-8840-1B5E58534D56}" type="datetimeFigureOut">
               <a:rPr lang="en-GB" smtClean="0"/>
-              <a:t>03/09/2024</a:t>
+              <a:t>06/09/2024</a:t>
             </a:fld>
             <a:endParaRPr lang="en-GB"/>
           </a:p>
@@ -1854,7 +1855,7 @@
           <a:p>
             <a:fld id="{31EAB4FA-2558-41C8-8840-1B5E58534D56}" type="datetimeFigureOut">
               <a:rPr lang="en-GB" smtClean="0"/>
-              <a:t>03/09/2024</a:t>
+              <a:t>06/09/2024</a:t>
             </a:fld>
             <a:endParaRPr lang="en-GB"/>
           </a:p>
@@ -2269,7 +2270,7 @@
           <a:p>
             <a:fld id="{31EAB4FA-2558-41C8-8840-1B5E58534D56}" type="datetimeFigureOut">
               <a:rPr lang="en-GB" smtClean="0"/>
-              <a:t>03/09/2024</a:t>
+              <a:t>06/09/2024</a:t>
             </a:fld>
             <a:endParaRPr lang="en-GB"/>
           </a:p>
@@ -2411,7 +2412,7 @@
           <a:p>
             <a:fld id="{31EAB4FA-2558-41C8-8840-1B5E58534D56}" type="datetimeFigureOut">
               <a:rPr lang="en-GB" smtClean="0"/>
-              <a:t>03/09/2024</a:t>
+              <a:t>06/09/2024</a:t>
             </a:fld>
             <a:endParaRPr lang="en-GB"/>
           </a:p>
@@ -2524,7 +2525,7 @@
           <a:p>
             <a:fld id="{31EAB4FA-2558-41C8-8840-1B5E58534D56}" type="datetimeFigureOut">
               <a:rPr lang="en-GB" smtClean="0"/>
-              <a:t>03/09/2024</a:t>
+              <a:t>06/09/2024</a:t>
             </a:fld>
             <a:endParaRPr lang="en-GB"/>
           </a:p>
@@ -2837,7 +2838,7 @@
           <a:p>
             <a:fld id="{31EAB4FA-2558-41C8-8840-1B5E58534D56}" type="datetimeFigureOut">
               <a:rPr lang="en-GB" smtClean="0"/>
-              <a:t>03/09/2024</a:t>
+              <a:t>06/09/2024</a:t>
             </a:fld>
             <a:endParaRPr lang="en-GB"/>
           </a:p>
@@ -3126,7 +3127,7 @@
           <a:p>
             <a:fld id="{31EAB4FA-2558-41C8-8840-1B5E58534D56}" type="datetimeFigureOut">
               <a:rPr lang="en-GB" smtClean="0"/>
-              <a:t>03/09/2024</a:t>
+              <a:t>06/09/2024</a:t>
             </a:fld>
             <a:endParaRPr lang="en-GB"/>
           </a:p>
@@ -3369,7 +3370,7 @@
           <a:p>
             <a:fld id="{31EAB4FA-2558-41C8-8840-1B5E58534D56}" type="datetimeFigureOut">
               <a:rPr lang="en-GB" smtClean="0"/>
-              <a:t>03/09/2024</a:t>
+              <a:t>06/09/2024</a:t>
             </a:fld>
             <a:endParaRPr lang="en-GB"/>
           </a:p>
@@ -5255,6 +5256,71 @@
     <p:extLst>
       <p:ext uri="{BB962C8B-B14F-4D97-AF65-F5344CB8AC3E}">
         <p14:creationId xmlns:p14="http://schemas.microsoft.com/office/powerpoint/2010/main" val="2294555966"/>
+      </p:ext>
+    </p:extLst>
+  </p:cSld>
+  <p:clrMapOvr>
+    <a:masterClrMapping/>
+  </p:clrMapOvr>
+</p:sld>
+</file>
+
+<file path=ppt/slides/slide4.xml><?xml version="1.0" encoding="utf-8"?>
+<p:sld xmlns:a="http://schemas.openxmlformats.org/drawingml/2006/main" xmlns:r="http://schemas.openxmlformats.org/officeDocument/2006/relationships" xmlns:p="http://schemas.openxmlformats.org/presentationml/2006/main">
+  <p:cSld>
+    <p:spTree>
+      <p:nvGrpSpPr>
+        <p:cNvPr id="1" name=""/>
+        <p:cNvGrpSpPr/>
+        <p:nvPr/>
+      </p:nvGrpSpPr>
+      <p:grpSpPr>
+        <a:xfrm>
+          <a:off x="0" y="0"/>
+          <a:ext cx="0" cy="0"/>
+          <a:chOff x="0" y="0"/>
+          <a:chExt cx="0" cy="0"/>
+        </a:xfrm>
+      </p:grpSpPr>
+      <p:pic>
+        <p:nvPicPr>
+          <p:cNvPr id="5" name="Picture 4" descr="A black background with a black square&#10;&#10;Description automatically generated with medium confidence">
+            <a:extLst>
+              <a:ext uri="{FF2B5EF4-FFF2-40B4-BE49-F238E27FC236}">
+                <a16:creationId xmlns:a16="http://schemas.microsoft.com/office/drawing/2014/main" id="{A13BD3B4-6C9C-69BF-4E20-3AC29EED28C2}"/>
+              </a:ext>
+            </a:extLst>
+          </p:cNvPr>
+          <p:cNvPicPr>
+            <a:picLocks/>
+          </p:cNvPicPr>
+          <p:nvPr/>
+        </p:nvPicPr>
+        <p:blipFill>
+          <a:blip r:embed="rId2">
+            <a:extLst>
+              <a:ext uri="{28A0092B-C50C-407E-A947-70E740481C1C}">
+                <a14:useLocalDpi xmlns:a14="http://schemas.microsoft.com/office/drawing/2010/main" val="0"/>
+              </a:ext>
+            </a:extLst>
+          </a:blip>
+          <a:srcRect t="4975"/>
+          <a:stretch/>
+        </p:blipFill>
+        <p:spPr>
+          <a:xfrm>
+            <a:off x="1765079" y="1881554"/>
+            <a:ext cx="1269841" cy="1270800"/>
+          </a:xfrm>
+          <a:prstGeom prst="rect">
+            <a:avLst/>
+          </a:prstGeom>
+        </p:spPr>
+      </p:pic>
+    </p:spTree>
+    <p:extLst>
+      <p:ext uri="{BB962C8B-B14F-4D97-AF65-F5344CB8AC3E}">
+        <p14:creationId xmlns:p14="http://schemas.microsoft.com/office/powerpoint/2010/main" val="233316268"/>
       </p:ext>
     </p:extLst>
   </p:cSld>

</xml_diff>

<commit_message>
Faster rendering and minor clock & file I/O tweaks.
</commit_message>
<xml_diff>
--- a/media/workshop.pptx
+++ b/media/workshop.pptx
@@ -5,7 +5,7 @@
     <p:sldMasterId id="2147483648" r:id="rId1"/>
   </p:sldMasterIdLst>
   <p:notesMasterIdLst>
-    <p:notesMasterId r:id="rId15"/>
+    <p:notesMasterId r:id="rId16"/>
   </p:notesMasterIdLst>
   <p:sldIdLst>
     <p:sldId id="256" r:id="rId2"/>
@@ -21,6 +21,7 @@
     <p:sldId id="266" r:id="rId12"/>
     <p:sldId id="267" r:id="rId13"/>
     <p:sldId id="268" r:id="rId14"/>
+    <p:sldId id="269" r:id="rId15"/>
   </p:sldIdLst>
   <p:sldSz cx="12192000" cy="6858000"/>
   <p:notesSz cx="6858000" cy="9144000"/>
@@ -209,7 +210,7 @@
           <a:p>
             <a:fld id="{A48A8C48-B3E7-451F-AD3C-7C38A874ED0C}" type="datetimeFigureOut">
               <a:rPr lang="en-GB" smtClean="0"/>
-              <a:t>04/10/2024</a:t>
+              <a:t>15/10/2024</a:t>
             </a:fld>
             <a:endParaRPr lang="en-GB"/>
           </a:p>
@@ -710,7 +711,7 @@
           <a:p>
             <a:fld id="{31EAB4FA-2558-41C8-8840-1B5E58534D56}" type="datetimeFigureOut">
               <a:rPr lang="en-GB" smtClean="0"/>
-              <a:t>04/10/2024</a:t>
+              <a:t>15/10/2024</a:t>
             </a:fld>
             <a:endParaRPr lang="en-GB"/>
           </a:p>
@@ -910,7 +911,7 @@
           <a:p>
             <a:fld id="{31EAB4FA-2558-41C8-8840-1B5E58534D56}" type="datetimeFigureOut">
               <a:rPr lang="en-GB" smtClean="0"/>
-              <a:t>04/10/2024</a:t>
+              <a:t>15/10/2024</a:t>
             </a:fld>
             <a:endParaRPr lang="en-GB"/>
           </a:p>
@@ -1120,7 +1121,7 @@
           <a:p>
             <a:fld id="{31EAB4FA-2558-41C8-8840-1B5E58534D56}" type="datetimeFigureOut">
               <a:rPr lang="en-GB" smtClean="0"/>
-              <a:t>04/10/2024</a:t>
+              <a:t>15/10/2024</a:t>
             </a:fld>
             <a:endParaRPr lang="en-GB"/>
           </a:p>
@@ -1320,7 +1321,7 @@
           <a:p>
             <a:fld id="{31EAB4FA-2558-41C8-8840-1B5E58534D56}" type="datetimeFigureOut">
               <a:rPr lang="en-GB" smtClean="0"/>
-              <a:t>04/10/2024</a:t>
+              <a:t>15/10/2024</a:t>
             </a:fld>
             <a:endParaRPr lang="en-GB"/>
           </a:p>
@@ -1596,7 +1597,7 @@
           <a:p>
             <a:fld id="{31EAB4FA-2558-41C8-8840-1B5E58534D56}" type="datetimeFigureOut">
               <a:rPr lang="en-GB" smtClean="0"/>
-              <a:t>04/10/2024</a:t>
+              <a:t>15/10/2024</a:t>
             </a:fld>
             <a:endParaRPr lang="en-GB"/>
           </a:p>
@@ -1864,7 +1865,7 @@
           <a:p>
             <a:fld id="{31EAB4FA-2558-41C8-8840-1B5E58534D56}" type="datetimeFigureOut">
               <a:rPr lang="en-GB" smtClean="0"/>
-              <a:t>04/10/2024</a:t>
+              <a:t>15/10/2024</a:t>
             </a:fld>
             <a:endParaRPr lang="en-GB"/>
           </a:p>
@@ -2279,7 +2280,7 @@
           <a:p>
             <a:fld id="{31EAB4FA-2558-41C8-8840-1B5E58534D56}" type="datetimeFigureOut">
               <a:rPr lang="en-GB" smtClean="0"/>
-              <a:t>04/10/2024</a:t>
+              <a:t>15/10/2024</a:t>
             </a:fld>
             <a:endParaRPr lang="en-GB"/>
           </a:p>
@@ -2421,7 +2422,7 @@
           <a:p>
             <a:fld id="{31EAB4FA-2558-41C8-8840-1B5E58534D56}" type="datetimeFigureOut">
               <a:rPr lang="en-GB" smtClean="0"/>
-              <a:t>04/10/2024</a:t>
+              <a:t>15/10/2024</a:t>
             </a:fld>
             <a:endParaRPr lang="en-GB"/>
           </a:p>
@@ -2534,7 +2535,7 @@
           <a:p>
             <a:fld id="{31EAB4FA-2558-41C8-8840-1B5E58534D56}" type="datetimeFigureOut">
               <a:rPr lang="en-GB" smtClean="0"/>
-              <a:t>04/10/2024</a:t>
+              <a:t>15/10/2024</a:t>
             </a:fld>
             <a:endParaRPr lang="en-GB"/>
           </a:p>
@@ -2847,7 +2848,7 @@
           <a:p>
             <a:fld id="{31EAB4FA-2558-41C8-8840-1B5E58534D56}" type="datetimeFigureOut">
               <a:rPr lang="en-GB" smtClean="0"/>
-              <a:t>04/10/2024</a:t>
+              <a:t>15/10/2024</a:t>
             </a:fld>
             <a:endParaRPr lang="en-GB"/>
           </a:p>
@@ -3136,7 +3137,7 @@
           <a:p>
             <a:fld id="{31EAB4FA-2558-41C8-8840-1B5E58534D56}" type="datetimeFigureOut">
               <a:rPr lang="en-GB" smtClean="0"/>
-              <a:t>04/10/2024</a:t>
+              <a:t>15/10/2024</a:t>
             </a:fld>
             <a:endParaRPr lang="en-GB"/>
           </a:p>
@@ -3382,7 +3383,7 @@
           <a:p>
             <a:fld id="{31EAB4FA-2558-41C8-8840-1B5E58534D56}" type="datetimeFigureOut">
               <a:rPr lang="en-GB" smtClean="0"/>
-              <a:t>04/10/2024</a:t>
+              <a:t>15/10/2024</a:t>
             </a:fld>
             <a:endParaRPr lang="en-GB"/>
           </a:p>
@@ -9243,6 +9244,286 @@
 </p:sld>
 </file>
 
+<file path=ppt/slides/slide14.xml><?xml version="1.0" encoding="utf-8"?>
+<p:sld xmlns:a="http://schemas.openxmlformats.org/drawingml/2006/main" xmlns:r="http://schemas.openxmlformats.org/officeDocument/2006/relationships" xmlns:p="http://schemas.openxmlformats.org/presentationml/2006/main">
+  <p:cSld>
+    <p:spTree>
+      <p:nvGrpSpPr>
+        <p:cNvPr id="1" name=""/>
+        <p:cNvGrpSpPr/>
+        <p:nvPr/>
+      </p:nvGrpSpPr>
+      <p:grpSpPr>
+        <a:xfrm>
+          <a:off x="0" y="0"/>
+          <a:ext cx="0" cy="0"/>
+          <a:chOff x="0" y="0"/>
+          <a:chExt cx="0" cy="0"/>
+        </a:xfrm>
+      </p:grpSpPr>
+      <p:pic>
+        <p:nvPicPr>
+          <p:cNvPr id="15" name="Picture 14">
+            <a:extLst>
+              <a:ext uri="{FF2B5EF4-FFF2-40B4-BE49-F238E27FC236}">
+                <a16:creationId xmlns:a16="http://schemas.microsoft.com/office/drawing/2014/main" id="{69DE1CFE-6191-0AFC-7AD3-3FC398F59A00}"/>
+              </a:ext>
+            </a:extLst>
+          </p:cNvPr>
+          <p:cNvPicPr>
+            <a:picLocks noChangeAspect="1"/>
+          </p:cNvPicPr>
+          <p:nvPr/>
+        </p:nvPicPr>
+        <p:blipFill>
+          <a:blip r:embed="rId2">
+            <a:extLst>
+              <a:ext uri="{28A0092B-C50C-407E-A947-70E740481C1C}">
+                <a14:useLocalDpi xmlns:a14="http://schemas.microsoft.com/office/drawing/2010/main" val="0"/>
+              </a:ext>
+            </a:extLst>
+          </a:blip>
+          <a:srcRect/>
+          <a:stretch>
+            <a:fillRect/>
+          </a:stretch>
+        </p:blipFill>
+        <p:spPr>
+          <a:xfrm>
+            <a:off x="1206115" y="818644"/>
+            <a:ext cx="1269841" cy="1269841"/>
+          </a:xfrm>
+          <a:custGeom>
+            <a:avLst/>
+            <a:gdLst>
+              <a:gd name="connsiteX0" fmla="*/ 992939 w 1269841"/>
+              <a:gd name="connsiteY0" fmla="*/ 527797 h 1269841"/>
+              <a:gd name="connsiteX1" fmla="*/ 1002786 w 1269841"/>
+              <a:gd name="connsiteY1" fmla="*/ 545939 h 1269841"/>
+              <a:gd name="connsiteX2" fmla="*/ 1020750 w 1269841"/>
+              <a:gd name="connsiteY2" fmla="*/ 634920 h 1269841"/>
+              <a:gd name="connsiteX3" fmla="*/ 1002786 w 1269841"/>
+              <a:gd name="connsiteY3" fmla="*/ 723901 h 1269841"/>
+              <a:gd name="connsiteX4" fmla="*/ 992370 w 1269841"/>
+              <a:gd name="connsiteY4" fmla="*/ 743091 h 1269841"/>
+              <a:gd name="connsiteX5" fmla="*/ 1003602 w 1269841"/>
+              <a:gd name="connsiteY5" fmla="*/ 703789 h 1269841"/>
+              <a:gd name="connsiteX6" fmla="*/ 1005028 w 1269841"/>
+              <a:gd name="connsiteY6" fmla="*/ 574071 h 1269841"/>
+              <a:gd name="connsiteX7" fmla="*/ 792150 w 1269841"/>
+              <a:gd name="connsiteY7" fmla="*/ 177720 h 1269841"/>
+              <a:gd name="connsiteX8" fmla="*/ 792150 w 1269841"/>
+              <a:gd name="connsiteY8" fmla="*/ 339168 h 1269841"/>
+              <a:gd name="connsiteX9" fmla="*/ 769289 w 1269841"/>
+              <a:gd name="connsiteY9" fmla="*/ 335024 h 1269841"/>
+              <a:gd name="connsiteX10" fmla="*/ 769289 w 1269841"/>
+              <a:gd name="connsiteY10" fmla="*/ 493588 h 1269841"/>
+              <a:gd name="connsiteX11" fmla="*/ 847383 w 1269841"/>
+              <a:gd name="connsiteY11" fmla="*/ 590903 h 1269841"/>
+              <a:gd name="connsiteX12" fmla="*/ 846809 w 1269841"/>
+              <a:gd name="connsiteY12" fmla="*/ 681840 h 1269841"/>
+              <a:gd name="connsiteX13" fmla="*/ 764909 w 1269841"/>
+              <a:gd name="connsiteY13" fmla="*/ 776051 h 1269841"/>
+              <a:gd name="connsiteX14" fmla="*/ 759988 w 1269841"/>
+              <a:gd name="connsiteY14" fmla="*/ 934595 h 1269841"/>
+              <a:gd name="connsiteX15" fmla="*/ 792150 w 1269841"/>
+              <a:gd name="connsiteY15" fmla="*/ 930279 h 1269841"/>
+              <a:gd name="connsiteX16" fmla="*/ 792150 w 1269841"/>
+              <a:gd name="connsiteY16" fmla="*/ 1092120 h 1269841"/>
+              <a:gd name="connsiteX17" fmla="*/ 1249350 w 1269841"/>
+              <a:gd name="connsiteY17" fmla="*/ 634920 h 1269841"/>
+              <a:gd name="connsiteX18" fmla="*/ 792150 w 1269841"/>
+              <a:gd name="connsiteY18" fmla="*/ 177720 h 1269841"/>
+              <a:gd name="connsiteX19" fmla="*/ 0 w 1269841"/>
+              <a:gd name="connsiteY19" fmla="*/ 0 h 1269841"/>
+              <a:gd name="connsiteX20" fmla="*/ 1269841 w 1269841"/>
+              <a:gd name="connsiteY20" fmla="*/ 0 h 1269841"/>
+              <a:gd name="connsiteX21" fmla="*/ 1269841 w 1269841"/>
+              <a:gd name="connsiteY21" fmla="*/ 1269841 h 1269841"/>
+              <a:gd name="connsiteX22" fmla="*/ 0 w 1269841"/>
+              <a:gd name="connsiteY22" fmla="*/ 1269841 h 1269841"/>
+            </a:gdLst>
+            <a:ahLst/>
+            <a:cxnLst>
+              <a:cxn ang="0">
+                <a:pos x="connsiteX0" y="connsiteY0"/>
+              </a:cxn>
+              <a:cxn ang="0">
+                <a:pos x="connsiteX1" y="connsiteY1"/>
+              </a:cxn>
+              <a:cxn ang="0">
+                <a:pos x="connsiteX2" y="connsiteY2"/>
+              </a:cxn>
+              <a:cxn ang="0">
+                <a:pos x="connsiteX3" y="connsiteY3"/>
+              </a:cxn>
+              <a:cxn ang="0">
+                <a:pos x="connsiteX4" y="connsiteY4"/>
+              </a:cxn>
+              <a:cxn ang="0">
+                <a:pos x="connsiteX5" y="connsiteY5"/>
+              </a:cxn>
+              <a:cxn ang="0">
+                <a:pos x="connsiteX6" y="connsiteY6"/>
+              </a:cxn>
+              <a:cxn ang="0">
+                <a:pos x="connsiteX7" y="connsiteY7"/>
+              </a:cxn>
+              <a:cxn ang="0">
+                <a:pos x="connsiteX8" y="connsiteY8"/>
+              </a:cxn>
+              <a:cxn ang="0">
+                <a:pos x="connsiteX9" y="connsiteY9"/>
+              </a:cxn>
+              <a:cxn ang="0">
+                <a:pos x="connsiteX10" y="connsiteY10"/>
+              </a:cxn>
+              <a:cxn ang="0">
+                <a:pos x="connsiteX11" y="connsiteY11"/>
+              </a:cxn>
+              <a:cxn ang="0">
+                <a:pos x="connsiteX12" y="connsiteY12"/>
+              </a:cxn>
+              <a:cxn ang="0">
+                <a:pos x="connsiteX13" y="connsiteY13"/>
+              </a:cxn>
+              <a:cxn ang="0">
+                <a:pos x="connsiteX14" y="connsiteY14"/>
+              </a:cxn>
+              <a:cxn ang="0">
+                <a:pos x="connsiteX15" y="connsiteY15"/>
+              </a:cxn>
+              <a:cxn ang="0">
+                <a:pos x="connsiteX16" y="connsiteY16"/>
+              </a:cxn>
+              <a:cxn ang="0">
+                <a:pos x="connsiteX17" y="connsiteY17"/>
+              </a:cxn>
+              <a:cxn ang="0">
+                <a:pos x="connsiteX18" y="connsiteY18"/>
+              </a:cxn>
+              <a:cxn ang="0">
+                <a:pos x="connsiteX19" y="connsiteY19"/>
+              </a:cxn>
+              <a:cxn ang="0">
+                <a:pos x="connsiteX20" y="connsiteY20"/>
+              </a:cxn>
+              <a:cxn ang="0">
+                <a:pos x="connsiteX21" y="connsiteY21"/>
+              </a:cxn>
+              <a:cxn ang="0">
+                <a:pos x="connsiteX22" y="connsiteY22"/>
+              </a:cxn>
+            </a:cxnLst>
+            <a:rect l="l" t="t" r="r" b="b"/>
+            <a:pathLst>
+              <a:path w="1269841" h="1269841">
+                <a:moveTo>
+                  <a:pt x="992939" y="527797"/>
+                </a:moveTo>
+                <a:lnTo>
+                  <a:pt x="1002786" y="545939"/>
+                </a:lnTo>
+                <a:cubicBezTo>
+                  <a:pt x="1014353" y="573288"/>
+                  <a:pt x="1020750" y="603357"/>
+                  <a:pt x="1020750" y="634920"/>
+                </a:cubicBezTo>
+                <a:cubicBezTo>
+                  <a:pt x="1020750" y="666483"/>
+                  <a:pt x="1014353" y="696552"/>
+                  <a:pt x="1002786" y="723901"/>
+                </a:cubicBezTo>
+                <a:lnTo>
+                  <a:pt x="992370" y="743091"/>
+                </a:lnTo>
+                <a:lnTo>
+                  <a:pt x="1003602" y="703789"/>
+                </a:lnTo>
+                <a:cubicBezTo>
+                  <a:pt x="1011667" y="661206"/>
+                  <a:pt x="1012154" y="616913"/>
+                  <a:pt x="1005028" y="574071"/>
+                </a:cubicBezTo>
+                <a:close/>
+                <a:moveTo>
+                  <a:pt x="792150" y="177720"/>
+                </a:moveTo>
+                <a:lnTo>
+                  <a:pt x="792150" y="339168"/>
+                </a:lnTo>
+                <a:lnTo>
+                  <a:pt x="769289" y="335024"/>
+                </a:lnTo>
+                <a:lnTo>
+                  <a:pt x="769289" y="493588"/>
+                </a:lnTo>
+                <a:cubicBezTo>
+                  <a:pt x="804815" y="493588"/>
+                  <a:pt x="836319" y="532846"/>
+                  <a:pt x="847383" y="590903"/>
+                </a:cubicBezTo>
+                <a:cubicBezTo>
+                  <a:pt x="853022" y="620496"/>
+                  <a:pt x="852821" y="652464"/>
+                  <a:pt x="846809" y="681840"/>
+                </a:cubicBezTo>
+                <a:cubicBezTo>
+                  <a:pt x="834696" y="741028"/>
+                  <a:pt x="801343" y="779395"/>
+                  <a:pt x="764909" y="776051"/>
+                </a:cubicBezTo>
+                <a:lnTo>
+                  <a:pt x="759988" y="934595"/>
+                </a:lnTo>
+                <a:lnTo>
+                  <a:pt x="792150" y="930279"/>
+                </a:lnTo>
+                <a:lnTo>
+                  <a:pt x="792150" y="1092120"/>
+                </a:lnTo>
+                <a:cubicBezTo>
+                  <a:pt x="1044655" y="1092120"/>
+                  <a:pt x="1249350" y="887425"/>
+                  <a:pt x="1249350" y="634920"/>
+                </a:cubicBezTo>
+                <a:cubicBezTo>
+                  <a:pt x="1249350" y="382415"/>
+                  <a:pt x="1044655" y="177720"/>
+                  <a:pt x="792150" y="177720"/>
+                </a:cubicBezTo>
+                <a:close/>
+                <a:moveTo>
+                  <a:pt x="0" y="0"/>
+                </a:moveTo>
+                <a:lnTo>
+                  <a:pt x="1269841" y="0"/>
+                </a:lnTo>
+                <a:lnTo>
+                  <a:pt x="1269841" y="1269841"/>
+                </a:lnTo>
+                <a:lnTo>
+                  <a:pt x="0" y="1269841"/>
+                </a:lnTo>
+                <a:close/>
+              </a:path>
+            </a:pathLst>
+          </a:custGeom>
+        </p:spPr>
+      </p:pic>
+    </p:spTree>
+    <p:extLst>
+      <p:ext uri="{BB962C8B-B14F-4D97-AF65-F5344CB8AC3E}">
+        <p14:creationId xmlns:p14="http://schemas.microsoft.com/office/powerpoint/2010/main" val="2567487118"/>
+      </p:ext>
+    </p:extLst>
+  </p:cSld>
+  <p:clrMapOvr>
+    <a:masterClrMapping/>
+  </p:clrMapOvr>
+</p:sld>
+</file>
+
 <file path=ppt/slides/slide2.xml><?xml version="1.0" encoding="utf-8"?>
 <p:sld xmlns:a="http://schemas.openxmlformats.org/drawingml/2006/main" xmlns:r="http://schemas.openxmlformats.org/officeDocument/2006/relationships" xmlns:p="http://schemas.openxmlformats.org/presentationml/2006/main">
   <p:cSld>
@@ -9262,6 +9543,58 @@
       </p:grpSpPr>
       <p:pic>
         <p:nvPicPr>
+          <p:cNvPr id="82" name="Picture 81" descr="A black and brown squares&#10;&#10;Description automatically generated">
+            <a:extLst>
+              <a:ext uri="{FF2B5EF4-FFF2-40B4-BE49-F238E27FC236}">
+                <a16:creationId xmlns:a16="http://schemas.microsoft.com/office/drawing/2014/main" id="{3DAD1444-32A5-F9D1-C0AB-ECC6BAC2C045}"/>
+              </a:ext>
+            </a:extLst>
+          </p:cNvPr>
+          <p:cNvPicPr>
+            <a:picLocks/>
+          </p:cNvPicPr>
+          <p:nvPr/>
+        </p:nvPicPr>
+        <p:blipFill>
+          <a:blip r:embed="rId2">
+            <a:duotone>
+              <a:schemeClr val="accent4">
+                <a:shade val="45000"/>
+                <a:satMod val="135000"/>
+              </a:schemeClr>
+              <a:prstClr val="white"/>
+            </a:duotone>
+            <a:extLst>
+              <a:ext uri="{BEBA8EAE-BF5A-486C-A8C5-ECC9F3942E4B}">
+                <a14:imgProps xmlns:a14="http://schemas.microsoft.com/office/drawing/2010/main">
+                  <a14:imgLayer r:embed="rId3">
+                    <a14:imgEffect>
+                      <a14:artisticGlowEdges/>
+                    </a14:imgEffect>
+                  </a14:imgLayer>
+                </a14:imgProps>
+              </a:ext>
+              <a:ext uri="{28A0092B-C50C-407E-A947-70E740481C1C}">
+                <a14:useLocalDpi xmlns:a14="http://schemas.microsoft.com/office/drawing/2010/main" val="0"/>
+              </a:ext>
+            </a:extLst>
+          </a:blip>
+          <a:stretch>
+            <a:fillRect/>
+          </a:stretch>
+        </p:blipFill>
+        <p:spPr>
+          <a:xfrm>
+            <a:off x="834600" y="-1583949"/>
+            <a:ext cx="1560457" cy="1556445"/>
+          </a:xfrm>
+          <a:prstGeom prst="rect">
+            <a:avLst/>
+          </a:prstGeom>
+        </p:spPr>
+      </p:pic>
+      <p:pic>
+        <p:nvPicPr>
           <p:cNvPr id="5" name="Picture 4" descr="A black background with a black square&#10;&#10;Description automatically generated with medium confidence">
             <a:extLst>
               <a:ext uri="{FF2B5EF4-FFF2-40B4-BE49-F238E27FC236}">
@@ -9275,7 +9608,7 @@
           <p:nvPr/>
         </p:nvPicPr>
         <p:blipFill>
-          <a:blip r:embed="rId2">
+          <a:blip r:embed="rId4">
             <a:alphaModFix/>
             <a:extLst>
               <a:ext uri="{28A0092B-C50C-407E-A947-70E740481C1C}">
@@ -9289,8 +9622,8 @@
         </p:blipFill>
         <p:spPr>
           <a:xfrm>
-            <a:off x="1197940" y="146779"/>
-            <a:ext cx="1269841" cy="1269841"/>
+            <a:off x="5671617" y="501951"/>
+            <a:ext cx="2491200" cy="2491200"/>
           </a:xfrm>
           <a:prstGeom prst="rect">
             <a:avLst/>
@@ -9312,7 +9645,7 @@
           <p:nvPr/>
         </p:nvPicPr>
         <p:blipFill>
-          <a:blip r:embed="rId3">
+          <a:blip r:embed="rId5">
             <a:extLst>
               <a:ext uri="{28A0092B-C50C-407E-A947-70E740481C1C}">
                 <a14:useLocalDpi xmlns:a14="http://schemas.microsoft.com/office/drawing/2010/main" val="0"/>
@@ -9325,7 +9658,7 @@
         </p:blipFill>
         <p:spPr>
           <a:xfrm>
-            <a:off x="5741549" y="346852"/>
+            <a:off x="9405412" y="177675"/>
             <a:ext cx="1269089" cy="1269089"/>
           </a:xfrm>
           <a:prstGeom prst="rect">
@@ -9348,7 +9681,7 @@
           <p:nvPr/>
         </p:nvPicPr>
         <p:blipFill>
-          <a:blip r:embed="rId3">
+          <a:blip r:embed="rId5">
             <a:extLst>
               <a:ext uri="{28A0092B-C50C-407E-A947-70E740481C1C}">
                 <a14:useLocalDpi xmlns:a14="http://schemas.microsoft.com/office/drawing/2010/main" val="0"/>
@@ -9361,7 +9694,7 @@
         </p:blipFill>
         <p:spPr>
           <a:xfrm>
-            <a:off x="7013417" y="346852"/>
+            <a:off x="10677280" y="177675"/>
             <a:ext cx="1269089" cy="1269089"/>
           </a:xfrm>
           <a:prstGeom prst="rect">
@@ -9383,7 +9716,7 @@
         </p:nvSpPr>
         <p:spPr>
           <a:xfrm rot="5400000">
-            <a:off x="7451057" y="824618"/>
+            <a:off x="11114920" y="655441"/>
             <a:ext cx="393807" cy="313556"/>
           </a:xfrm>
           <a:prstGeom prst="triangle">
@@ -9432,7 +9765,7 @@
         </p:nvSpPr>
         <p:spPr>
           <a:xfrm rot="16200000">
-            <a:off x="6176427" y="824618"/>
+            <a:off x="9840290" y="655441"/>
             <a:ext cx="393807" cy="313556"/>
           </a:xfrm>
           <a:prstGeom prst="triangle">
@@ -9482,7 +9815,7 @@
           <p:nvPr/>
         </p:nvPicPr>
         <p:blipFill>
-          <a:blip r:embed="rId3">
+          <a:blip r:embed="rId5">
             <a:extLst>
               <a:ext uri="{28A0092B-C50C-407E-A947-70E740481C1C}">
                 <a14:useLocalDpi xmlns:a14="http://schemas.microsoft.com/office/drawing/2010/main" val="0"/>
@@ -9496,7 +9829,7 @@
         </p:blipFill>
         <p:spPr>
           <a:xfrm>
-            <a:off x="6872762" y="3429001"/>
+            <a:off x="8139072" y="1875218"/>
             <a:ext cx="1269089" cy="1269089"/>
           </a:xfrm>
           <a:custGeom>
@@ -9699,7 +10032,7 @@
           <p:nvPr/>
         </p:nvPicPr>
         <p:blipFill>
-          <a:blip r:embed="rId3">
+          <a:blip r:embed="rId5">
             <a:extLst>
               <a:ext uri="{28A0092B-C50C-407E-A947-70E740481C1C}">
                 <a14:useLocalDpi xmlns:a14="http://schemas.microsoft.com/office/drawing/2010/main" val="0"/>
@@ -9713,7 +10046,7 @@
         </p:blipFill>
         <p:spPr>
           <a:xfrm>
-            <a:off x="8141849" y="3429000"/>
+            <a:off x="9408159" y="1875217"/>
             <a:ext cx="1269089" cy="1269089"/>
           </a:xfrm>
           <a:custGeom>
@@ -9804,7 +10137,7 @@
           <p:nvPr/>
         </p:nvPicPr>
         <p:blipFill>
-          <a:blip r:embed="rId3">
+          <a:blip r:embed="rId5">
             <a:extLst>
               <a:ext uri="{28A0092B-C50C-407E-A947-70E740481C1C}">
                 <a14:useLocalDpi xmlns:a14="http://schemas.microsoft.com/office/drawing/2010/main" val="0"/>
@@ -9818,7 +10151,7 @@
         </p:blipFill>
         <p:spPr>
           <a:xfrm>
-            <a:off x="9408191" y="3429000"/>
+            <a:off x="10674501" y="1875217"/>
             <a:ext cx="1269089" cy="1269089"/>
           </a:xfrm>
           <a:custGeom>
@@ -9909,7 +10242,7 @@
           <p:nvPr/>
         </p:nvPicPr>
         <p:blipFill>
-          <a:blip r:embed="rId3">
+          <a:blip r:embed="rId5">
             <a:extLst>
               <a:ext uri="{28A0092B-C50C-407E-A947-70E740481C1C}">
                 <a14:useLocalDpi xmlns:a14="http://schemas.microsoft.com/office/drawing/2010/main" val="0"/>
@@ -9922,7 +10255,7 @@
         </p:blipFill>
         <p:spPr>
           <a:xfrm>
-            <a:off x="4469681" y="346852"/>
+            <a:off x="8133544" y="177675"/>
             <a:ext cx="1269089" cy="1269089"/>
           </a:xfrm>
           <a:prstGeom prst="rect">
@@ -9944,7 +10277,7 @@
         </p:nvGrpSpPr>
         <p:grpSpPr>
           <a:xfrm>
-            <a:off x="4863075" y="646883"/>
+            <a:off x="8526938" y="477706"/>
             <a:ext cx="482300" cy="603615"/>
             <a:chOff x="7266156" y="3729032"/>
             <a:chExt cx="482300" cy="603615"/>
@@ -10058,6 +10391,1822 @@
             </a:p>
           </p:txBody>
         </p:sp>
+      </p:grpSp>
+      <p:grpSp>
+        <p:nvGrpSpPr>
+          <p:cNvPr id="112" name="Group 111">
+            <a:extLst>
+              <a:ext uri="{FF2B5EF4-FFF2-40B4-BE49-F238E27FC236}">
+                <a16:creationId xmlns:a16="http://schemas.microsoft.com/office/drawing/2014/main" id="{540A3F24-AE7E-86E8-D246-BE804DEC410E}"/>
+              </a:ext>
+            </a:extLst>
+          </p:cNvPr>
+          <p:cNvGrpSpPr/>
+          <p:nvPr/>
+        </p:nvGrpSpPr>
+        <p:grpSpPr>
+          <a:xfrm>
+            <a:off x="3132435" y="-202865"/>
+            <a:ext cx="2609697" cy="2609697"/>
+            <a:chOff x="4051694" y="3190875"/>
+            <a:chExt cx="2609697" cy="2609697"/>
+          </a:xfrm>
+        </p:grpSpPr>
+        <p:pic>
+          <p:nvPicPr>
+            <p:cNvPr id="111" name="Picture 110" descr="A black background with a black square&#10;&#10;Description automatically generated with medium confidence">
+              <a:extLst>
+                <a:ext uri="{FF2B5EF4-FFF2-40B4-BE49-F238E27FC236}">
+                  <a16:creationId xmlns:a16="http://schemas.microsoft.com/office/drawing/2014/main" id="{7892A335-095D-BC35-A0BF-840C01D94377}"/>
+                </a:ext>
+              </a:extLst>
+            </p:cNvPr>
+            <p:cNvPicPr>
+              <a:picLocks noChangeAspect="1"/>
+            </p:cNvPicPr>
+            <p:nvPr/>
+          </p:nvPicPr>
+          <p:blipFill>
+            <a:blip r:embed="rId6">
+              <a:extLst>
+                <a:ext uri="{28A0092B-C50C-407E-A947-70E740481C1C}">
+                  <a14:useLocalDpi xmlns:a14="http://schemas.microsoft.com/office/drawing/2010/main" val="0"/>
+                </a:ext>
+              </a:extLst>
+            </a:blip>
+            <a:srcRect/>
+            <a:stretch>
+              <a:fillRect/>
+            </a:stretch>
+          </p:blipFill>
+          <p:spPr>
+            <a:xfrm>
+              <a:off x="4051694" y="3190875"/>
+              <a:ext cx="2609697" cy="2609697"/>
+            </a:xfrm>
+            <a:custGeom>
+              <a:avLst/>
+              <a:gdLst>
+                <a:gd name="connsiteX0" fmla="*/ 833173 w 2609697"/>
+                <a:gd name="connsiteY0" fmla="*/ 1274893 h 2609697"/>
+                <a:gd name="connsiteX1" fmla="*/ 223580 w 2609697"/>
+                <a:gd name="connsiteY1" fmla="*/ 1884486 h 2609697"/>
+                <a:gd name="connsiteX2" fmla="*/ 322017 w 2609697"/>
+                <a:gd name="connsiteY2" fmla="*/ 2287719 h 2609697"/>
+                <a:gd name="connsiteX3" fmla="*/ 725250 w 2609697"/>
+                <a:gd name="connsiteY3" fmla="*/ 2386155 h 2609697"/>
+                <a:gd name="connsiteX4" fmla="*/ 1334843 w 2609697"/>
+                <a:gd name="connsiteY4" fmla="*/ 1776563 h 2609697"/>
+                <a:gd name="connsiteX5" fmla="*/ 1726341 w 2609697"/>
+                <a:gd name="connsiteY5" fmla="*/ 380010 h 2609697"/>
+                <a:gd name="connsiteX6" fmla="*/ 840395 w 2609697"/>
+                <a:gd name="connsiteY6" fmla="*/ 1265957 h 2609697"/>
+                <a:gd name="connsiteX7" fmla="*/ 1342064 w 2609697"/>
+                <a:gd name="connsiteY7" fmla="*/ 1767626 h 2609697"/>
+                <a:gd name="connsiteX8" fmla="*/ 2228011 w 2609697"/>
+                <a:gd name="connsiteY8" fmla="*/ 881679 h 2609697"/>
+                <a:gd name="connsiteX9" fmla="*/ 2198663 w 2609697"/>
+                <a:gd name="connsiteY9" fmla="*/ 409358 h 2609697"/>
+                <a:gd name="connsiteX10" fmla="*/ 0 w 2609697"/>
+                <a:gd name="connsiteY10" fmla="*/ 0 h 2609697"/>
+                <a:gd name="connsiteX11" fmla="*/ 2609697 w 2609697"/>
+                <a:gd name="connsiteY11" fmla="*/ 0 h 2609697"/>
+                <a:gd name="connsiteX12" fmla="*/ 2609697 w 2609697"/>
+                <a:gd name="connsiteY12" fmla="*/ 2609697 h 2609697"/>
+                <a:gd name="connsiteX13" fmla="*/ 0 w 2609697"/>
+                <a:gd name="connsiteY13" fmla="*/ 2609697 h 2609697"/>
+              </a:gdLst>
+              <a:ahLst/>
+              <a:cxnLst>
+                <a:cxn ang="0">
+                  <a:pos x="connsiteX0" y="connsiteY0"/>
+                </a:cxn>
+                <a:cxn ang="0">
+                  <a:pos x="connsiteX1" y="connsiteY1"/>
+                </a:cxn>
+                <a:cxn ang="0">
+                  <a:pos x="connsiteX2" y="connsiteY2"/>
+                </a:cxn>
+                <a:cxn ang="0">
+                  <a:pos x="connsiteX3" y="connsiteY3"/>
+                </a:cxn>
+                <a:cxn ang="0">
+                  <a:pos x="connsiteX4" y="connsiteY4"/>
+                </a:cxn>
+                <a:cxn ang="0">
+                  <a:pos x="connsiteX5" y="connsiteY5"/>
+                </a:cxn>
+                <a:cxn ang="0">
+                  <a:pos x="connsiteX6" y="connsiteY6"/>
+                </a:cxn>
+                <a:cxn ang="0">
+                  <a:pos x="connsiteX7" y="connsiteY7"/>
+                </a:cxn>
+                <a:cxn ang="0">
+                  <a:pos x="connsiteX8" y="connsiteY8"/>
+                </a:cxn>
+                <a:cxn ang="0">
+                  <a:pos x="connsiteX9" y="connsiteY9"/>
+                </a:cxn>
+                <a:cxn ang="0">
+                  <a:pos x="connsiteX10" y="connsiteY10"/>
+                </a:cxn>
+                <a:cxn ang="0">
+                  <a:pos x="connsiteX11" y="connsiteY11"/>
+                </a:cxn>
+                <a:cxn ang="0">
+                  <a:pos x="connsiteX12" y="connsiteY12"/>
+                </a:cxn>
+                <a:cxn ang="0">
+                  <a:pos x="connsiteX13" y="connsiteY13"/>
+                </a:cxn>
+              </a:cxnLst>
+              <a:rect l="l" t="t" r="r" b="b"/>
+              <a:pathLst>
+                <a:path w="2609697" h="2609697">
+                  <a:moveTo>
+                    <a:pt x="833173" y="1274893"/>
+                  </a:moveTo>
+                  <a:lnTo>
+                    <a:pt x="223580" y="1884486"/>
+                  </a:lnTo>
+                  <a:lnTo>
+                    <a:pt x="322017" y="2287719"/>
+                  </a:lnTo>
+                  <a:lnTo>
+                    <a:pt x="725250" y="2386155"/>
+                  </a:lnTo>
+                  <a:lnTo>
+                    <a:pt x="1334843" y="1776563"/>
+                  </a:lnTo>
+                  <a:close/>
+                  <a:moveTo>
+                    <a:pt x="1726341" y="380010"/>
+                  </a:moveTo>
+                  <a:lnTo>
+                    <a:pt x="840395" y="1265957"/>
+                  </a:lnTo>
+                  <a:lnTo>
+                    <a:pt x="1342064" y="1767626"/>
+                  </a:lnTo>
+                  <a:lnTo>
+                    <a:pt x="2228011" y="881679"/>
+                  </a:lnTo>
+                  <a:lnTo>
+                    <a:pt x="2198663" y="409358"/>
+                  </a:lnTo>
+                  <a:close/>
+                  <a:moveTo>
+                    <a:pt x="0" y="0"/>
+                  </a:moveTo>
+                  <a:lnTo>
+                    <a:pt x="2609697" y="0"/>
+                  </a:lnTo>
+                  <a:lnTo>
+                    <a:pt x="2609697" y="2609697"/>
+                  </a:lnTo>
+                  <a:lnTo>
+                    <a:pt x="0" y="2609697"/>
+                  </a:lnTo>
+                  <a:close/>
+                </a:path>
+              </a:pathLst>
+            </a:custGeom>
+          </p:spPr>
+        </p:pic>
+        <p:pic>
+          <p:nvPicPr>
+            <p:cNvPr id="103" name="Picture 102" descr="A black background with a black square&#10;&#10;Description automatically generated with medium confidence">
+              <a:extLst>
+                <a:ext uri="{FF2B5EF4-FFF2-40B4-BE49-F238E27FC236}">
+                  <a16:creationId xmlns:a16="http://schemas.microsoft.com/office/drawing/2014/main" id="{2743044F-3DF0-4978-DF5F-913C31EADDE4}"/>
+                </a:ext>
+              </a:extLst>
+            </p:cNvPr>
+            <p:cNvPicPr>
+              <a:picLocks noChangeAspect="1"/>
+            </p:cNvPicPr>
+            <p:nvPr/>
+          </p:nvPicPr>
+          <p:blipFill>
+            <a:blip r:embed="rId7">
+              <a:extLst>
+                <a:ext uri="{28A0092B-C50C-407E-A947-70E740481C1C}">
+                  <a14:useLocalDpi xmlns:a14="http://schemas.microsoft.com/office/drawing/2010/main" val="0"/>
+                </a:ext>
+              </a:extLst>
+            </a:blip>
+            <a:stretch>
+              <a:fillRect/>
+            </a:stretch>
+          </p:blipFill>
+          <p:spPr>
+            <a:xfrm>
+              <a:off x="4051694" y="4408596"/>
+              <a:ext cx="1391976" cy="1391976"/>
+            </a:xfrm>
+            <a:prstGeom prst="rect">
+              <a:avLst/>
+            </a:prstGeom>
+          </p:spPr>
+        </p:pic>
+        <p:pic>
+          <p:nvPicPr>
+            <p:cNvPr id="110" name="Picture 109" descr="A black background with a black square&#10;&#10;Description automatically generated with medium confidence">
+              <a:extLst>
+                <a:ext uri="{FF2B5EF4-FFF2-40B4-BE49-F238E27FC236}">
+                  <a16:creationId xmlns:a16="http://schemas.microsoft.com/office/drawing/2014/main" id="{3A9DD78B-5879-DD88-1A2D-CBAA06CE8541}"/>
+                </a:ext>
+              </a:extLst>
+            </p:cNvPr>
+            <p:cNvPicPr>
+              <a:picLocks noChangeAspect="1"/>
+            </p:cNvPicPr>
+            <p:nvPr/>
+          </p:nvPicPr>
+          <p:blipFill>
+            <a:blip r:embed="rId6">
+              <a:duotone>
+                <a:schemeClr val="accent4">
+                  <a:shade val="45000"/>
+                  <a:satMod val="135000"/>
+                </a:schemeClr>
+                <a:prstClr val="white"/>
+              </a:duotone>
+              <a:alphaModFix/>
+              <a:extLst>
+                <a:ext uri="{28A0092B-C50C-407E-A947-70E740481C1C}">
+                  <a14:useLocalDpi xmlns:a14="http://schemas.microsoft.com/office/drawing/2010/main" val="0"/>
+                </a:ext>
+              </a:extLst>
+            </a:blip>
+            <a:srcRect l="32385" t="14744" r="14443" b="32084"/>
+            <a:stretch>
+              <a:fillRect/>
+            </a:stretch>
+          </p:blipFill>
+          <p:spPr>
+            <a:xfrm>
+              <a:off x="4867154" y="3526754"/>
+              <a:ext cx="1458000" cy="1458000"/>
+            </a:xfrm>
+            <a:custGeom>
+              <a:avLst/>
+              <a:gdLst>
+                <a:gd name="connsiteX0" fmla="*/ 885946 w 1387616"/>
+                <a:gd name="connsiteY0" fmla="*/ 0 h 1387616"/>
+                <a:gd name="connsiteX1" fmla="*/ 1358268 w 1387616"/>
+                <a:gd name="connsiteY1" fmla="*/ 29348 h 1387616"/>
+                <a:gd name="connsiteX2" fmla="*/ 1387616 w 1387616"/>
+                <a:gd name="connsiteY2" fmla="*/ 501670 h 1387616"/>
+                <a:gd name="connsiteX3" fmla="*/ 501669 w 1387616"/>
+                <a:gd name="connsiteY3" fmla="*/ 1387616 h 1387616"/>
+                <a:gd name="connsiteX4" fmla="*/ 0 w 1387616"/>
+                <a:gd name="connsiteY4" fmla="*/ 885947 h 1387616"/>
+              </a:gdLst>
+              <a:ahLst/>
+              <a:cxnLst>
+                <a:cxn ang="0">
+                  <a:pos x="connsiteX0" y="connsiteY0"/>
+                </a:cxn>
+                <a:cxn ang="0">
+                  <a:pos x="connsiteX1" y="connsiteY1"/>
+                </a:cxn>
+                <a:cxn ang="0">
+                  <a:pos x="connsiteX2" y="connsiteY2"/>
+                </a:cxn>
+                <a:cxn ang="0">
+                  <a:pos x="connsiteX3" y="connsiteY3"/>
+                </a:cxn>
+                <a:cxn ang="0">
+                  <a:pos x="connsiteX4" y="connsiteY4"/>
+                </a:cxn>
+              </a:cxnLst>
+              <a:rect l="l" t="t" r="r" b="b"/>
+              <a:pathLst>
+                <a:path w="1387616" h="1387616">
+                  <a:moveTo>
+                    <a:pt x="885946" y="0"/>
+                  </a:moveTo>
+                  <a:lnTo>
+                    <a:pt x="1358268" y="29348"/>
+                  </a:lnTo>
+                  <a:lnTo>
+                    <a:pt x="1387616" y="501670"/>
+                  </a:lnTo>
+                  <a:lnTo>
+                    <a:pt x="501669" y="1387616"/>
+                  </a:lnTo>
+                  <a:lnTo>
+                    <a:pt x="0" y="885947"/>
+                  </a:lnTo>
+                  <a:close/>
+                </a:path>
+              </a:pathLst>
+            </a:custGeom>
+          </p:spPr>
+        </p:pic>
+      </p:grpSp>
+      <p:grpSp>
+        <p:nvGrpSpPr>
+          <p:cNvPr id="148" name="Group 147">
+            <a:extLst>
+              <a:ext uri="{FF2B5EF4-FFF2-40B4-BE49-F238E27FC236}">
+                <a16:creationId xmlns:a16="http://schemas.microsoft.com/office/drawing/2014/main" id="{F95B84C1-5748-AD5C-0744-D7CAE8EA2D44}"/>
+              </a:ext>
+            </a:extLst>
+          </p:cNvPr>
+          <p:cNvGrpSpPr/>
+          <p:nvPr/>
+        </p:nvGrpSpPr>
+        <p:grpSpPr>
+          <a:xfrm>
+            <a:off x="125924" y="-202865"/>
+            <a:ext cx="2777656" cy="2781667"/>
+            <a:chOff x="125924" y="-202865"/>
+            <a:chExt cx="2777656" cy="2781667"/>
+          </a:xfrm>
+        </p:grpSpPr>
+        <p:grpSp>
+          <p:nvGrpSpPr>
+            <p:cNvPr id="147" name="Group 146">
+              <a:extLst>
+                <a:ext uri="{FF2B5EF4-FFF2-40B4-BE49-F238E27FC236}">
+                  <a16:creationId xmlns:a16="http://schemas.microsoft.com/office/drawing/2014/main" id="{0D596B8B-6A3F-986D-E7A4-192BFD8DED22}"/>
+                </a:ext>
+              </a:extLst>
+            </p:cNvPr>
+            <p:cNvGrpSpPr/>
+            <p:nvPr/>
+          </p:nvGrpSpPr>
+          <p:grpSpPr>
+            <a:xfrm>
+              <a:off x="125924" y="302717"/>
+              <a:ext cx="2269133" cy="2276085"/>
+              <a:chOff x="125924" y="302717"/>
+              <a:chExt cx="2269133" cy="2276085"/>
+            </a:xfrm>
+          </p:grpSpPr>
+          <p:grpSp>
+            <p:nvGrpSpPr>
+              <p:cNvPr id="145" name="Group 144">
+                <a:extLst>
+                  <a:ext uri="{FF2B5EF4-FFF2-40B4-BE49-F238E27FC236}">
+                    <a16:creationId xmlns:a16="http://schemas.microsoft.com/office/drawing/2014/main" id="{7F045C83-A6EF-AF7A-0DAC-A52BFFA02076}"/>
+                  </a:ext>
+                </a:extLst>
+              </p:cNvPr>
+              <p:cNvGrpSpPr>
+                <a:grpSpLocks noChangeAspect="1"/>
+              </p:cNvGrpSpPr>
+              <p:nvPr/>
+            </p:nvGrpSpPr>
+            <p:grpSpPr>
+              <a:xfrm>
+                <a:off x="1520257" y="302717"/>
+                <a:ext cx="874800" cy="874800"/>
+                <a:chOff x="1513907" y="293192"/>
+                <a:chExt cx="880624" cy="889372"/>
+              </a:xfrm>
+            </p:grpSpPr>
+            <p:sp>
+              <p:nvSpPr>
+                <p:cNvPr id="116" name="Rectangle 115">
+                  <a:extLst>
+                    <a:ext uri="{FF2B5EF4-FFF2-40B4-BE49-F238E27FC236}">
+                      <a16:creationId xmlns:a16="http://schemas.microsoft.com/office/drawing/2014/main" id="{BE210FEA-8DFD-C29C-0897-A8B9C6486C20}"/>
+                    </a:ext>
+                  </a:extLst>
+                </p:cNvPr>
+                <p:cNvSpPr>
+                  <a:spLocks noChangeAspect="1"/>
+                </p:cNvSpPr>
+                <p:nvPr/>
+              </p:nvSpPr>
+              <p:spPr>
+                <a:xfrm>
+                  <a:off x="2173386" y="293192"/>
+                  <a:ext cx="221145" cy="222304"/>
+                </a:xfrm>
+                <a:prstGeom prst="rect">
+                  <a:avLst/>
+                </a:prstGeom>
+                <a:solidFill>
+                  <a:srgbClr val="D39603"/>
+                </a:solidFill>
+                <a:ln>
+                  <a:noFill/>
+                </a:ln>
+              </p:spPr>
+              <p:style>
+                <a:lnRef idx="2">
+                  <a:schemeClr val="accent1">
+                    <a:shade val="15000"/>
+                  </a:schemeClr>
+                </a:lnRef>
+                <a:fillRef idx="1">
+                  <a:schemeClr val="accent1"/>
+                </a:fillRef>
+                <a:effectRef idx="0">
+                  <a:schemeClr val="accent1"/>
+                </a:effectRef>
+                <a:fontRef idx="minor">
+                  <a:schemeClr val="lt1"/>
+                </a:fontRef>
+              </p:style>
+              <p:txBody>
+                <a:bodyPr rtlCol="0" anchor="ctr"/>
+                <a:lstStyle/>
+                <a:p>
+                  <a:pPr algn="ctr"/>
+                  <a:endParaRPr lang="en-GB" dirty="0"/>
+                </a:p>
+              </p:txBody>
+            </p:sp>
+            <p:grpSp>
+              <p:nvGrpSpPr>
+                <p:cNvPr id="125" name="Group 124">
+                  <a:extLst>
+                    <a:ext uri="{FF2B5EF4-FFF2-40B4-BE49-F238E27FC236}">
+                      <a16:creationId xmlns:a16="http://schemas.microsoft.com/office/drawing/2014/main" id="{D0FE8A1E-F816-7E3B-2474-900B94D64ED4}"/>
+                    </a:ext>
+                  </a:extLst>
+                </p:cNvPr>
+                <p:cNvGrpSpPr/>
+                <p:nvPr/>
+              </p:nvGrpSpPr>
+              <p:grpSpPr>
+                <a:xfrm>
+                  <a:off x="1513907" y="293350"/>
+                  <a:ext cx="880624" cy="889214"/>
+                  <a:chOff x="1512409" y="288124"/>
+                  <a:chExt cx="895100" cy="899120"/>
+                </a:xfrm>
+                <a:solidFill>
+                  <a:srgbClr val="D39603"/>
+                </a:solidFill>
+              </p:grpSpPr>
+              <p:sp>
+                <p:nvSpPr>
+                  <p:cNvPr id="113" name="Rectangle 112">
+                    <a:extLst>
+                      <a:ext uri="{FF2B5EF4-FFF2-40B4-BE49-F238E27FC236}">
+                        <a16:creationId xmlns:a16="http://schemas.microsoft.com/office/drawing/2014/main" id="{4E9CC605-097F-2C6B-1D99-A7A78FDEABFB}"/>
+                      </a:ext>
+                    </a:extLst>
+                  </p:cNvPr>
+                  <p:cNvSpPr>
+                    <a:spLocks noChangeAspect="1"/>
+                  </p:cNvSpPr>
+                  <p:nvPr/>
+                </p:nvSpPr>
+                <p:spPr>
+                  <a:xfrm>
+                    <a:off x="2182729" y="737684"/>
+                    <a:ext cx="224780" cy="224780"/>
+                  </a:xfrm>
+                  <a:prstGeom prst="rect">
+                    <a:avLst/>
+                  </a:prstGeom>
+                  <a:grpFill/>
+                  <a:ln>
+                    <a:noFill/>
+                  </a:ln>
+                </p:spPr>
+                <p:style>
+                  <a:lnRef idx="2">
+                    <a:schemeClr val="accent1">
+                      <a:shade val="15000"/>
+                    </a:schemeClr>
+                  </a:lnRef>
+                  <a:fillRef idx="1">
+                    <a:schemeClr val="accent1"/>
+                  </a:fillRef>
+                  <a:effectRef idx="0">
+                    <a:schemeClr val="accent1"/>
+                  </a:effectRef>
+                  <a:fontRef idx="minor">
+                    <a:schemeClr val="lt1"/>
+                  </a:fontRef>
+                </p:style>
+                <p:txBody>
+                  <a:bodyPr rtlCol="0" anchor="ctr"/>
+                  <a:lstStyle/>
+                  <a:p>
+                    <a:pPr algn="ctr"/>
+                    <a:endParaRPr lang="en-GB" dirty="0"/>
+                  </a:p>
+                </p:txBody>
+              </p:sp>
+              <p:sp>
+                <p:nvSpPr>
+                  <p:cNvPr id="115" name="Rectangle 114">
+                    <a:extLst>
+                      <a:ext uri="{FF2B5EF4-FFF2-40B4-BE49-F238E27FC236}">
+                        <a16:creationId xmlns:a16="http://schemas.microsoft.com/office/drawing/2014/main" id="{4C1FCF62-B04C-4240-B2B9-DE27CEF1E41D}"/>
+                      </a:ext>
+                    </a:extLst>
+                  </p:cNvPr>
+                  <p:cNvSpPr>
+                    <a:spLocks noChangeAspect="1"/>
+                  </p:cNvSpPr>
+                  <p:nvPr/>
+                </p:nvSpPr>
+                <p:spPr>
+                  <a:xfrm>
+                    <a:off x="1956364" y="512904"/>
+                    <a:ext cx="224780" cy="224780"/>
+                  </a:xfrm>
+                  <a:prstGeom prst="rect">
+                    <a:avLst/>
+                  </a:prstGeom>
+                  <a:grpFill/>
+                  <a:ln>
+                    <a:noFill/>
+                  </a:ln>
+                </p:spPr>
+                <p:style>
+                  <a:lnRef idx="2">
+                    <a:schemeClr val="accent1">
+                      <a:shade val="15000"/>
+                    </a:schemeClr>
+                  </a:lnRef>
+                  <a:fillRef idx="1">
+                    <a:schemeClr val="accent1"/>
+                  </a:fillRef>
+                  <a:effectRef idx="0">
+                    <a:schemeClr val="accent1"/>
+                  </a:effectRef>
+                  <a:fontRef idx="minor">
+                    <a:schemeClr val="lt1"/>
+                  </a:fontRef>
+                </p:style>
+                <p:txBody>
+                  <a:bodyPr rtlCol="0" anchor="ctr"/>
+                  <a:lstStyle/>
+                  <a:p>
+                    <a:pPr algn="ctr"/>
+                    <a:endParaRPr lang="en-GB" dirty="0"/>
+                  </a:p>
+                </p:txBody>
+              </p:sp>
+              <p:sp>
+                <p:nvSpPr>
+                  <p:cNvPr id="117" name="Rectangle 116">
+                    <a:extLst>
+                      <a:ext uri="{FF2B5EF4-FFF2-40B4-BE49-F238E27FC236}">
+                        <a16:creationId xmlns:a16="http://schemas.microsoft.com/office/drawing/2014/main" id="{9D5C064B-B396-429B-2C52-A8050348CBF0}"/>
+                      </a:ext>
+                    </a:extLst>
+                  </p:cNvPr>
+                  <p:cNvSpPr>
+                    <a:spLocks noChangeAspect="1"/>
+                  </p:cNvSpPr>
+                  <p:nvPr/>
+                </p:nvSpPr>
+                <p:spPr>
+                  <a:xfrm>
+                    <a:off x="1733849" y="288124"/>
+                    <a:ext cx="224780" cy="224780"/>
+                  </a:xfrm>
+                  <a:prstGeom prst="rect">
+                    <a:avLst/>
+                  </a:prstGeom>
+                  <a:grpFill/>
+                  <a:ln>
+                    <a:noFill/>
+                  </a:ln>
+                </p:spPr>
+                <p:style>
+                  <a:lnRef idx="2">
+                    <a:schemeClr val="accent1">
+                      <a:shade val="15000"/>
+                    </a:schemeClr>
+                  </a:lnRef>
+                  <a:fillRef idx="1">
+                    <a:schemeClr val="accent1"/>
+                  </a:fillRef>
+                  <a:effectRef idx="0">
+                    <a:schemeClr val="accent1"/>
+                  </a:effectRef>
+                  <a:fontRef idx="minor">
+                    <a:schemeClr val="lt1"/>
+                  </a:fontRef>
+                </p:style>
+                <p:txBody>
+                  <a:bodyPr rtlCol="0" anchor="ctr"/>
+                  <a:lstStyle/>
+                  <a:p>
+                    <a:pPr algn="ctr"/>
+                    <a:endParaRPr lang="en-GB" dirty="0"/>
+                  </a:p>
+                </p:txBody>
+              </p:sp>
+              <p:sp>
+                <p:nvSpPr>
+                  <p:cNvPr id="122" name="Rectangle 121">
+                    <a:extLst>
+                      <a:ext uri="{FF2B5EF4-FFF2-40B4-BE49-F238E27FC236}">
+                        <a16:creationId xmlns:a16="http://schemas.microsoft.com/office/drawing/2014/main" id="{B1EEA9DE-226D-0FAD-A036-FE138B2ACF24}"/>
+                      </a:ext>
+                    </a:extLst>
+                  </p:cNvPr>
+                  <p:cNvSpPr>
+                    <a:spLocks noChangeAspect="1"/>
+                  </p:cNvSpPr>
+                  <p:nvPr/>
+                </p:nvSpPr>
+                <p:spPr>
+                  <a:xfrm>
+                    <a:off x="1961289" y="962464"/>
+                    <a:ext cx="224780" cy="224780"/>
+                  </a:xfrm>
+                  <a:prstGeom prst="rect">
+                    <a:avLst/>
+                  </a:prstGeom>
+                  <a:grpFill/>
+                  <a:ln>
+                    <a:noFill/>
+                  </a:ln>
+                </p:spPr>
+                <p:style>
+                  <a:lnRef idx="2">
+                    <a:schemeClr val="accent1">
+                      <a:shade val="15000"/>
+                    </a:schemeClr>
+                  </a:lnRef>
+                  <a:fillRef idx="1">
+                    <a:schemeClr val="accent1"/>
+                  </a:fillRef>
+                  <a:effectRef idx="0">
+                    <a:schemeClr val="accent1"/>
+                  </a:effectRef>
+                  <a:fontRef idx="minor">
+                    <a:schemeClr val="lt1"/>
+                  </a:fontRef>
+                </p:style>
+                <p:txBody>
+                  <a:bodyPr rtlCol="0" anchor="ctr"/>
+                  <a:lstStyle/>
+                  <a:p>
+                    <a:pPr algn="ctr"/>
+                    <a:endParaRPr lang="en-GB" dirty="0"/>
+                  </a:p>
+                </p:txBody>
+              </p:sp>
+              <p:sp>
+                <p:nvSpPr>
+                  <p:cNvPr id="123" name="Rectangle 122">
+                    <a:extLst>
+                      <a:ext uri="{FF2B5EF4-FFF2-40B4-BE49-F238E27FC236}">
+                        <a16:creationId xmlns:a16="http://schemas.microsoft.com/office/drawing/2014/main" id="{B8D761C7-1A3F-7CF3-CFAE-FD49BB36D635}"/>
+                      </a:ext>
+                    </a:extLst>
+                  </p:cNvPr>
+                  <p:cNvSpPr>
+                    <a:spLocks noChangeAspect="1"/>
+                  </p:cNvSpPr>
+                  <p:nvPr/>
+                </p:nvSpPr>
+                <p:spPr>
+                  <a:xfrm>
+                    <a:off x="1734924" y="737684"/>
+                    <a:ext cx="224780" cy="224780"/>
+                  </a:xfrm>
+                  <a:prstGeom prst="rect">
+                    <a:avLst/>
+                  </a:prstGeom>
+                  <a:grpFill/>
+                  <a:ln>
+                    <a:noFill/>
+                  </a:ln>
+                </p:spPr>
+                <p:style>
+                  <a:lnRef idx="2">
+                    <a:schemeClr val="accent1">
+                      <a:shade val="15000"/>
+                    </a:schemeClr>
+                  </a:lnRef>
+                  <a:fillRef idx="1">
+                    <a:schemeClr val="accent1"/>
+                  </a:fillRef>
+                  <a:effectRef idx="0">
+                    <a:schemeClr val="accent1"/>
+                  </a:effectRef>
+                  <a:fontRef idx="minor">
+                    <a:schemeClr val="lt1"/>
+                  </a:fontRef>
+                </p:style>
+                <p:txBody>
+                  <a:bodyPr rtlCol="0" anchor="ctr"/>
+                  <a:lstStyle/>
+                  <a:p>
+                    <a:pPr algn="ctr"/>
+                    <a:endParaRPr lang="en-GB" dirty="0"/>
+                  </a:p>
+                </p:txBody>
+              </p:sp>
+              <p:sp>
+                <p:nvSpPr>
+                  <p:cNvPr id="124" name="Rectangle 123">
+                    <a:extLst>
+                      <a:ext uri="{FF2B5EF4-FFF2-40B4-BE49-F238E27FC236}">
+                        <a16:creationId xmlns:a16="http://schemas.microsoft.com/office/drawing/2014/main" id="{155B5671-C827-F9E5-F30C-69835FEE8094}"/>
+                      </a:ext>
+                    </a:extLst>
+                  </p:cNvPr>
+                  <p:cNvSpPr>
+                    <a:spLocks noChangeAspect="1"/>
+                  </p:cNvSpPr>
+                  <p:nvPr/>
+                </p:nvSpPr>
+                <p:spPr>
+                  <a:xfrm>
+                    <a:off x="1512409" y="512904"/>
+                    <a:ext cx="224780" cy="224780"/>
+                  </a:xfrm>
+                  <a:prstGeom prst="rect">
+                    <a:avLst/>
+                  </a:prstGeom>
+                  <a:grpFill/>
+                  <a:ln>
+                    <a:noFill/>
+                  </a:ln>
+                </p:spPr>
+                <p:style>
+                  <a:lnRef idx="2">
+                    <a:schemeClr val="accent1">
+                      <a:shade val="15000"/>
+                    </a:schemeClr>
+                  </a:lnRef>
+                  <a:fillRef idx="1">
+                    <a:schemeClr val="accent1"/>
+                  </a:fillRef>
+                  <a:effectRef idx="0">
+                    <a:schemeClr val="accent1"/>
+                  </a:effectRef>
+                  <a:fontRef idx="minor">
+                    <a:schemeClr val="lt1"/>
+                  </a:fontRef>
+                </p:style>
+                <p:txBody>
+                  <a:bodyPr rtlCol="0" anchor="ctr"/>
+                  <a:lstStyle/>
+                  <a:p>
+                    <a:pPr algn="ctr"/>
+                    <a:endParaRPr lang="en-GB" dirty="0"/>
+                  </a:p>
+                </p:txBody>
+              </p:sp>
+            </p:grpSp>
+          </p:grpSp>
+          <p:grpSp>
+            <p:nvGrpSpPr>
+              <p:cNvPr id="146" name="Group 145">
+                <a:extLst>
+                  <a:ext uri="{FF2B5EF4-FFF2-40B4-BE49-F238E27FC236}">
+                    <a16:creationId xmlns:a16="http://schemas.microsoft.com/office/drawing/2014/main" id="{D1488C60-E6C8-AA57-5394-3C36F48E0162}"/>
+                  </a:ext>
+                </a:extLst>
+              </p:cNvPr>
+              <p:cNvGrpSpPr/>
+              <p:nvPr/>
+            </p:nvGrpSpPr>
+            <p:grpSpPr>
+              <a:xfrm>
+                <a:off x="858919" y="744535"/>
+                <a:ext cx="1095994" cy="1098828"/>
+                <a:chOff x="846219" y="741360"/>
+                <a:chExt cx="1095994" cy="1098828"/>
+              </a:xfrm>
+            </p:grpSpPr>
+            <p:grpSp>
+              <p:nvGrpSpPr>
+                <p:cNvPr id="126" name="Group 125">
+                  <a:extLst>
+                    <a:ext uri="{FF2B5EF4-FFF2-40B4-BE49-F238E27FC236}">
+                      <a16:creationId xmlns:a16="http://schemas.microsoft.com/office/drawing/2014/main" id="{A9DA8524-ABD2-A56A-18DB-23BC07C5AD5C}"/>
+                    </a:ext>
+                  </a:extLst>
+                </p:cNvPr>
+                <p:cNvGrpSpPr>
+                  <a:grpSpLocks noChangeAspect="1"/>
+                </p:cNvGrpSpPr>
+                <p:nvPr/>
+              </p:nvGrpSpPr>
+              <p:grpSpPr>
+                <a:xfrm>
+                  <a:off x="1067413" y="741360"/>
+                  <a:ext cx="874800" cy="874800"/>
+                  <a:chOff x="1512409" y="288124"/>
+                  <a:chExt cx="895100" cy="899120"/>
+                </a:xfrm>
+                <a:solidFill>
+                  <a:srgbClr val="D39603"/>
+                </a:solidFill>
+              </p:grpSpPr>
+              <p:sp>
+                <p:nvSpPr>
+                  <p:cNvPr id="127" name="Rectangle 126">
+                    <a:extLst>
+                      <a:ext uri="{FF2B5EF4-FFF2-40B4-BE49-F238E27FC236}">
+                        <a16:creationId xmlns:a16="http://schemas.microsoft.com/office/drawing/2014/main" id="{1687D181-A7EF-28BB-55DA-7C9454E29D91}"/>
+                      </a:ext>
+                    </a:extLst>
+                  </p:cNvPr>
+                  <p:cNvSpPr>
+                    <a:spLocks noChangeAspect="1"/>
+                  </p:cNvSpPr>
+                  <p:nvPr/>
+                </p:nvSpPr>
+                <p:spPr>
+                  <a:xfrm>
+                    <a:off x="2182729" y="737684"/>
+                    <a:ext cx="224780" cy="224780"/>
+                  </a:xfrm>
+                  <a:prstGeom prst="rect">
+                    <a:avLst/>
+                  </a:prstGeom>
+                  <a:grpFill/>
+                  <a:ln>
+                    <a:noFill/>
+                  </a:ln>
+                </p:spPr>
+                <p:style>
+                  <a:lnRef idx="2">
+                    <a:schemeClr val="accent1">
+                      <a:shade val="15000"/>
+                    </a:schemeClr>
+                  </a:lnRef>
+                  <a:fillRef idx="1">
+                    <a:schemeClr val="accent1"/>
+                  </a:fillRef>
+                  <a:effectRef idx="0">
+                    <a:schemeClr val="accent1"/>
+                  </a:effectRef>
+                  <a:fontRef idx="minor">
+                    <a:schemeClr val="lt1"/>
+                  </a:fontRef>
+                </p:style>
+                <p:txBody>
+                  <a:bodyPr rtlCol="0" anchor="ctr"/>
+                  <a:lstStyle/>
+                  <a:p>
+                    <a:pPr algn="ctr"/>
+                    <a:endParaRPr lang="en-GB" dirty="0"/>
+                  </a:p>
+                </p:txBody>
+              </p:sp>
+              <p:sp>
+                <p:nvSpPr>
+                  <p:cNvPr id="128" name="Rectangle 127">
+                    <a:extLst>
+                      <a:ext uri="{FF2B5EF4-FFF2-40B4-BE49-F238E27FC236}">
+                        <a16:creationId xmlns:a16="http://schemas.microsoft.com/office/drawing/2014/main" id="{FB74C51C-7DEB-AFE9-9B6E-3F2E7CF7D517}"/>
+                      </a:ext>
+                    </a:extLst>
+                  </p:cNvPr>
+                  <p:cNvSpPr>
+                    <a:spLocks noChangeAspect="1"/>
+                  </p:cNvSpPr>
+                  <p:nvPr/>
+                </p:nvSpPr>
+                <p:spPr>
+                  <a:xfrm>
+                    <a:off x="1956364" y="512904"/>
+                    <a:ext cx="224780" cy="224780"/>
+                  </a:xfrm>
+                  <a:prstGeom prst="rect">
+                    <a:avLst/>
+                  </a:prstGeom>
+                  <a:grpFill/>
+                  <a:ln>
+                    <a:noFill/>
+                  </a:ln>
+                </p:spPr>
+                <p:style>
+                  <a:lnRef idx="2">
+                    <a:schemeClr val="accent1">
+                      <a:shade val="15000"/>
+                    </a:schemeClr>
+                  </a:lnRef>
+                  <a:fillRef idx="1">
+                    <a:schemeClr val="accent1"/>
+                  </a:fillRef>
+                  <a:effectRef idx="0">
+                    <a:schemeClr val="accent1"/>
+                  </a:effectRef>
+                  <a:fontRef idx="minor">
+                    <a:schemeClr val="lt1"/>
+                  </a:fontRef>
+                </p:style>
+                <p:txBody>
+                  <a:bodyPr rtlCol="0" anchor="ctr"/>
+                  <a:lstStyle/>
+                  <a:p>
+                    <a:pPr algn="ctr"/>
+                    <a:endParaRPr lang="en-GB" dirty="0"/>
+                  </a:p>
+                </p:txBody>
+              </p:sp>
+              <p:sp>
+                <p:nvSpPr>
+                  <p:cNvPr id="129" name="Rectangle 128">
+                    <a:extLst>
+                      <a:ext uri="{FF2B5EF4-FFF2-40B4-BE49-F238E27FC236}">
+                        <a16:creationId xmlns:a16="http://schemas.microsoft.com/office/drawing/2014/main" id="{9CB88386-1385-E73F-FEAE-FF9BE2FAF191}"/>
+                      </a:ext>
+                    </a:extLst>
+                  </p:cNvPr>
+                  <p:cNvSpPr>
+                    <a:spLocks noChangeAspect="1"/>
+                  </p:cNvSpPr>
+                  <p:nvPr/>
+                </p:nvSpPr>
+                <p:spPr>
+                  <a:xfrm>
+                    <a:off x="1733849" y="288124"/>
+                    <a:ext cx="224780" cy="224780"/>
+                  </a:xfrm>
+                  <a:prstGeom prst="rect">
+                    <a:avLst/>
+                  </a:prstGeom>
+                  <a:grpFill/>
+                  <a:ln>
+                    <a:noFill/>
+                  </a:ln>
+                </p:spPr>
+                <p:style>
+                  <a:lnRef idx="2">
+                    <a:schemeClr val="accent1">
+                      <a:shade val="15000"/>
+                    </a:schemeClr>
+                  </a:lnRef>
+                  <a:fillRef idx="1">
+                    <a:schemeClr val="accent1"/>
+                  </a:fillRef>
+                  <a:effectRef idx="0">
+                    <a:schemeClr val="accent1"/>
+                  </a:effectRef>
+                  <a:fontRef idx="minor">
+                    <a:schemeClr val="lt1"/>
+                  </a:fontRef>
+                </p:style>
+                <p:txBody>
+                  <a:bodyPr rtlCol="0" anchor="ctr"/>
+                  <a:lstStyle/>
+                  <a:p>
+                    <a:pPr algn="ctr"/>
+                    <a:endParaRPr lang="en-GB" dirty="0"/>
+                  </a:p>
+                </p:txBody>
+              </p:sp>
+              <p:sp>
+                <p:nvSpPr>
+                  <p:cNvPr id="130" name="Rectangle 129">
+                    <a:extLst>
+                      <a:ext uri="{FF2B5EF4-FFF2-40B4-BE49-F238E27FC236}">
+                        <a16:creationId xmlns:a16="http://schemas.microsoft.com/office/drawing/2014/main" id="{609DEF8A-48BF-1590-6922-06586ECD3F48}"/>
+                      </a:ext>
+                    </a:extLst>
+                  </p:cNvPr>
+                  <p:cNvSpPr>
+                    <a:spLocks noChangeAspect="1"/>
+                  </p:cNvSpPr>
+                  <p:nvPr/>
+                </p:nvSpPr>
+                <p:spPr>
+                  <a:xfrm>
+                    <a:off x="1961289" y="962464"/>
+                    <a:ext cx="224780" cy="224780"/>
+                  </a:xfrm>
+                  <a:prstGeom prst="rect">
+                    <a:avLst/>
+                  </a:prstGeom>
+                  <a:grpFill/>
+                  <a:ln>
+                    <a:noFill/>
+                  </a:ln>
+                </p:spPr>
+                <p:style>
+                  <a:lnRef idx="2">
+                    <a:schemeClr val="accent1">
+                      <a:shade val="15000"/>
+                    </a:schemeClr>
+                  </a:lnRef>
+                  <a:fillRef idx="1">
+                    <a:schemeClr val="accent1"/>
+                  </a:fillRef>
+                  <a:effectRef idx="0">
+                    <a:schemeClr val="accent1"/>
+                  </a:effectRef>
+                  <a:fontRef idx="minor">
+                    <a:schemeClr val="lt1"/>
+                  </a:fontRef>
+                </p:style>
+                <p:txBody>
+                  <a:bodyPr rtlCol="0" anchor="ctr"/>
+                  <a:lstStyle/>
+                  <a:p>
+                    <a:pPr algn="ctr"/>
+                    <a:endParaRPr lang="en-GB" dirty="0"/>
+                  </a:p>
+                </p:txBody>
+              </p:sp>
+              <p:sp>
+                <p:nvSpPr>
+                  <p:cNvPr id="131" name="Rectangle 130">
+                    <a:extLst>
+                      <a:ext uri="{FF2B5EF4-FFF2-40B4-BE49-F238E27FC236}">
+                        <a16:creationId xmlns:a16="http://schemas.microsoft.com/office/drawing/2014/main" id="{009210BB-A2C4-4262-D7F6-155E8AB38708}"/>
+                      </a:ext>
+                    </a:extLst>
+                  </p:cNvPr>
+                  <p:cNvSpPr>
+                    <a:spLocks noChangeAspect="1"/>
+                  </p:cNvSpPr>
+                  <p:nvPr/>
+                </p:nvSpPr>
+                <p:spPr>
+                  <a:xfrm>
+                    <a:off x="1734924" y="737684"/>
+                    <a:ext cx="224780" cy="224780"/>
+                  </a:xfrm>
+                  <a:prstGeom prst="rect">
+                    <a:avLst/>
+                  </a:prstGeom>
+                  <a:grpFill/>
+                  <a:ln>
+                    <a:noFill/>
+                  </a:ln>
+                </p:spPr>
+                <p:style>
+                  <a:lnRef idx="2">
+                    <a:schemeClr val="accent1">
+                      <a:shade val="15000"/>
+                    </a:schemeClr>
+                  </a:lnRef>
+                  <a:fillRef idx="1">
+                    <a:schemeClr val="accent1"/>
+                  </a:fillRef>
+                  <a:effectRef idx="0">
+                    <a:schemeClr val="accent1"/>
+                  </a:effectRef>
+                  <a:fontRef idx="minor">
+                    <a:schemeClr val="lt1"/>
+                  </a:fontRef>
+                </p:style>
+                <p:txBody>
+                  <a:bodyPr rtlCol="0" anchor="ctr"/>
+                  <a:lstStyle/>
+                  <a:p>
+                    <a:pPr algn="ctr"/>
+                    <a:endParaRPr lang="en-GB" dirty="0"/>
+                  </a:p>
+                </p:txBody>
+              </p:sp>
+              <p:sp>
+                <p:nvSpPr>
+                  <p:cNvPr id="132" name="Rectangle 131">
+                    <a:extLst>
+                      <a:ext uri="{FF2B5EF4-FFF2-40B4-BE49-F238E27FC236}">
+                        <a16:creationId xmlns:a16="http://schemas.microsoft.com/office/drawing/2014/main" id="{71BE132F-496D-5466-3645-02CE64819EEE}"/>
+                      </a:ext>
+                    </a:extLst>
+                  </p:cNvPr>
+                  <p:cNvSpPr>
+                    <a:spLocks noChangeAspect="1"/>
+                  </p:cNvSpPr>
+                  <p:nvPr/>
+                </p:nvSpPr>
+                <p:spPr>
+                  <a:xfrm>
+                    <a:off x="1512409" y="512904"/>
+                    <a:ext cx="224780" cy="224780"/>
+                  </a:xfrm>
+                  <a:prstGeom prst="rect">
+                    <a:avLst/>
+                  </a:prstGeom>
+                  <a:grpFill/>
+                  <a:ln>
+                    <a:noFill/>
+                  </a:ln>
+                </p:spPr>
+                <p:style>
+                  <a:lnRef idx="2">
+                    <a:schemeClr val="accent1">
+                      <a:shade val="15000"/>
+                    </a:schemeClr>
+                  </a:lnRef>
+                  <a:fillRef idx="1">
+                    <a:schemeClr val="accent1"/>
+                  </a:fillRef>
+                  <a:effectRef idx="0">
+                    <a:schemeClr val="accent1"/>
+                  </a:effectRef>
+                  <a:fontRef idx="minor">
+                    <a:schemeClr val="lt1"/>
+                  </a:fontRef>
+                </p:style>
+                <p:txBody>
+                  <a:bodyPr rtlCol="0" anchor="ctr"/>
+                  <a:lstStyle/>
+                  <a:p>
+                    <a:pPr algn="ctr"/>
+                    <a:endParaRPr lang="en-GB" dirty="0"/>
+                  </a:p>
+                </p:txBody>
+              </p:sp>
+            </p:grpSp>
+            <p:grpSp>
+              <p:nvGrpSpPr>
+                <p:cNvPr id="143" name="Group 142">
+                  <a:extLst>
+                    <a:ext uri="{FF2B5EF4-FFF2-40B4-BE49-F238E27FC236}">
+                      <a16:creationId xmlns:a16="http://schemas.microsoft.com/office/drawing/2014/main" id="{E15BACE6-5525-5F8F-552E-543C830649B7}"/>
+                    </a:ext>
+                  </a:extLst>
+                </p:cNvPr>
+                <p:cNvGrpSpPr/>
+                <p:nvPr/>
+              </p:nvGrpSpPr>
+              <p:grpSpPr>
+                <a:xfrm>
+                  <a:off x="846219" y="1173277"/>
+                  <a:ext cx="662765" cy="666911"/>
+                  <a:chOff x="1886249" y="440524"/>
+                  <a:chExt cx="673660" cy="674340"/>
+                </a:xfrm>
+                <a:solidFill>
+                  <a:srgbClr val="D39603"/>
+                </a:solidFill>
+              </p:grpSpPr>
+              <p:sp>
+                <p:nvSpPr>
+                  <p:cNvPr id="140" name="Rectangle 139">
+                    <a:extLst>
+                      <a:ext uri="{FF2B5EF4-FFF2-40B4-BE49-F238E27FC236}">
+                        <a16:creationId xmlns:a16="http://schemas.microsoft.com/office/drawing/2014/main" id="{6378BA66-48F7-22DE-79B7-36F8DFEFBDBD}"/>
+                      </a:ext>
+                    </a:extLst>
+                  </p:cNvPr>
+                  <p:cNvSpPr>
+                    <a:spLocks noChangeAspect="1"/>
+                  </p:cNvSpPr>
+                  <p:nvPr/>
+                </p:nvSpPr>
+                <p:spPr>
+                  <a:xfrm>
+                    <a:off x="2335129" y="890084"/>
+                    <a:ext cx="224780" cy="224780"/>
+                  </a:xfrm>
+                  <a:prstGeom prst="rect">
+                    <a:avLst/>
+                  </a:prstGeom>
+                  <a:grpFill/>
+                  <a:ln>
+                    <a:noFill/>
+                  </a:ln>
+                </p:spPr>
+                <p:style>
+                  <a:lnRef idx="2">
+                    <a:schemeClr val="accent1">
+                      <a:shade val="15000"/>
+                    </a:schemeClr>
+                  </a:lnRef>
+                  <a:fillRef idx="1">
+                    <a:schemeClr val="accent1"/>
+                  </a:fillRef>
+                  <a:effectRef idx="0">
+                    <a:schemeClr val="accent1"/>
+                  </a:effectRef>
+                  <a:fontRef idx="minor">
+                    <a:schemeClr val="lt1"/>
+                  </a:fontRef>
+                </p:style>
+                <p:txBody>
+                  <a:bodyPr rtlCol="0" anchor="ctr"/>
+                  <a:lstStyle/>
+                  <a:p>
+                    <a:pPr algn="ctr"/>
+                    <a:endParaRPr lang="en-GB" dirty="0"/>
+                  </a:p>
+                </p:txBody>
+              </p:sp>
+              <p:sp>
+                <p:nvSpPr>
+                  <p:cNvPr id="141" name="Rectangle 140">
+                    <a:extLst>
+                      <a:ext uri="{FF2B5EF4-FFF2-40B4-BE49-F238E27FC236}">
+                        <a16:creationId xmlns:a16="http://schemas.microsoft.com/office/drawing/2014/main" id="{73B05770-06A2-E6F0-AF59-F6FC7A19B0A1}"/>
+                      </a:ext>
+                    </a:extLst>
+                  </p:cNvPr>
+                  <p:cNvSpPr>
+                    <a:spLocks noChangeAspect="1"/>
+                  </p:cNvSpPr>
+                  <p:nvPr/>
+                </p:nvSpPr>
+                <p:spPr>
+                  <a:xfrm>
+                    <a:off x="2108764" y="665304"/>
+                    <a:ext cx="224780" cy="224780"/>
+                  </a:xfrm>
+                  <a:prstGeom prst="rect">
+                    <a:avLst/>
+                  </a:prstGeom>
+                  <a:grpFill/>
+                  <a:ln>
+                    <a:noFill/>
+                  </a:ln>
+                </p:spPr>
+                <p:style>
+                  <a:lnRef idx="2">
+                    <a:schemeClr val="accent1">
+                      <a:shade val="15000"/>
+                    </a:schemeClr>
+                  </a:lnRef>
+                  <a:fillRef idx="1">
+                    <a:schemeClr val="accent1"/>
+                  </a:fillRef>
+                  <a:effectRef idx="0">
+                    <a:schemeClr val="accent1"/>
+                  </a:effectRef>
+                  <a:fontRef idx="minor">
+                    <a:schemeClr val="lt1"/>
+                  </a:fontRef>
+                </p:style>
+                <p:txBody>
+                  <a:bodyPr rtlCol="0" anchor="ctr"/>
+                  <a:lstStyle/>
+                  <a:p>
+                    <a:pPr algn="ctr"/>
+                    <a:endParaRPr lang="en-GB" dirty="0"/>
+                  </a:p>
+                </p:txBody>
+              </p:sp>
+              <p:sp>
+                <p:nvSpPr>
+                  <p:cNvPr id="142" name="Rectangle 141">
+                    <a:extLst>
+                      <a:ext uri="{FF2B5EF4-FFF2-40B4-BE49-F238E27FC236}">
+                        <a16:creationId xmlns:a16="http://schemas.microsoft.com/office/drawing/2014/main" id="{2FE01590-6407-2F5E-2D76-CFE67423CFE0}"/>
+                      </a:ext>
+                    </a:extLst>
+                  </p:cNvPr>
+                  <p:cNvSpPr>
+                    <a:spLocks noChangeAspect="1"/>
+                  </p:cNvSpPr>
+                  <p:nvPr/>
+                </p:nvSpPr>
+                <p:spPr>
+                  <a:xfrm>
+                    <a:off x="1886249" y="440524"/>
+                    <a:ext cx="224780" cy="224780"/>
+                  </a:xfrm>
+                  <a:prstGeom prst="rect">
+                    <a:avLst/>
+                  </a:prstGeom>
+                  <a:grpFill/>
+                  <a:ln>
+                    <a:noFill/>
+                  </a:ln>
+                </p:spPr>
+                <p:style>
+                  <a:lnRef idx="2">
+                    <a:schemeClr val="accent1">
+                      <a:shade val="15000"/>
+                    </a:schemeClr>
+                  </a:lnRef>
+                  <a:fillRef idx="1">
+                    <a:schemeClr val="accent1"/>
+                  </a:fillRef>
+                  <a:effectRef idx="0">
+                    <a:schemeClr val="accent1"/>
+                  </a:effectRef>
+                  <a:fontRef idx="minor">
+                    <a:schemeClr val="lt1"/>
+                  </a:fontRef>
+                </p:style>
+                <p:txBody>
+                  <a:bodyPr rtlCol="0" anchor="ctr"/>
+                  <a:lstStyle/>
+                  <a:p>
+                    <a:pPr algn="ctr"/>
+                    <a:endParaRPr lang="en-GB" dirty="0"/>
+                  </a:p>
+                </p:txBody>
+              </p:sp>
+            </p:grpSp>
+          </p:grpSp>
+          <p:pic>
+            <p:nvPicPr>
+              <p:cNvPr id="35" name="Picture 34" descr="A black background with a black square&#10;&#10;Description automatically generated with medium confidence">
+                <a:extLst>
+                  <a:ext uri="{FF2B5EF4-FFF2-40B4-BE49-F238E27FC236}">
+                    <a16:creationId xmlns:a16="http://schemas.microsoft.com/office/drawing/2014/main" id="{851547CB-C306-049E-29DF-8F488DD24392}"/>
+                  </a:ext>
+                </a:extLst>
+              </p:cNvPr>
+              <p:cNvPicPr>
+                <a:picLocks noChangeAspect="1"/>
+              </p:cNvPicPr>
+              <p:nvPr/>
+            </p:nvPicPr>
+            <p:blipFill>
+              <a:blip r:embed="rId7">
+                <a:extLst>
+                  <a:ext uri="{28A0092B-C50C-407E-A947-70E740481C1C}">
+                    <a14:useLocalDpi xmlns:a14="http://schemas.microsoft.com/office/drawing/2010/main" val="0"/>
+                  </a:ext>
+                </a:extLst>
+              </a:blip>
+              <a:stretch>
+                <a:fillRect/>
+              </a:stretch>
+            </p:blipFill>
+            <p:spPr>
+              <a:xfrm>
+                <a:off x="125924" y="1186826"/>
+                <a:ext cx="1391976" cy="1391976"/>
+              </a:xfrm>
+              <a:prstGeom prst="rect">
+                <a:avLst/>
+              </a:prstGeom>
+            </p:spPr>
+          </p:pic>
+        </p:grpSp>
+        <p:pic>
+          <p:nvPicPr>
+            <p:cNvPr id="45" name="Picture 44" descr="A black background with a black square&#10;&#10;Description automatically generated with medium confidence">
+              <a:extLst>
+                <a:ext uri="{FF2B5EF4-FFF2-40B4-BE49-F238E27FC236}">
+                  <a16:creationId xmlns:a16="http://schemas.microsoft.com/office/drawing/2014/main" id="{CF72700A-21C1-5D1D-20A1-0A2C8E8A5E10}"/>
+                </a:ext>
+              </a:extLst>
+            </p:cNvPr>
+            <p:cNvPicPr>
+              <a:picLocks noChangeAspect="1"/>
+            </p:cNvPicPr>
+            <p:nvPr/>
+          </p:nvPicPr>
+          <p:blipFill>
+            <a:blip r:embed="rId8">
+              <a:extLst>
+                <a:ext uri="{BEBA8EAE-BF5A-486C-A8C5-ECC9F3942E4B}">
+                  <a14:imgProps xmlns:a14="http://schemas.microsoft.com/office/drawing/2010/main">
+                    <a14:imgLayer r:embed="rId9">
+                      <a14:imgEffect>
+                        <a14:artisticMarker/>
+                      </a14:imgEffect>
+                      <a14:imgEffect>
+                        <a14:brightnessContrast bright="-40000" contrast="-40000"/>
+                      </a14:imgEffect>
+                    </a14:imgLayer>
+                  </a14:imgProps>
+                </a:ext>
+                <a:ext uri="{28A0092B-C50C-407E-A947-70E740481C1C}">
+                  <a14:useLocalDpi xmlns:a14="http://schemas.microsoft.com/office/drawing/2010/main" val="0"/>
+                </a:ext>
+              </a:extLst>
+            </a:blip>
+            <a:srcRect/>
+            <a:stretch>
+              <a:fillRect/>
+            </a:stretch>
+          </p:blipFill>
+          <p:spPr>
+            <a:xfrm>
+              <a:off x="125924" y="-202865"/>
+              <a:ext cx="2777656" cy="2777657"/>
+            </a:xfrm>
+            <a:custGeom>
+              <a:avLst/>
+              <a:gdLst>
+                <a:gd name="connsiteX0" fmla="*/ 714955 w 2492750"/>
+                <a:gd name="connsiteY0" fmla="*/ 1320422 h 2492750"/>
+                <a:gd name="connsiteX1" fmla="*/ 440282 w 2492750"/>
+                <a:gd name="connsiteY1" fmla="*/ 1595095 h 2492750"/>
+                <a:gd name="connsiteX2" fmla="*/ 440282 w 2492750"/>
+                <a:gd name="connsiteY2" fmla="*/ 2054131 h 2492750"/>
+                <a:gd name="connsiteX3" fmla="*/ 899318 w 2492750"/>
+                <a:gd name="connsiteY3" fmla="*/ 2054131 h 2492750"/>
+                <a:gd name="connsiteX4" fmla="*/ 1173991 w 2492750"/>
+                <a:gd name="connsiteY4" fmla="*/ 1779459 h 2492750"/>
+                <a:gd name="connsiteX5" fmla="*/ 1671235 w 2492750"/>
+                <a:gd name="connsiteY5" fmla="*/ 367948 h 2492750"/>
+                <a:gd name="connsiteX6" fmla="*/ 752036 w 2492750"/>
+                <a:gd name="connsiteY6" fmla="*/ 1287147 h 2492750"/>
+                <a:gd name="connsiteX7" fmla="*/ 1211072 w 2492750"/>
+                <a:gd name="connsiteY7" fmla="*/ 1746183 h 2492750"/>
+                <a:gd name="connsiteX8" fmla="*/ 2130271 w 2492750"/>
+                <a:gd name="connsiteY8" fmla="*/ 826984 h 2492750"/>
+                <a:gd name="connsiteX9" fmla="*/ 2130271 w 2492750"/>
+                <a:gd name="connsiteY9" fmla="*/ 367949 h 2492750"/>
+                <a:gd name="connsiteX10" fmla="*/ 0 w 2492750"/>
+                <a:gd name="connsiteY10" fmla="*/ 0 h 2492750"/>
+                <a:gd name="connsiteX11" fmla="*/ 2492750 w 2492750"/>
+                <a:gd name="connsiteY11" fmla="*/ 0 h 2492750"/>
+                <a:gd name="connsiteX12" fmla="*/ 2492750 w 2492750"/>
+                <a:gd name="connsiteY12" fmla="*/ 2492750 h 2492750"/>
+                <a:gd name="connsiteX13" fmla="*/ 0 w 2492750"/>
+                <a:gd name="connsiteY13" fmla="*/ 2492750 h 2492750"/>
+              </a:gdLst>
+              <a:ahLst/>
+              <a:cxnLst>
+                <a:cxn ang="0">
+                  <a:pos x="connsiteX0" y="connsiteY0"/>
+                </a:cxn>
+                <a:cxn ang="0">
+                  <a:pos x="connsiteX1" y="connsiteY1"/>
+                </a:cxn>
+                <a:cxn ang="0">
+                  <a:pos x="connsiteX2" y="connsiteY2"/>
+                </a:cxn>
+                <a:cxn ang="0">
+                  <a:pos x="connsiteX3" y="connsiteY3"/>
+                </a:cxn>
+                <a:cxn ang="0">
+                  <a:pos x="connsiteX4" y="connsiteY4"/>
+                </a:cxn>
+                <a:cxn ang="0">
+                  <a:pos x="connsiteX5" y="connsiteY5"/>
+                </a:cxn>
+                <a:cxn ang="0">
+                  <a:pos x="connsiteX6" y="connsiteY6"/>
+                </a:cxn>
+                <a:cxn ang="0">
+                  <a:pos x="connsiteX7" y="connsiteY7"/>
+                </a:cxn>
+                <a:cxn ang="0">
+                  <a:pos x="connsiteX8" y="connsiteY8"/>
+                </a:cxn>
+                <a:cxn ang="0">
+                  <a:pos x="connsiteX9" y="connsiteY9"/>
+                </a:cxn>
+                <a:cxn ang="0">
+                  <a:pos x="connsiteX10" y="connsiteY10"/>
+                </a:cxn>
+                <a:cxn ang="0">
+                  <a:pos x="connsiteX11" y="connsiteY11"/>
+                </a:cxn>
+                <a:cxn ang="0">
+                  <a:pos x="connsiteX12" y="connsiteY12"/>
+                </a:cxn>
+                <a:cxn ang="0">
+                  <a:pos x="connsiteX13" y="connsiteY13"/>
+                </a:cxn>
+              </a:cxnLst>
+              <a:rect l="l" t="t" r="r" b="b"/>
+              <a:pathLst>
+                <a:path w="2492750" h="2492750">
+                  <a:moveTo>
+                    <a:pt x="714955" y="1320422"/>
+                  </a:moveTo>
+                  <a:lnTo>
+                    <a:pt x="440282" y="1595095"/>
+                  </a:lnTo>
+                  <a:lnTo>
+                    <a:pt x="440282" y="2054131"/>
+                  </a:lnTo>
+                  <a:lnTo>
+                    <a:pt x="899318" y="2054131"/>
+                  </a:lnTo>
+                  <a:lnTo>
+                    <a:pt x="1173991" y="1779459"/>
+                  </a:lnTo>
+                  <a:close/>
+                  <a:moveTo>
+                    <a:pt x="1671235" y="367948"/>
+                  </a:moveTo>
+                  <a:lnTo>
+                    <a:pt x="752036" y="1287147"/>
+                  </a:lnTo>
+                  <a:lnTo>
+                    <a:pt x="1211072" y="1746183"/>
+                  </a:lnTo>
+                  <a:lnTo>
+                    <a:pt x="2130271" y="826984"/>
+                  </a:lnTo>
+                  <a:lnTo>
+                    <a:pt x="2130271" y="367949"/>
+                  </a:lnTo>
+                  <a:close/>
+                  <a:moveTo>
+                    <a:pt x="0" y="0"/>
+                  </a:moveTo>
+                  <a:lnTo>
+                    <a:pt x="2492750" y="0"/>
+                  </a:lnTo>
+                  <a:lnTo>
+                    <a:pt x="2492750" y="2492750"/>
+                  </a:lnTo>
+                  <a:lnTo>
+                    <a:pt x="0" y="2492750"/>
+                  </a:lnTo>
+                  <a:close/>
+                </a:path>
+              </a:pathLst>
+            </a:custGeom>
+          </p:spPr>
+        </p:pic>
+      </p:grpSp>
+      <p:pic>
+        <p:nvPicPr>
+          <p:cNvPr id="6" name="Picture 5" descr="A black background with a black square&#10;&#10;Description automatically generated with medium confidence">
+            <a:extLst>
+              <a:ext uri="{FF2B5EF4-FFF2-40B4-BE49-F238E27FC236}">
+                <a16:creationId xmlns:a16="http://schemas.microsoft.com/office/drawing/2014/main" id="{883AFFE7-0297-6C9A-E31C-86EC369B77B6}"/>
+              </a:ext>
+            </a:extLst>
+          </p:cNvPr>
+          <p:cNvPicPr>
+            <a:picLocks noChangeAspect="1"/>
+          </p:cNvPicPr>
+          <p:nvPr/>
+        </p:nvPicPr>
+        <p:blipFill>
+          <a:blip r:embed="rId10">
+            <a:extLst>
+              <a:ext uri="{28A0092B-C50C-407E-A947-70E740481C1C}">
+                <a14:useLocalDpi xmlns:a14="http://schemas.microsoft.com/office/drawing/2010/main" val="0"/>
+              </a:ext>
+            </a:extLst>
+          </a:blip>
+          <a:srcRect/>
+          <a:stretch>
+            <a:fillRect/>
+          </a:stretch>
+        </p:blipFill>
+        <p:spPr>
+          <a:xfrm>
+            <a:off x="675157" y="3955874"/>
+            <a:ext cx="2777656" cy="2777657"/>
+          </a:xfrm>
+          <a:custGeom>
+            <a:avLst/>
+            <a:gdLst>
+              <a:gd name="connsiteX0" fmla="*/ 419770 w 2777656"/>
+              <a:gd name="connsiteY0" fmla="*/ 404553 h 2777657"/>
+              <a:gd name="connsiteX1" fmla="*/ 419770 w 2777656"/>
+              <a:gd name="connsiteY1" fmla="*/ 2373105 h 2777657"/>
+              <a:gd name="connsiteX2" fmla="*/ 1405920 w 2777656"/>
+              <a:gd name="connsiteY2" fmla="*/ 2373105 h 2777657"/>
+              <a:gd name="connsiteX3" fmla="*/ 1405920 w 2777656"/>
+              <a:gd name="connsiteY3" fmla="*/ 404553 h 2777657"/>
+              <a:gd name="connsiteX4" fmla="*/ 0 w 2777656"/>
+              <a:gd name="connsiteY4" fmla="*/ 0 h 2777657"/>
+              <a:gd name="connsiteX5" fmla="*/ 2777656 w 2777656"/>
+              <a:gd name="connsiteY5" fmla="*/ 0 h 2777657"/>
+              <a:gd name="connsiteX6" fmla="*/ 2777656 w 2777656"/>
+              <a:gd name="connsiteY6" fmla="*/ 2777657 h 2777657"/>
+              <a:gd name="connsiteX7" fmla="*/ 0 w 2777656"/>
+              <a:gd name="connsiteY7" fmla="*/ 2777657 h 2777657"/>
+            </a:gdLst>
+            <a:ahLst/>
+            <a:cxnLst>
+              <a:cxn ang="0">
+                <a:pos x="connsiteX0" y="connsiteY0"/>
+              </a:cxn>
+              <a:cxn ang="0">
+                <a:pos x="connsiteX1" y="connsiteY1"/>
+              </a:cxn>
+              <a:cxn ang="0">
+                <a:pos x="connsiteX2" y="connsiteY2"/>
+              </a:cxn>
+              <a:cxn ang="0">
+                <a:pos x="connsiteX3" y="connsiteY3"/>
+              </a:cxn>
+              <a:cxn ang="0">
+                <a:pos x="connsiteX4" y="connsiteY4"/>
+              </a:cxn>
+              <a:cxn ang="0">
+                <a:pos x="connsiteX5" y="connsiteY5"/>
+              </a:cxn>
+              <a:cxn ang="0">
+                <a:pos x="connsiteX6" y="connsiteY6"/>
+              </a:cxn>
+              <a:cxn ang="0">
+                <a:pos x="connsiteX7" y="connsiteY7"/>
+              </a:cxn>
+            </a:cxnLst>
+            <a:rect l="l" t="t" r="r" b="b"/>
+            <a:pathLst>
+              <a:path w="2777656" h="2777657">
+                <a:moveTo>
+                  <a:pt x="419770" y="404553"/>
+                </a:moveTo>
+                <a:lnTo>
+                  <a:pt x="419770" y="2373105"/>
+                </a:lnTo>
+                <a:lnTo>
+                  <a:pt x="1405920" y="2373105"/>
+                </a:lnTo>
+                <a:lnTo>
+                  <a:pt x="1405920" y="404553"/>
+                </a:lnTo>
+                <a:close/>
+                <a:moveTo>
+                  <a:pt x="0" y="0"/>
+                </a:moveTo>
+                <a:lnTo>
+                  <a:pt x="2777656" y="0"/>
+                </a:lnTo>
+                <a:lnTo>
+                  <a:pt x="2777656" y="2777657"/>
+                </a:lnTo>
+                <a:lnTo>
+                  <a:pt x="0" y="2777657"/>
+                </a:lnTo>
+                <a:close/>
+              </a:path>
+            </a:pathLst>
+          </a:custGeom>
+        </p:spPr>
+      </p:pic>
+      <p:pic>
+        <p:nvPicPr>
+          <p:cNvPr id="3" name="Picture 2" descr="A black background with a black square&#10;&#10;Description automatically generated with medium confidence">
+            <a:extLst>
+              <a:ext uri="{FF2B5EF4-FFF2-40B4-BE49-F238E27FC236}">
+                <a16:creationId xmlns:a16="http://schemas.microsoft.com/office/drawing/2014/main" id="{90897572-6C27-DB92-EEE1-3DAF8AA541A4}"/>
+              </a:ext>
+            </a:extLst>
+          </p:cNvPr>
+          <p:cNvPicPr>
+            <a:picLocks noChangeAspect="1"/>
+          </p:cNvPicPr>
+          <p:nvPr/>
+        </p:nvPicPr>
+        <p:blipFill>
+          <a:blip r:embed="rId7">
+            <a:extLst>
+              <a:ext uri="{28A0092B-C50C-407E-A947-70E740481C1C}">
+                <a14:useLocalDpi xmlns:a14="http://schemas.microsoft.com/office/drawing/2010/main" val="0"/>
+              </a:ext>
+            </a:extLst>
+          </a:blip>
+          <a:stretch>
+            <a:fillRect/>
+          </a:stretch>
+        </p:blipFill>
+        <p:spPr>
+          <a:xfrm rot="18900000">
+            <a:off x="879671" y="4514031"/>
+            <a:ext cx="1391976" cy="1391976"/>
+          </a:xfrm>
+          <a:prstGeom prst="rect">
+            <a:avLst/>
+          </a:prstGeom>
+        </p:spPr>
+      </p:pic>
+      <p:grpSp>
+        <p:nvGrpSpPr>
+          <p:cNvPr id="16" name="Group 15">
+            <a:extLst>
+              <a:ext uri="{FF2B5EF4-FFF2-40B4-BE49-F238E27FC236}">
+                <a16:creationId xmlns:a16="http://schemas.microsoft.com/office/drawing/2014/main" id="{83CA14BC-87D0-B69B-4F1E-5C110B6F0E63}"/>
+              </a:ext>
+            </a:extLst>
+          </p:cNvPr>
+          <p:cNvGrpSpPr/>
+          <p:nvPr/>
+        </p:nvGrpSpPr>
+        <p:grpSpPr>
+          <a:xfrm>
+            <a:off x="4265436" y="3343562"/>
+            <a:ext cx="2780571" cy="2780571"/>
+            <a:chOff x="4265436" y="3343562"/>
+            <a:chExt cx="2780571" cy="2780571"/>
+          </a:xfrm>
+        </p:grpSpPr>
+        <p:sp>
+          <p:nvSpPr>
+            <p:cNvPr id="15" name="Rectangle 14">
+              <a:extLst>
+                <a:ext uri="{FF2B5EF4-FFF2-40B4-BE49-F238E27FC236}">
+                  <a16:creationId xmlns:a16="http://schemas.microsoft.com/office/drawing/2014/main" id="{D7ED50D8-4E98-5C7F-810B-6530845D5173}"/>
+                </a:ext>
+              </a:extLst>
+            </p:cNvPr>
+            <p:cNvSpPr>
+              <a:spLocks noChangeAspect="1"/>
+            </p:cNvSpPr>
+            <p:nvPr/>
+          </p:nvSpPr>
+          <p:spPr>
+            <a:xfrm>
+              <a:off x="4265436" y="3343562"/>
+              <a:ext cx="2780571" cy="2780571"/>
+            </a:xfrm>
+            <a:prstGeom prst="rect">
+              <a:avLst/>
+            </a:prstGeom>
+            <a:solidFill>
+              <a:schemeClr val="accent1">
+                <a:alpha val="0"/>
+              </a:schemeClr>
+            </a:solidFill>
+            <a:ln>
+              <a:noFill/>
+            </a:ln>
+          </p:spPr>
+          <p:style>
+            <a:lnRef idx="2">
+              <a:schemeClr val="accent1">
+                <a:shade val="15000"/>
+              </a:schemeClr>
+            </a:lnRef>
+            <a:fillRef idx="1">
+              <a:schemeClr val="accent1"/>
+            </a:fillRef>
+            <a:effectRef idx="0">
+              <a:schemeClr val="accent1"/>
+            </a:effectRef>
+            <a:fontRef idx="minor">
+              <a:schemeClr val="lt1"/>
+            </a:fontRef>
+          </p:style>
+          <p:txBody>
+            <a:bodyPr rtlCol="0" anchor="ctr"/>
+            <a:lstStyle/>
+            <a:p>
+              <a:pPr algn="ctr"/>
+              <a:endParaRPr lang="en-GB" dirty="0"/>
+            </a:p>
+          </p:txBody>
+        </p:sp>
+        <p:pic>
+          <p:nvPicPr>
+            <p:cNvPr id="13" name="Picture 12" descr="A black background with a black square&#10;&#10;Description automatically generated with medium confidence">
+              <a:extLst>
+                <a:ext uri="{FF2B5EF4-FFF2-40B4-BE49-F238E27FC236}">
+                  <a16:creationId xmlns:a16="http://schemas.microsoft.com/office/drawing/2014/main" id="{D8BF8F0F-C39A-2787-35B2-5E412837222C}"/>
+                </a:ext>
+              </a:extLst>
+            </p:cNvPr>
+            <p:cNvPicPr>
+              <a:picLocks noChangeAspect="1"/>
+            </p:cNvPicPr>
+            <p:nvPr/>
+          </p:nvPicPr>
+          <p:blipFill>
+            <a:blip r:embed="rId6">
+              <a:extLst>
+                <a:ext uri="{28A0092B-C50C-407E-A947-70E740481C1C}">
+                  <a14:useLocalDpi xmlns:a14="http://schemas.microsoft.com/office/drawing/2010/main" val="0"/>
+                </a:ext>
+              </a:extLst>
+            </a:blip>
+            <a:srcRect l="49896"/>
+            <a:stretch/>
+          </p:blipFill>
+          <p:spPr>
+            <a:xfrm>
+              <a:off x="5655722" y="3429000"/>
+              <a:ext cx="1307559" cy="2609697"/>
+            </a:xfrm>
+            <a:prstGeom prst="rect">
+              <a:avLst/>
+            </a:prstGeom>
+          </p:spPr>
+        </p:pic>
+        <p:pic>
+          <p:nvPicPr>
+            <p:cNvPr id="14" name="Picture 13" descr="A black background with a black square&#10;&#10;Description automatically generated with medium confidence">
+              <a:extLst>
+                <a:ext uri="{FF2B5EF4-FFF2-40B4-BE49-F238E27FC236}">
+                  <a16:creationId xmlns:a16="http://schemas.microsoft.com/office/drawing/2014/main" id="{37DC3D23-1655-D5DB-6DB2-8A19BE2431DE}"/>
+                </a:ext>
+              </a:extLst>
+            </p:cNvPr>
+            <p:cNvPicPr>
+              <a:picLocks noChangeAspect="1"/>
+            </p:cNvPicPr>
+            <p:nvPr/>
+          </p:nvPicPr>
+          <p:blipFill>
+            <a:blip r:embed="rId7">
+              <a:extLst>
+                <a:ext uri="{28A0092B-C50C-407E-A947-70E740481C1C}">
+                  <a14:useLocalDpi xmlns:a14="http://schemas.microsoft.com/office/drawing/2010/main" val="0"/>
+                </a:ext>
+              </a:extLst>
+            </a:blip>
+            <a:stretch>
+              <a:fillRect/>
+            </a:stretch>
+          </p:blipFill>
+          <p:spPr>
+            <a:xfrm rot="18900000">
+              <a:off x="4590611" y="3956677"/>
+              <a:ext cx="1391976" cy="1391976"/>
+            </a:xfrm>
+            <a:prstGeom prst="rect">
+              <a:avLst/>
+            </a:prstGeom>
+          </p:spPr>
+        </p:pic>
       </p:grpSp>
     </p:spTree>
     <p:extLst>
@@ -13744,7 +15893,7 @@
         </p:blipFill>
         <p:spPr>
           <a:xfrm>
-            <a:off x="6575214" y="4855687"/>
+            <a:off x="6364819" y="4727683"/>
             <a:ext cx="1220400" cy="1220400"/>
           </a:xfrm>
           <a:prstGeom prst="rect">
@@ -13754,10 +15903,10 @@
       </p:pic>
       <p:grpSp>
         <p:nvGrpSpPr>
-          <p:cNvPr id="7" name="Group 6">
+          <p:cNvPr id="23" name="Group 22">
             <a:extLst>
               <a:ext uri="{FF2B5EF4-FFF2-40B4-BE49-F238E27FC236}">
-                <a16:creationId xmlns:a16="http://schemas.microsoft.com/office/drawing/2014/main" id="{B5C86663-EF4E-4D81-8DF0-D7999C3313E5}"/>
+                <a16:creationId xmlns:a16="http://schemas.microsoft.com/office/drawing/2014/main" id="{55FD2E42-742B-8DF8-71A8-DA44B7E5869F}"/>
               </a:ext>
             </a:extLst>
           </p:cNvPr>
@@ -13767,47 +15916,177 @@
         <p:grpSpPr>
           <a:xfrm>
             <a:off x="8393702" y="1199708"/>
-            <a:ext cx="1220400" cy="1220400"/>
-            <a:chOff x="8173141" y="1066665"/>
-            <a:chExt cx="1220400" cy="1220400"/>
+            <a:ext cx="1220400" cy="1219047"/>
+            <a:chOff x="8393702" y="1199708"/>
+            <a:chExt cx="1220400" cy="1219047"/>
           </a:xfrm>
         </p:grpSpPr>
-        <p:pic>
-          <p:nvPicPr>
-            <p:cNvPr id="29" name="Picture 28">
+        <p:grpSp>
+          <p:nvGrpSpPr>
+            <p:cNvPr id="22" name="Group 21">
               <a:extLst>
                 <a:ext uri="{FF2B5EF4-FFF2-40B4-BE49-F238E27FC236}">
-                  <a16:creationId xmlns:a16="http://schemas.microsoft.com/office/drawing/2014/main" id="{80599DC2-112F-F605-BFF7-7D9628F04C96}"/>
+                  <a16:creationId xmlns:a16="http://schemas.microsoft.com/office/drawing/2014/main" id="{B00F71AD-E1E2-41F5-CDAE-68EB8E3E4229}"/>
                 </a:ext>
               </a:extLst>
             </p:cNvPr>
-            <p:cNvPicPr>
-              <a:picLocks noChangeAspect="1"/>
-            </p:cNvPicPr>
+            <p:cNvGrpSpPr/>
             <p:nvPr/>
-          </p:nvPicPr>
-          <p:blipFill>
-            <a:blip r:embed="rId13">
-              <a:extLst>
-                <a:ext uri="{28A0092B-C50C-407E-A947-70E740481C1C}">
-                  <a14:useLocalDpi xmlns:a14="http://schemas.microsoft.com/office/drawing/2010/main" val="0"/>
-                </a:ext>
-              </a:extLst>
-            </a:blip>
-            <a:stretch>
-              <a:fillRect/>
-            </a:stretch>
-          </p:blipFill>
-          <p:spPr>
+          </p:nvGrpSpPr>
+          <p:grpSpPr>
             <a:xfrm>
-              <a:off x="8173141" y="1066665"/>
-              <a:ext cx="1220400" cy="1220400"/>
+              <a:off x="8393702" y="1199708"/>
+              <a:ext cx="1220400" cy="1219047"/>
+              <a:chOff x="7779693" y="4729036"/>
+              <a:chExt cx="1220400" cy="1219047"/>
             </a:xfrm>
-            <a:prstGeom prst="rect">
-              <a:avLst/>
-            </a:prstGeom>
-          </p:spPr>
-        </p:pic>
+          </p:grpSpPr>
+          <p:grpSp>
+            <p:nvGrpSpPr>
+              <p:cNvPr id="21" name="Group 20">
+                <a:extLst>
+                  <a:ext uri="{FF2B5EF4-FFF2-40B4-BE49-F238E27FC236}">
+                    <a16:creationId xmlns:a16="http://schemas.microsoft.com/office/drawing/2014/main" id="{1E8A0E23-4CEB-04D1-234E-1321459CA789}"/>
+                  </a:ext>
+                </a:extLst>
+              </p:cNvPr>
+              <p:cNvGrpSpPr/>
+              <p:nvPr/>
+            </p:nvGrpSpPr>
+            <p:grpSpPr>
+              <a:xfrm>
+                <a:off x="7779693" y="4791477"/>
+                <a:ext cx="1220400" cy="1156606"/>
+                <a:chOff x="9692205" y="3611677"/>
+                <a:chExt cx="1220400" cy="1156606"/>
+              </a:xfrm>
+            </p:grpSpPr>
+            <p:pic>
+              <p:nvPicPr>
+                <p:cNvPr id="13" name="Picture 12" descr="A black background with a black square&#10;&#10;Description automatically generated with medium confidence">
+                  <a:extLst>
+                    <a:ext uri="{FF2B5EF4-FFF2-40B4-BE49-F238E27FC236}">
+                      <a16:creationId xmlns:a16="http://schemas.microsoft.com/office/drawing/2014/main" id="{48D7EE08-4884-871D-7861-820D94B1B870}"/>
+                    </a:ext>
+                  </a:extLst>
+                </p:cNvPr>
+                <p:cNvPicPr>
+                  <a:picLocks noChangeAspect="1"/>
+                </p:cNvPicPr>
+                <p:nvPr/>
+              </p:nvPicPr>
+              <p:blipFill>
+                <a:blip r:embed="rId12">
+                  <a:extLst>
+                    <a:ext uri="{28A0092B-C50C-407E-A947-70E740481C1C}">
+                      <a14:useLocalDpi xmlns:a14="http://schemas.microsoft.com/office/drawing/2010/main" val="0"/>
+                    </a:ext>
+                  </a:extLst>
+                </a:blip>
+                <a:srcRect t="53087"/>
+                <a:stretch/>
+              </p:blipFill>
+              <p:spPr>
+                <a:xfrm>
+                  <a:off x="9692205" y="4195762"/>
+                  <a:ext cx="1220400" cy="572521"/>
+                </a:xfrm>
+                <a:prstGeom prst="rect">
+                  <a:avLst/>
+                </a:prstGeom>
+              </p:spPr>
+            </p:pic>
+            <p:pic>
+              <p:nvPicPr>
+                <p:cNvPr id="14" name="Picture 13" descr="A black background with a black square&#10;&#10;Description automatically generated with medium confidence">
+                  <a:extLst>
+                    <a:ext uri="{FF2B5EF4-FFF2-40B4-BE49-F238E27FC236}">
+                      <a16:creationId xmlns:a16="http://schemas.microsoft.com/office/drawing/2014/main" id="{1C522FB9-DC36-D41A-17A0-117FA2B9B8BB}"/>
+                    </a:ext>
+                  </a:extLst>
+                </p:cNvPr>
+                <p:cNvPicPr>
+                  <a:picLocks noChangeAspect="1"/>
+                </p:cNvPicPr>
+                <p:nvPr/>
+              </p:nvPicPr>
+              <p:blipFill>
+                <a:blip r:embed="rId3">
+                  <a:extLst>
+                    <a:ext uri="{28A0092B-C50C-407E-A947-70E740481C1C}">
+                      <a14:useLocalDpi xmlns:a14="http://schemas.microsoft.com/office/drawing/2010/main" val="0"/>
+                    </a:ext>
+                  </a:extLst>
+                </a:blip>
+                <a:srcRect l="21871" t="-1" r="22164" b="43028"/>
+                <a:stretch/>
+              </p:blipFill>
+              <p:spPr>
+                <a:xfrm>
+                  <a:off x="10043281" y="3611677"/>
+                  <a:ext cx="518248" cy="596785"/>
+                </a:xfrm>
+                <a:prstGeom prst="rect">
+                  <a:avLst/>
+                </a:prstGeom>
+              </p:spPr>
+            </p:pic>
+          </p:grpSp>
+          <p:sp>
+            <p:nvSpPr>
+              <p:cNvPr id="19" name="Rectangle 18">
+                <a:extLst>
+                  <a:ext uri="{FF2B5EF4-FFF2-40B4-BE49-F238E27FC236}">
+                    <a16:creationId xmlns:a16="http://schemas.microsoft.com/office/drawing/2014/main" id="{6925D560-ADC0-6896-0FA8-83FA9C76D5EA}"/>
+                  </a:ext>
+                </a:extLst>
+              </p:cNvPr>
+              <p:cNvSpPr/>
+              <p:nvPr/>
+            </p:nvSpPr>
+            <p:spPr>
+              <a:xfrm>
+                <a:off x="7781046" y="4729036"/>
+                <a:ext cx="1219047" cy="1219047"/>
+              </a:xfrm>
+              <a:prstGeom prst="rect">
+                <a:avLst/>
+              </a:prstGeom>
+              <a:solidFill>
+                <a:schemeClr val="tx1">
+                  <a:alpha val="0"/>
+                </a:schemeClr>
+              </a:solidFill>
+              <a:ln w="3175">
+                <a:noFill/>
+              </a:ln>
+            </p:spPr>
+            <p:style>
+              <a:lnRef idx="2">
+                <a:schemeClr val="accent1">
+                  <a:shade val="15000"/>
+                </a:schemeClr>
+              </a:lnRef>
+              <a:fillRef idx="1">
+                <a:schemeClr val="accent1"/>
+              </a:fillRef>
+              <a:effectRef idx="0">
+                <a:schemeClr val="accent1"/>
+              </a:effectRef>
+              <a:fontRef idx="minor">
+                <a:schemeClr val="lt1"/>
+              </a:fontRef>
+            </p:style>
+            <p:txBody>
+              <a:bodyPr rtlCol="0" anchor="ctr"/>
+              <a:lstStyle/>
+              <a:p>
+                <a:pPr algn="ctr"/>
+                <a:endParaRPr lang="en-GB"/>
+              </a:p>
+            </p:txBody>
+          </p:sp>
+        </p:grpSp>
         <p:grpSp>
           <p:nvGrpSpPr>
             <p:cNvPr id="42" name="Group 41">
@@ -13822,7 +16101,7 @@
           </p:nvGrpSpPr>
           <p:grpSpPr>
             <a:xfrm>
-              <a:off x="8339710" y="1273915"/>
+              <a:off x="8560271" y="1406958"/>
               <a:ext cx="196726" cy="54000"/>
               <a:chOff x="5602892" y="4567273"/>
               <a:chExt cx="196726" cy="54000"/>

</xml_diff>

<commit_message>
Clock and cursor patch
</commit_message>
<xml_diff>
--- a/media/workshop.pptx
+++ b/media/workshop.pptx
@@ -11006,6 +11006,1880 @@
           <a:chExt cx="0" cy="0"/>
         </a:xfrm>
       </p:grpSpPr>
+      <p:grpSp>
+        <p:nvGrpSpPr>
+          <p:cNvPr id="1066" name="Group 1065">
+            <a:extLst>
+              <a:ext uri="{FF2B5EF4-FFF2-40B4-BE49-F238E27FC236}">
+                <a16:creationId xmlns:a16="http://schemas.microsoft.com/office/drawing/2014/main" id="{C78862DE-1A46-4B2C-2337-93A7038B9346}"/>
+              </a:ext>
+            </a:extLst>
+          </p:cNvPr>
+          <p:cNvGrpSpPr/>
+          <p:nvPr/>
+        </p:nvGrpSpPr>
+        <p:grpSpPr>
+          <a:xfrm>
+            <a:off x="3818841" y="3344561"/>
+            <a:ext cx="1234884" cy="1124657"/>
+            <a:chOff x="3818841" y="3344561"/>
+            <a:chExt cx="1234884" cy="1124657"/>
+          </a:xfrm>
+        </p:grpSpPr>
+        <p:sp>
+          <p:nvSpPr>
+            <p:cNvPr id="73" name="Freeform: Shape 72">
+              <a:extLst>
+                <a:ext uri="{FF2B5EF4-FFF2-40B4-BE49-F238E27FC236}">
+                  <a16:creationId xmlns:a16="http://schemas.microsoft.com/office/drawing/2014/main" id="{17775036-6CDC-54C1-BB59-04E371AA915A}"/>
+                </a:ext>
+              </a:extLst>
+            </p:cNvPr>
+            <p:cNvSpPr>
+              <a:spLocks/>
+            </p:cNvSpPr>
+            <p:nvPr/>
+          </p:nvSpPr>
+          <p:spPr>
+            <a:xfrm rot="20697523">
+              <a:off x="3943648" y="3505098"/>
+              <a:ext cx="982597" cy="709560"/>
+            </a:xfrm>
+            <a:custGeom>
+              <a:avLst/>
+              <a:gdLst>
+                <a:gd name="connsiteX0" fmla="*/ 1085707 w 1085707"/>
+                <a:gd name="connsiteY0" fmla="*/ 1522 h 703382"/>
+                <a:gd name="connsiteX1" fmla="*/ 1085707 w 1085707"/>
+                <a:gd name="connsiteY1" fmla="*/ 233559 h 703382"/>
+                <a:gd name="connsiteX2" fmla="*/ 1084733 w 1085707"/>
+                <a:gd name="connsiteY2" fmla="*/ 233559 h 703382"/>
+                <a:gd name="connsiteX3" fmla="*/ 1084429 w 1085707"/>
+                <a:gd name="connsiteY3" fmla="*/ 350240 h 703382"/>
+                <a:gd name="connsiteX4" fmla="*/ 916260 w 1085707"/>
+                <a:gd name="connsiteY4" fmla="*/ 349802 h 703382"/>
+                <a:gd name="connsiteX5" fmla="*/ 916259 w 1085707"/>
+                <a:gd name="connsiteY5" fmla="*/ 456025 h 703382"/>
+                <a:gd name="connsiteX6" fmla="*/ 868184 w 1085707"/>
+                <a:gd name="connsiteY6" fmla="*/ 456025 h 703382"/>
+                <a:gd name="connsiteX7" fmla="*/ 868184 w 1085707"/>
+                <a:gd name="connsiteY7" fmla="*/ 511982 h 703382"/>
+                <a:gd name="connsiteX8" fmla="*/ 783655 w 1085707"/>
+                <a:gd name="connsiteY8" fmla="*/ 511982 h 703382"/>
+                <a:gd name="connsiteX9" fmla="*/ 783655 w 1085707"/>
+                <a:gd name="connsiteY9" fmla="*/ 568426 h 703382"/>
+                <a:gd name="connsiteX10" fmla="*/ 698055 w 1085707"/>
+                <a:gd name="connsiteY10" fmla="*/ 568426 h 703382"/>
+                <a:gd name="connsiteX11" fmla="*/ 698055 w 1085707"/>
+                <a:gd name="connsiteY11" fmla="*/ 602140 h 703382"/>
+                <a:gd name="connsiteX12" fmla="*/ 516288 w 1085707"/>
+                <a:gd name="connsiteY12" fmla="*/ 602140 h 703382"/>
+                <a:gd name="connsiteX13" fmla="*/ 516288 w 1085707"/>
+                <a:gd name="connsiteY13" fmla="*/ 658889 h 703382"/>
+                <a:gd name="connsiteX14" fmla="*/ 448191 w 1085707"/>
+                <a:gd name="connsiteY14" fmla="*/ 658889 h 703382"/>
+                <a:gd name="connsiteX15" fmla="*/ 448191 w 1085707"/>
+                <a:gd name="connsiteY15" fmla="*/ 703382 h 703382"/>
+                <a:gd name="connsiteX16" fmla="*/ 321212 w 1085707"/>
+                <a:gd name="connsiteY16" fmla="*/ 703382 h 703382"/>
+                <a:gd name="connsiteX17" fmla="*/ 321212 w 1085707"/>
+                <a:gd name="connsiteY17" fmla="*/ 623625 h 703382"/>
+                <a:gd name="connsiteX18" fmla="*/ 321281 w 1085707"/>
+                <a:gd name="connsiteY18" fmla="*/ 623625 h 703382"/>
+                <a:gd name="connsiteX19" fmla="*/ 321281 w 1085707"/>
+                <a:gd name="connsiteY19" fmla="*/ 579132 h 703382"/>
+                <a:gd name="connsiteX20" fmla="*/ 357890 w 1085707"/>
+                <a:gd name="connsiteY20" fmla="*/ 579132 h 703382"/>
+                <a:gd name="connsiteX21" fmla="*/ 357889 w 1085707"/>
+                <a:gd name="connsiteY21" fmla="*/ 522383 h 703382"/>
+                <a:gd name="connsiteX22" fmla="*/ 426575 w 1085707"/>
+                <a:gd name="connsiteY22" fmla="*/ 522383 h 703382"/>
+                <a:gd name="connsiteX23" fmla="*/ 426575 w 1085707"/>
+                <a:gd name="connsiteY23" fmla="*/ 488669 h 703382"/>
+                <a:gd name="connsiteX24" fmla="*/ 511104 w 1085707"/>
+                <a:gd name="connsiteY24" fmla="*/ 488669 h 703382"/>
+                <a:gd name="connsiteX25" fmla="*/ 511104 w 1085707"/>
+                <a:gd name="connsiteY25" fmla="*/ 432225 h 703382"/>
+                <a:gd name="connsiteX26" fmla="*/ 550677 w 1085707"/>
+                <a:gd name="connsiteY26" fmla="*/ 432225 h 703382"/>
+                <a:gd name="connsiteX27" fmla="*/ 550677 w 1085707"/>
+                <a:gd name="connsiteY27" fmla="*/ 338966 h 703382"/>
+                <a:gd name="connsiteX28" fmla="*/ 477099 w 1085707"/>
+                <a:gd name="connsiteY28" fmla="*/ 265002 h 703382"/>
+                <a:gd name="connsiteX29" fmla="*/ 477181 w 1085707"/>
+                <a:gd name="connsiteY29" fmla="*/ 233559 h 703382"/>
+                <a:gd name="connsiteX30" fmla="*/ 364498 w 1085707"/>
+                <a:gd name="connsiteY30" fmla="*/ 233559 h 703382"/>
+                <a:gd name="connsiteX31" fmla="*/ 211854 w 1085707"/>
+                <a:gd name="connsiteY31" fmla="*/ 421260 h 703382"/>
+                <a:gd name="connsiteX32" fmla="*/ 141047 w 1085707"/>
+                <a:gd name="connsiteY32" fmla="*/ 684756 h 703382"/>
+                <a:gd name="connsiteX33" fmla="*/ 0 w 1085707"/>
+                <a:gd name="connsiteY33" fmla="*/ 646854 h 703382"/>
+                <a:gd name="connsiteX34" fmla="*/ 73913 w 1085707"/>
+                <a:gd name="connsiteY34" fmla="*/ 371797 h 703382"/>
+                <a:gd name="connsiteX35" fmla="*/ 60860 w 1085707"/>
+                <a:gd name="connsiteY35" fmla="*/ 361181 h 703382"/>
+                <a:gd name="connsiteX36" fmla="*/ 344332 w 1085707"/>
+                <a:gd name="connsiteY36" fmla="*/ 12605 h 703382"/>
+                <a:gd name="connsiteX37" fmla="*/ 344332 w 1085707"/>
+                <a:gd name="connsiteY37" fmla="*/ 1522 h 703382"/>
+                <a:gd name="connsiteX38" fmla="*/ 353346 w 1085707"/>
+                <a:gd name="connsiteY38" fmla="*/ 1522 h 703382"/>
+                <a:gd name="connsiteX39" fmla="*/ 354584 w 1085707"/>
+                <a:gd name="connsiteY39" fmla="*/ 0 h 703382"/>
+                <a:gd name="connsiteX40" fmla="*/ 356456 w 1085707"/>
+                <a:gd name="connsiteY40" fmla="*/ 1522 h 703382"/>
+                <a:gd name="csX0" fmla="*/ 1085707 w 1085707"/>
+                <a:gd name="csY0" fmla="*/ 1522 h 703382"/>
+                <a:gd name="csX1" fmla="*/ 1085707 w 1085707"/>
+                <a:gd name="csY1" fmla="*/ 233559 h 703382"/>
+                <a:gd name="csX2" fmla="*/ 1084733 w 1085707"/>
+                <a:gd name="csY2" fmla="*/ 233559 h 703382"/>
+                <a:gd name="csX3" fmla="*/ 1084429 w 1085707"/>
+                <a:gd name="csY3" fmla="*/ 350240 h 703382"/>
+                <a:gd name="csX4" fmla="*/ 916260 w 1085707"/>
+                <a:gd name="csY4" fmla="*/ 349802 h 703382"/>
+                <a:gd name="csX5" fmla="*/ 916259 w 1085707"/>
+                <a:gd name="csY5" fmla="*/ 456025 h 703382"/>
+                <a:gd name="csX6" fmla="*/ 868184 w 1085707"/>
+                <a:gd name="csY6" fmla="*/ 456025 h 703382"/>
+                <a:gd name="csX7" fmla="*/ 868184 w 1085707"/>
+                <a:gd name="csY7" fmla="*/ 511982 h 703382"/>
+                <a:gd name="csX8" fmla="*/ 783655 w 1085707"/>
+                <a:gd name="csY8" fmla="*/ 511982 h 703382"/>
+                <a:gd name="csX9" fmla="*/ 783655 w 1085707"/>
+                <a:gd name="csY9" fmla="*/ 568426 h 703382"/>
+                <a:gd name="csX10" fmla="*/ 698055 w 1085707"/>
+                <a:gd name="csY10" fmla="*/ 568426 h 703382"/>
+                <a:gd name="csX11" fmla="*/ 698055 w 1085707"/>
+                <a:gd name="csY11" fmla="*/ 602140 h 703382"/>
+                <a:gd name="csX12" fmla="*/ 516288 w 1085707"/>
+                <a:gd name="csY12" fmla="*/ 602140 h 703382"/>
+                <a:gd name="csX13" fmla="*/ 516288 w 1085707"/>
+                <a:gd name="csY13" fmla="*/ 658889 h 703382"/>
+                <a:gd name="csX14" fmla="*/ 448191 w 1085707"/>
+                <a:gd name="csY14" fmla="*/ 658889 h 703382"/>
+                <a:gd name="csX15" fmla="*/ 448191 w 1085707"/>
+                <a:gd name="csY15" fmla="*/ 703382 h 703382"/>
+                <a:gd name="csX16" fmla="*/ 321212 w 1085707"/>
+                <a:gd name="csY16" fmla="*/ 703382 h 703382"/>
+                <a:gd name="csX17" fmla="*/ 321212 w 1085707"/>
+                <a:gd name="csY17" fmla="*/ 623625 h 703382"/>
+                <a:gd name="csX18" fmla="*/ 321281 w 1085707"/>
+                <a:gd name="csY18" fmla="*/ 623625 h 703382"/>
+                <a:gd name="csX19" fmla="*/ 321281 w 1085707"/>
+                <a:gd name="csY19" fmla="*/ 579132 h 703382"/>
+                <a:gd name="csX20" fmla="*/ 357890 w 1085707"/>
+                <a:gd name="csY20" fmla="*/ 579132 h 703382"/>
+                <a:gd name="csX21" fmla="*/ 357889 w 1085707"/>
+                <a:gd name="csY21" fmla="*/ 522383 h 703382"/>
+                <a:gd name="csX22" fmla="*/ 426575 w 1085707"/>
+                <a:gd name="csY22" fmla="*/ 522383 h 703382"/>
+                <a:gd name="csX23" fmla="*/ 426575 w 1085707"/>
+                <a:gd name="csY23" fmla="*/ 488669 h 703382"/>
+                <a:gd name="csX24" fmla="*/ 511104 w 1085707"/>
+                <a:gd name="csY24" fmla="*/ 488669 h 703382"/>
+                <a:gd name="csX25" fmla="*/ 511104 w 1085707"/>
+                <a:gd name="csY25" fmla="*/ 432225 h 703382"/>
+                <a:gd name="csX26" fmla="*/ 550677 w 1085707"/>
+                <a:gd name="csY26" fmla="*/ 432225 h 703382"/>
+                <a:gd name="csX27" fmla="*/ 550677 w 1085707"/>
+                <a:gd name="csY27" fmla="*/ 338966 h 703382"/>
+                <a:gd name="csX28" fmla="*/ 477099 w 1085707"/>
+                <a:gd name="csY28" fmla="*/ 265002 h 703382"/>
+                <a:gd name="csX29" fmla="*/ 477181 w 1085707"/>
+                <a:gd name="csY29" fmla="*/ 233559 h 703382"/>
+                <a:gd name="csX30" fmla="*/ 364498 w 1085707"/>
+                <a:gd name="csY30" fmla="*/ 233559 h 703382"/>
+                <a:gd name="csX31" fmla="*/ 211854 w 1085707"/>
+                <a:gd name="csY31" fmla="*/ 421260 h 703382"/>
+                <a:gd name="csX32" fmla="*/ 243610 w 1085707"/>
+                <a:gd name="csY32" fmla="*/ 633860 h 703382"/>
+                <a:gd name="csX33" fmla="*/ 0 w 1085707"/>
+                <a:gd name="csY33" fmla="*/ 646854 h 703382"/>
+                <a:gd name="csX34" fmla="*/ 73913 w 1085707"/>
+                <a:gd name="csY34" fmla="*/ 371797 h 703382"/>
+                <a:gd name="csX35" fmla="*/ 60860 w 1085707"/>
+                <a:gd name="csY35" fmla="*/ 361181 h 703382"/>
+                <a:gd name="csX36" fmla="*/ 344332 w 1085707"/>
+                <a:gd name="csY36" fmla="*/ 12605 h 703382"/>
+                <a:gd name="csX37" fmla="*/ 344332 w 1085707"/>
+                <a:gd name="csY37" fmla="*/ 1522 h 703382"/>
+                <a:gd name="csX38" fmla="*/ 353346 w 1085707"/>
+                <a:gd name="csY38" fmla="*/ 1522 h 703382"/>
+                <a:gd name="csX39" fmla="*/ 354584 w 1085707"/>
+                <a:gd name="csY39" fmla="*/ 0 h 703382"/>
+                <a:gd name="csX40" fmla="*/ 356456 w 1085707"/>
+                <a:gd name="csY40" fmla="*/ 1522 h 703382"/>
+                <a:gd name="csX41" fmla="*/ 1085707 w 1085707"/>
+                <a:gd name="csY41" fmla="*/ 1522 h 703382"/>
+                <a:gd name="csX0" fmla="*/ 1085707 w 1085707"/>
+                <a:gd name="csY0" fmla="*/ 1522 h 703382"/>
+                <a:gd name="csX1" fmla="*/ 1085707 w 1085707"/>
+                <a:gd name="csY1" fmla="*/ 233559 h 703382"/>
+                <a:gd name="csX2" fmla="*/ 1084733 w 1085707"/>
+                <a:gd name="csY2" fmla="*/ 233559 h 703382"/>
+                <a:gd name="csX3" fmla="*/ 1084429 w 1085707"/>
+                <a:gd name="csY3" fmla="*/ 350240 h 703382"/>
+                <a:gd name="csX4" fmla="*/ 916260 w 1085707"/>
+                <a:gd name="csY4" fmla="*/ 349802 h 703382"/>
+                <a:gd name="csX5" fmla="*/ 916259 w 1085707"/>
+                <a:gd name="csY5" fmla="*/ 456025 h 703382"/>
+                <a:gd name="csX6" fmla="*/ 868184 w 1085707"/>
+                <a:gd name="csY6" fmla="*/ 456025 h 703382"/>
+                <a:gd name="csX7" fmla="*/ 868184 w 1085707"/>
+                <a:gd name="csY7" fmla="*/ 511982 h 703382"/>
+                <a:gd name="csX8" fmla="*/ 783655 w 1085707"/>
+                <a:gd name="csY8" fmla="*/ 511982 h 703382"/>
+                <a:gd name="csX9" fmla="*/ 783655 w 1085707"/>
+                <a:gd name="csY9" fmla="*/ 568426 h 703382"/>
+                <a:gd name="csX10" fmla="*/ 698055 w 1085707"/>
+                <a:gd name="csY10" fmla="*/ 568426 h 703382"/>
+                <a:gd name="csX11" fmla="*/ 698055 w 1085707"/>
+                <a:gd name="csY11" fmla="*/ 602140 h 703382"/>
+                <a:gd name="csX12" fmla="*/ 516288 w 1085707"/>
+                <a:gd name="csY12" fmla="*/ 602140 h 703382"/>
+                <a:gd name="csX13" fmla="*/ 516288 w 1085707"/>
+                <a:gd name="csY13" fmla="*/ 658889 h 703382"/>
+                <a:gd name="csX14" fmla="*/ 448191 w 1085707"/>
+                <a:gd name="csY14" fmla="*/ 658889 h 703382"/>
+                <a:gd name="csX15" fmla="*/ 448191 w 1085707"/>
+                <a:gd name="csY15" fmla="*/ 703382 h 703382"/>
+                <a:gd name="csX16" fmla="*/ 321212 w 1085707"/>
+                <a:gd name="csY16" fmla="*/ 703382 h 703382"/>
+                <a:gd name="csX17" fmla="*/ 321212 w 1085707"/>
+                <a:gd name="csY17" fmla="*/ 623625 h 703382"/>
+                <a:gd name="csX18" fmla="*/ 321281 w 1085707"/>
+                <a:gd name="csY18" fmla="*/ 623625 h 703382"/>
+                <a:gd name="csX19" fmla="*/ 321281 w 1085707"/>
+                <a:gd name="csY19" fmla="*/ 579132 h 703382"/>
+                <a:gd name="csX20" fmla="*/ 357890 w 1085707"/>
+                <a:gd name="csY20" fmla="*/ 579132 h 703382"/>
+                <a:gd name="csX21" fmla="*/ 357889 w 1085707"/>
+                <a:gd name="csY21" fmla="*/ 522383 h 703382"/>
+                <a:gd name="csX22" fmla="*/ 426575 w 1085707"/>
+                <a:gd name="csY22" fmla="*/ 522383 h 703382"/>
+                <a:gd name="csX23" fmla="*/ 426575 w 1085707"/>
+                <a:gd name="csY23" fmla="*/ 488669 h 703382"/>
+                <a:gd name="csX24" fmla="*/ 511104 w 1085707"/>
+                <a:gd name="csY24" fmla="*/ 488669 h 703382"/>
+                <a:gd name="csX25" fmla="*/ 511104 w 1085707"/>
+                <a:gd name="csY25" fmla="*/ 432225 h 703382"/>
+                <a:gd name="csX26" fmla="*/ 550677 w 1085707"/>
+                <a:gd name="csY26" fmla="*/ 432225 h 703382"/>
+                <a:gd name="csX27" fmla="*/ 550677 w 1085707"/>
+                <a:gd name="csY27" fmla="*/ 338966 h 703382"/>
+                <a:gd name="csX28" fmla="*/ 477099 w 1085707"/>
+                <a:gd name="csY28" fmla="*/ 265002 h 703382"/>
+                <a:gd name="csX29" fmla="*/ 477181 w 1085707"/>
+                <a:gd name="csY29" fmla="*/ 233559 h 703382"/>
+                <a:gd name="csX30" fmla="*/ 364498 w 1085707"/>
+                <a:gd name="csY30" fmla="*/ 233559 h 703382"/>
+                <a:gd name="csX31" fmla="*/ 253592 w 1085707"/>
+                <a:gd name="csY31" fmla="*/ 412824 h 703382"/>
+                <a:gd name="csX32" fmla="*/ 243610 w 1085707"/>
+                <a:gd name="csY32" fmla="*/ 633860 h 703382"/>
+                <a:gd name="csX33" fmla="*/ 0 w 1085707"/>
+                <a:gd name="csY33" fmla="*/ 646854 h 703382"/>
+                <a:gd name="csX34" fmla="*/ 73913 w 1085707"/>
+                <a:gd name="csY34" fmla="*/ 371797 h 703382"/>
+                <a:gd name="csX35" fmla="*/ 60860 w 1085707"/>
+                <a:gd name="csY35" fmla="*/ 361181 h 703382"/>
+                <a:gd name="csX36" fmla="*/ 344332 w 1085707"/>
+                <a:gd name="csY36" fmla="*/ 12605 h 703382"/>
+                <a:gd name="csX37" fmla="*/ 344332 w 1085707"/>
+                <a:gd name="csY37" fmla="*/ 1522 h 703382"/>
+                <a:gd name="csX38" fmla="*/ 353346 w 1085707"/>
+                <a:gd name="csY38" fmla="*/ 1522 h 703382"/>
+                <a:gd name="csX39" fmla="*/ 354584 w 1085707"/>
+                <a:gd name="csY39" fmla="*/ 0 h 703382"/>
+                <a:gd name="csX40" fmla="*/ 356456 w 1085707"/>
+                <a:gd name="csY40" fmla="*/ 1522 h 703382"/>
+                <a:gd name="csX41" fmla="*/ 1085707 w 1085707"/>
+                <a:gd name="csY41" fmla="*/ 1522 h 703382"/>
+                <a:gd name="csX0" fmla="*/ 1085707 w 1085707"/>
+                <a:gd name="csY0" fmla="*/ 1522 h 703382"/>
+                <a:gd name="csX1" fmla="*/ 1085707 w 1085707"/>
+                <a:gd name="csY1" fmla="*/ 233559 h 703382"/>
+                <a:gd name="csX2" fmla="*/ 1084733 w 1085707"/>
+                <a:gd name="csY2" fmla="*/ 233559 h 703382"/>
+                <a:gd name="csX3" fmla="*/ 1084429 w 1085707"/>
+                <a:gd name="csY3" fmla="*/ 350240 h 703382"/>
+                <a:gd name="csX4" fmla="*/ 916260 w 1085707"/>
+                <a:gd name="csY4" fmla="*/ 349802 h 703382"/>
+                <a:gd name="csX5" fmla="*/ 916259 w 1085707"/>
+                <a:gd name="csY5" fmla="*/ 456025 h 703382"/>
+                <a:gd name="csX6" fmla="*/ 868184 w 1085707"/>
+                <a:gd name="csY6" fmla="*/ 456025 h 703382"/>
+                <a:gd name="csX7" fmla="*/ 868184 w 1085707"/>
+                <a:gd name="csY7" fmla="*/ 511982 h 703382"/>
+                <a:gd name="csX8" fmla="*/ 783655 w 1085707"/>
+                <a:gd name="csY8" fmla="*/ 511982 h 703382"/>
+                <a:gd name="csX9" fmla="*/ 783655 w 1085707"/>
+                <a:gd name="csY9" fmla="*/ 568426 h 703382"/>
+                <a:gd name="csX10" fmla="*/ 698055 w 1085707"/>
+                <a:gd name="csY10" fmla="*/ 568426 h 703382"/>
+                <a:gd name="csX11" fmla="*/ 698055 w 1085707"/>
+                <a:gd name="csY11" fmla="*/ 602140 h 703382"/>
+                <a:gd name="csX12" fmla="*/ 516288 w 1085707"/>
+                <a:gd name="csY12" fmla="*/ 602140 h 703382"/>
+                <a:gd name="csX13" fmla="*/ 516288 w 1085707"/>
+                <a:gd name="csY13" fmla="*/ 658889 h 703382"/>
+                <a:gd name="csX14" fmla="*/ 448191 w 1085707"/>
+                <a:gd name="csY14" fmla="*/ 658889 h 703382"/>
+                <a:gd name="csX15" fmla="*/ 448191 w 1085707"/>
+                <a:gd name="csY15" fmla="*/ 703382 h 703382"/>
+                <a:gd name="csX16" fmla="*/ 321212 w 1085707"/>
+                <a:gd name="csY16" fmla="*/ 703382 h 703382"/>
+                <a:gd name="csX17" fmla="*/ 321212 w 1085707"/>
+                <a:gd name="csY17" fmla="*/ 623625 h 703382"/>
+                <a:gd name="csX18" fmla="*/ 321281 w 1085707"/>
+                <a:gd name="csY18" fmla="*/ 623625 h 703382"/>
+                <a:gd name="csX19" fmla="*/ 321281 w 1085707"/>
+                <a:gd name="csY19" fmla="*/ 579132 h 703382"/>
+                <a:gd name="csX20" fmla="*/ 357890 w 1085707"/>
+                <a:gd name="csY20" fmla="*/ 579132 h 703382"/>
+                <a:gd name="csX21" fmla="*/ 357889 w 1085707"/>
+                <a:gd name="csY21" fmla="*/ 522383 h 703382"/>
+                <a:gd name="csX22" fmla="*/ 426575 w 1085707"/>
+                <a:gd name="csY22" fmla="*/ 522383 h 703382"/>
+                <a:gd name="csX23" fmla="*/ 426575 w 1085707"/>
+                <a:gd name="csY23" fmla="*/ 488669 h 703382"/>
+                <a:gd name="csX24" fmla="*/ 511104 w 1085707"/>
+                <a:gd name="csY24" fmla="*/ 488669 h 703382"/>
+                <a:gd name="csX25" fmla="*/ 511104 w 1085707"/>
+                <a:gd name="csY25" fmla="*/ 432225 h 703382"/>
+                <a:gd name="csX26" fmla="*/ 550677 w 1085707"/>
+                <a:gd name="csY26" fmla="*/ 432225 h 703382"/>
+                <a:gd name="csX27" fmla="*/ 550677 w 1085707"/>
+                <a:gd name="csY27" fmla="*/ 338966 h 703382"/>
+                <a:gd name="csX28" fmla="*/ 477099 w 1085707"/>
+                <a:gd name="csY28" fmla="*/ 265002 h 703382"/>
+                <a:gd name="csX29" fmla="*/ 477181 w 1085707"/>
+                <a:gd name="csY29" fmla="*/ 233559 h 703382"/>
+                <a:gd name="csX30" fmla="*/ 364498 w 1085707"/>
+                <a:gd name="csY30" fmla="*/ 233559 h 703382"/>
+                <a:gd name="csX31" fmla="*/ 253592 w 1085707"/>
+                <a:gd name="csY31" fmla="*/ 412824 h 703382"/>
+                <a:gd name="csX32" fmla="*/ 243610 w 1085707"/>
+                <a:gd name="csY32" fmla="*/ 633860 h 703382"/>
+                <a:gd name="csX33" fmla="*/ 0 w 1085707"/>
+                <a:gd name="csY33" fmla="*/ 646854 h 703382"/>
+                <a:gd name="csX34" fmla="*/ 73913 w 1085707"/>
+                <a:gd name="csY34" fmla="*/ 371797 h 703382"/>
+                <a:gd name="csX35" fmla="*/ 116599 w 1085707"/>
+                <a:gd name="csY35" fmla="*/ 410248 h 703382"/>
+                <a:gd name="csX36" fmla="*/ 344332 w 1085707"/>
+                <a:gd name="csY36" fmla="*/ 12605 h 703382"/>
+                <a:gd name="csX37" fmla="*/ 344332 w 1085707"/>
+                <a:gd name="csY37" fmla="*/ 1522 h 703382"/>
+                <a:gd name="csX38" fmla="*/ 353346 w 1085707"/>
+                <a:gd name="csY38" fmla="*/ 1522 h 703382"/>
+                <a:gd name="csX39" fmla="*/ 354584 w 1085707"/>
+                <a:gd name="csY39" fmla="*/ 0 h 703382"/>
+                <a:gd name="csX40" fmla="*/ 356456 w 1085707"/>
+                <a:gd name="csY40" fmla="*/ 1522 h 703382"/>
+                <a:gd name="csX41" fmla="*/ 1085707 w 1085707"/>
+                <a:gd name="csY41" fmla="*/ 1522 h 703382"/>
+                <a:gd name="csX0" fmla="*/ 1085707 w 1085707"/>
+                <a:gd name="csY0" fmla="*/ 1522 h 703382"/>
+                <a:gd name="csX1" fmla="*/ 1085707 w 1085707"/>
+                <a:gd name="csY1" fmla="*/ 233559 h 703382"/>
+                <a:gd name="csX2" fmla="*/ 1084733 w 1085707"/>
+                <a:gd name="csY2" fmla="*/ 233559 h 703382"/>
+                <a:gd name="csX3" fmla="*/ 1084429 w 1085707"/>
+                <a:gd name="csY3" fmla="*/ 350240 h 703382"/>
+                <a:gd name="csX4" fmla="*/ 916260 w 1085707"/>
+                <a:gd name="csY4" fmla="*/ 349802 h 703382"/>
+                <a:gd name="csX5" fmla="*/ 916259 w 1085707"/>
+                <a:gd name="csY5" fmla="*/ 456025 h 703382"/>
+                <a:gd name="csX6" fmla="*/ 868184 w 1085707"/>
+                <a:gd name="csY6" fmla="*/ 456025 h 703382"/>
+                <a:gd name="csX7" fmla="*/ 868184 w 1085707"/>
+                <a:gd name="csY7" fmla="*/ 511982 h 703382"/>
+                <a:gd name="csX8" fmla="*/ 783655 w 1085707"/>
+                <a:gd name="csY8" fmla="*/ 511982 h 703382"/>
+                <a:gd name="csX9" fmla="*/ 783655 w 1085707"/>
+                <a:gd name="csY9" fmla="*/ 568426 h 703382"/>
+                <a:gd name="csX10" fmla="*/ 698055 w 1085707"/>
+                <a:gd name="csY10" fmla="*/ 568426 h 703382"/>
+                <a:gd name="csX11" fmla="*/ 698055 w 1085707"/>
+                <a:gd name="csY11" fmla="*/ 602140 h 703382"/>
+                <a:gd name="csX12" fmla="*/ 516288 w 1085707"/>
+                <a:gd name="csY12" fmla="*/ 602140 h 703382"/>
+                <a:gd name="csX13" fmla="*/ 516288 w 1085707"/>
+                <a:gd name="csY13" fmla="*/ 658889 h 703382"/>
+                <a:gd name="csX14" fmla="*/ 448191 w 1085707"/>
+                <a:gd name="csY14" fmla="*/ 658889 h 703382"/>
+                <a:gd name="csX15" fmla="*/ 448191 w 1085707"/>
+                <a:gd name="csY15" fmla="*/ 703382 h 703382"/>
+                <a:gd name="csX16" fmla="*/ 321212 w 1085707"/>
+                <a:gd name="csY16" fmla="*/ 703382 h 703382"/>
+                <a:gd name="csX17" fmla="*/ 321212 w 1085707"/>
+                <a:gd name="csY17" fmla="*/ 623625 h 703382"/>
+                <a:gd name="csX18" fmla="*/ 321281 w 1085707"/>
+                <a:gd name="csY18" fmla="*/ 623625 h 703382"/>
+                <a:gd name="csX19" fmla="*/ 321281 w 1085707"/>
+                <a:gd name="csY19" fmla="*/ 579132 h 703382"/>
+                <a:gd name="csX20" fmla="*/ 357890 w 1085707"/>
+                <a:gd name="csY20" fmla="*/ 579132 h 703382"/>
+                <a:gd name="csX21" fmla="*/ 357889 w 1085707"/>
+                <a:gd name="csY21" fmla="*/ 522383 h 703382"/>
+                <a:gd name="csX22" fmla="*/ 426575 w 1085707"/>
+                <a:gd name="csY22" fmla="*/ 522383 h 703382"/>
+                <a:gd name="csX23" fmla="*/ 426575 w 1085707"/>
+                <a:gd name="csY23" fmla="*/ 488669 h 703382"/>
+                <a:gd name="csX24" fmla="*/ 511104 w 1085707"/>
+                <a:gd name="csY24" fmla="*/ 488669 h 703382"/>
+                <a:gd name="csX25" fmla="*/ 511104 w 1085707"/>
+                <a:gd name="csY25" fmla="*/ 432225 h 703382"/>
+                <a:gd name="csX26" fmla="*/ 550677 w 1085707"/>
+                <a:gd name="csY26" fmla="*/ 432225 h 703382"/>
+                <a:gd name="csX27" fmla="*/ 550677 w 1085707"/>
+                <a:gd name="csY27" fmla="*/ 338966 h 703382"/>
+                <a:gd name="csX28" fmla="*/ 477099 w 1085707"/>
+                <a:gd name="csY28" fmla="*/ 265002 h 703382"/>
+                <a:gd name="csX29" fmla="*/ 477181 w 1085707"/>
+                <a:gd name="csY29" fmla="*/ 233559 h 703382"/>
+                <a:gd name="csX30" fmla="*/ 364498 w 1085707"/>
+                <a:gd name="csY30" fmla="*/ 233559 h 703382"/>
+                <a:gd name="csX31" fmla="*/ 253592 w 1085707"/>
+                <a:gd name="csY31" fmla="*/ 412824 h 703382"/>
+                <a:gd name="csX32" fmla="*/ 243610 w 1085707"/>
+                <a:gd name="csY32" fmla="*/ 633860 h 703382"/>
+                <a:gd name="csX33" fmla="*/ 0 w 1085707"/>
+                <a:gd name="csY33" fmla="*/ 646854 h 703382"/>
+                <a:gd name="csX34" fmla="*/ 73913 w 1085707"/>
+                <a:gd name="csY34" fmla="*/ 371797 h 703382"/>
+                <a:gd name="csX35" fmla="*/ 229131 w 1085707"/>
+                <a:gd name="csY35" fmla="*/ 122470 h 703382"/>
+                <a:gd name="csX36" fmla="*/ 344332 w 1085707"/>
+                <a:gd name="csY36" fmla="*/ 12605 h 703382"/>
+                <a:gd name="csX37" fmla="*/ 344332 w 1085707"/>
+                <a:gd name="csY37" fmla="*/ 1522 h 703382"/>
+                <a:gd name="csX38" fmla="*/ 353346 w 1085707"/>
+                <a:gd name="csY38" fmla="*/ 1522 h 703382"/>
+                <a:gd name="csX39" fmla="*/ 354584 w 1085707"/>
+                <a:gd name="csY39" fmla="*/ 0 h 703382"/>
+                <a:gd name="csX40" fmla="*/ 356456 w 1085707"/>
+                <a:gd name="csY40" fmla="*/ 1522 h 703382"/>
+                <a:gd name="csX41" fmla="*/ 1085707 w 1085707"/>
+                <a:gd name="csY41" fmla="*/ 1522 h 703382"/>
+                <a:gd name="csX0" fmla="*/ 1085707 w 1085707"/>
+                <a:gd name="csY0" fmla="*/ 1522 h 703382"/>
+                <a:gd name="csX1" fmla="*/ 1085707 w 1085707"/>
+                <a:gd name="csY1" fmla="*/ 233559 h 703382"/>
+                <a:gd name="csX2" fmla="*/ 1084733 w 1085707"/>
+                <a:gd name="csY2" fmla="*/ 233559 h 703382"/>
+                <a:gd name="csX3" fmla="*/ 1084429 w 1085707"/>
+                <a:gd name="csY3" fmla="*/ 350240 h 703382"/>
+                <a:gd name="csX4" fmla="*/ 916260 w 1085707"/>
+                <a:gd name="csY4" fmla="*/ 349802 h 703382"/>
+                <a:gd name="csX5" fmla="*/ 916259 w 1085707"/>
+                <a:gd name="csY5" fmla="*/ 456025 h 703382"/>
+                <a:gd name="csX6" fmla="*/ 868184 w 1085707"/>
+                <a:gd name="csY6" fmla="*/ 456025 h 703382"/>
+                <a:gd name="csX7" fmla="*/ 868184 w 1085707"/>
+                <a:gd name="csY7" fmla="*/ 511982 h 703382"/>
+                <a:gd name="csX8" fmla="*/ 783655 w 1085707"/>
+                <a:gd name="csY8" fmla="*/ 511982 h 703382"/>
+                <a:gd name="csX9" fmla="*/ 783655 w 1085707"/>
+                <a:gd name="csY9" fmla="*/ 568426 h 703382"/>
+                <a:gd name="csX10" fmla="*/ 698055 w 1085707"/>
+                <a:gd name="csY10" fmla="*/ 568426 h 703382"/>
+                <a:gd name="csX11" fmla="*/ 698055 w 1085707"/>
+                <a:gd name="csY11" fmla="*/ 602140 h 703382"/>
+                <a:gd name="csX12" fmla="*/ 516288 w 1085707"/>
+                <a:gd name="csY12" fmla="*/ 602140 h 703382"/>
+                <a:gd name="csX13" fmla="*/ 516288 w 1085707"/>
+                <a:gd name="csY13" fmla="*/ 658889 h 703382"/>
+                <a:gd name="csX14" fmla="*/ 448191 w 1085707"/>
+                <a:gd name="csY14" fmla="*/ 658889 h 703382"/>
+                <a:gd name="csX15" fmla="*/ 448191 w 1085707"/>
+                <a:gd name="csY15" fmla="*/ 703382 h 703382"/>
+                <a:gd name="csX16" fmla="*/ 321212 w 1085707"/>
+                <a:gd name="csY16" fmla="*/ 703382 h 703382"/>
+                <a:gd name="csX17" fmla="*/ 321212 w 1085707"/>
+                <a:gd name="csY17" fmla="*/ 623625 h 703382"/>
+                <a:gd name="csX18" fmla="*/ 321281 w 1085707"/>
+                <a:gd name="csY18" fmla="*/ 623625 h 703382"/>
+                <a:gd name="csX19" fmla="*/ 321281 w 1085707"/>
+                <a:gd name="csY19" fmla="*/ 579132 h 703382"/>
+                <a:gd name="csX20" fmla="*/ 357890 w 1085707"/>
+                <a:gd name="csY20" fmla="*/ 579132 h 703382"/>
+                <a:gd name="csX21" fmla="*/ 357889 w 1085707"/>
+                <a:gd name="csY21" fmla="*/ 522383 h 703382"/>
+                <a:gd name="csX22" fmla="*/ 426575 w 1085707"/>
+                <a:gd name="csY22" fmla="*/ 522383 h 703382"/>
+                <a:gd name="csX23" fmla="*/ 426575 w 1085707"/>
+                <a:gd name="csY23" fmla="*/ 488669 h 703382"/>
+                <a:gd name="csX24" fmla="*/ 511104 w 1085707"/>
+                <a:gd name="csY24" fmla="*/ 488669 h 703382"/>
+                <a:gd name="csX25" fmla="*/ 511104 w 1085707"/>
+                <a:gd name="csY25" fmla="*/ 432225 h 703382"/>
+                <a:gd name="csX26" fmla="*/ 550677 w 1085707"/>
+                <a:gd name="csY26" fmla="*/ 432225 h 703382"/>
+                <a:gd name="csX27" fmla="*/ 550677 w 1085707"/>
+                <a:gd name="csY27" fmla="*/ 338966 h 703382"/>
+                <a:gd name="csX28" fmla="*/ 477099 w 1085707"/>
+                <a:gd name="csY28" fmla="*/ 265002 h 703382"/>
+                <a:gd name="csX29" fmla="*/ 477181 w 1085707"/>
+                <a:gd name="csY29" fmla="*/ 233559 h 703382"/>
+                <a:gd name="csX30" fmla="*/ 364498 w 1085707"/>
+                <a:gd name="csY30" fmla="*/ 233559 h 703382"/>
+                <a:gd name="csX31" fmla="*/ 253592 w 1085707"/>
+                <a:gd name="csY31" fmla="*/ 412824 h 703382"/>
+                <a:gd name="csX32" fmla="*/ 243610 w 1085707"/>
+                <a:gd name="csY32" fmla="*/ 633860 h 703382"/>
+                <a:gd name="csX33" fmla="*/ 0 w 1085707"/>
+                <a:gd name="csY33" fmla="*/ 646854 h 703382"/>
+                <a:gd name="csX34" fmla="*/ 138649 w 1085707"/>
+                <a:gd name="csY34" fmla="*/ 369488 h 703382"/>
+                <a:gd name="csX35" fmla="*/ 229131 w 1085707"/>
+                <a:gd name="csY35" fmla="*/ 122470 h 703382"/>
+                <a:gd name="csX36" fmla="*/ 344332 w 1085707"/>
+                <a:gd name="csY36" fmla="*/ 12605 h 703382"/>
+                <a:gd name="csX37" fmla="*/ 344332 w 1085707"/>
+                <a:gd name="csY37" fmla="*/ 1522 h 703382"/>
+                <a:gd name="csX38" fmla="*/ 353346 w 1085707"/>
+                <a:gd name="csY38" fmla="*/ 1522 h 703382"/>
+                <a:gd name="csX39" fmla="*/ 354584 w 1085707"/>
+                <a:gd name="csY39" fmla="*/ 0 h 703382"/>
+                <a:gd name="csX40" fmla="*/ 356456 w 1085707"/>
+                <a:gd name="csY40" fmla="*/ 1522 h 703382"/>
+                <a:gd name="csX41" fmla="*/ 1085707 w 1085707"/>
+                <a:gd name="csY41" fmla="*/ 1522 h 703382"/>
+                <a:gd name="csX0" fmla="*/ 1085707 w 1085707"/>
+                <a:gd name="csY0" fmla="*/ 1522 h 703382"/>
+                <a:gd name="csX1" fmla="*/ 1085707 w 1085707"/>
+                <a:gd name="csY1" fmla="*/ 233559 h 703382"/>
+                <a:gd name="csX2" fmla="*/ 1084733 w 1085707"/>
+                <a:gd name="csY2" fmla="*/ 233559 h 703382"/>
+                <a:gd name="csX3" fmla="*/ 1084429 w 1085707"/>
+                <a:gd name="csY3" fmla="*/ 350240 h 703382"/>
+                <a:gd name="csX4" fmla="*/ 916260 w 1085707"/>
+                <a:gd name="csY4" fmla="*/ 349802 h 703382"/>
+                <a:gd name="csX5" fmla="*/ 916259 w 1085707"/>
+                <a:gd name="csY5" fmla="*/ 456025 h 703382"/>
+                <a:gd name="csX6" fmla="*/ 868184 w 1085707"/>
+                <a:gd name="csY6" fmla="*/ 456025 h 703382"/>
+                <a:gd name="csX7" fmla="*/ 868184 w 1085707"/>
+                <a:gd name="csY7" fmla="*/ 511982 h 703382"/>
+                <a:gd name="csX8" fmla="*/ 783655 w 1085707"/>
+                <a:gd name="csY8" fmla="*/ 511982 h 703382"/>
+                <a:gd name="csX9" fmla="*/ 783655 w 1085707"/>
+                <a:gd name="csY9" fmla="*/ 568426 h 703382"/>
+                <a:gd name="csX10" fmla="*/ 698055 w 1085707"/>
+                <a:gd name="csY10" fmla="*/ 568426 h 703382"/>
+                <a:gd name="csX11" fmla="*/ 698055 w 1085707"/>
+                <a:gd name="csY11" fmla="*/ 602140 h 703382"/>
+                <a:gd name="csX12" fmla="*/ 516288 w 1085707"/>
+                <a:gd name="csY12" fmla="*/ 602140 h 703382"/>
+                <a:gd name="csX13" fmla="*/ 516288 w 1085707"/>
+                <a:gd name="csY13" fmla="*/ 658889 h 703382"/>
+                <a:gd name="csX14" fmla="*/ 448191 w 1085707"/>
+                <a:gd name="csY14" fmla="*/ 658889 h 703382"/>
+                <a:gd name="csX15" fmla="*/ 448191 w 1085707"/>
+                <a:gd name="csY15" fmla="*/ 703382 h 703382"/>
+                <a:gd name="csX16" fmla="*/ 321212 w 1085707"/>
+                <a:gd name="csY16" fmla="*/ 703382 h 703382"/>
+                <a:gd name="csX17" fmla="*/ 321212 w 1085707"/>
+                <a:gd name="csY17" fmla="*/ 623625 h 703382"/>
+                <a:gd name="csX18" fmla="*/ 321281 w 1085707"/>
+                <a:gd name="csY18" fmla="*/ 623625 h 703382"/>
+                <a:gd name="csX19" fmla="*/ 321281 w 1085707"/>
+                <a:gd name="csY19" fmla="*/ 579132 h 703382"/>
+                <a:gd name="csX20" fmla="*/ 357890 w 1085707"/>
+                <a:gd name="csY20" fmla="*/ 579132 h 703382"/>
+                <a:gd name="csX21" fmla="*/ 357889 w 1085707"/>
+                <a:gd name="csY21" fmla="*/ 522383 h 703382"/>
+                <a:gd name="csX22" fmla="*/ 426575 w 1085707"/>
+                <a:gd name="csY22" fmla="*/ 522383 h 703382"/>
+                <a:gd name="csX23" fmla="*/ 426575 w 1085707"/>
+                <a:gd name="csY23" fmla="*/ 488669 h 703382"/>
+                <a:gd name="csX24" fmla="*/ 511104 w 1085707"/>
+                <a:gd name="csY24" fmla="*/ 488669 h 703382"/>
+                <a:gd name="csX25" fmla="*/ 511104 w 1085707"/>
+                <a:gd name="csY25" fmla="*/ 432225 h 703382"/>
+                <a:gd name="csX26" fmla="*/ 550677 w 1085707"/>
+                <a:gd name="csY26" fmla="*/ 432225 h 703382"/>
+                <a:gd name="csX27" fmla="*/ 550677 w 1085707"/>
+                <a:gd name="csY27" fmla="*/ 338966 h 703382"/>
+                <a:gd name="csX28" fmla="*/ 477099 w 1085707"/>
+                <a:gd name="csY28" fmla="*/ 265002 h 703382"/>
+                <a:gd name="csX29" fmla="*/ 477181 w 1085707"/>
+                <a:gd name="csY29" fmla="*/ 233559 h 703382"/>
+                <a:gd name="csX30" fmla="*/ 364498 w 1085707"/>
+                <a:gd name="csY30" fmla="*/ 233559 h 703382"/>
+                <a:gd name="csX31" fmla="*/ 253592 w 1085707"/>
+                <a:gd name="csY31" fmla="*/ 412824 h 703382"/>
+                <a:gd name="csX32" fmla="*/ 243610 w 1085707"/>
+                <a:gd name="csY32" fmla="*/ 633860 h 703382"/>
+                <a:gd name="csX33" fmla="*/ 0 w 1085707"/>
+                <a:gd name="csY33" fmla="*/ 646854 h 703382"/>
+                <a:gd name="csX34" fmla="*/ 109128 w 1085707"/>
+                <a:gd name="csY34" fmla="*/ 405620 h 703382"/>
+                <a:gd name="csX35" fmla="*/ 229131 w 1085707"/>
+                <a:gd name="csY35" fmla="*/ 122470 h 703382"/>
+                <a:gd name="csX36" fmla="*/ 344332 w 1085707"/>
+                <a:gd name="csY36" fmla="*/ 12605 h 703382"/>
+                <a:gd name="csX37" fmla="*/ 344332 w 1085707"/>
+                <a:gd name="csY37" fmla="*/ 1522 h 703382"/>
+                <a:gd name="csX38" fmla="*/ 353346 w 1085707"/>
+                <a:gd name="csY38" fmla="*/ 1522 h 703382"/>
+                <a:gd name="csX39" fmla="*/ 354584 w 1085707"/>
+                <a:gd name="csY39" fmla="*/ 0 h 703382"/>
+                <a:gd name="csX40" fmla="*/ 356456 w 1085707"/>
+                <a:gd name="csY40" fmla="*/ 1522 h 703382"/>
+                <a:gd name="csX41" fmla="*/ 1085707 w 1085707"/>
+                <a:gd name="csY41" fmla="*/ 1522 h 703382"/>
+                <a:gd name="csX0" fmla="*/ 976579 w 976579"/>
+                <a:gd name="csY0" fmla="*/ 1522 h 703382"/>
+                <a:gd name="csX1" fmla="*/ 976579 w 976579"/>
+                <a:gd name="csY1" fmla="*/ 233559 h 703382"/>
+                <a:gd name="csX2" fmla="*/ 975605 w 976579"/>
+                <a:gd name="csY2" fmla="*/ 233559 h 703382"/>
+                <a:gd name="csX3" fmla="*/ 975301 w 976579"/>
+                <a:gd name="csY3" fmla="*/ 350240 h 703382"/>
+                <a:gd name="csX4" fmla="*/ 807132 w 976579"/>
+                <a:gd name="csY4" fmla="*/ 349802 h 703382"/>
+                <a:gd name="csX5" fmla="*/ 807131 w 976579"/>
+                <a:gd name="csY5" fmla="*/ 456025 h 703382"/>
+                <a:gd name="csX6" fmla="*/ 759056 w 976579"/>
+                <a:gd name="csY6" fmla="*/ 456025 h 703382"/>
+                <a:gd name="csX7" fmla="*/ 759056 w 976579"/>
+                <a:gd name="csY7" fmla="*/ 511982 h 703382"/>
+                <a:gd name="csX8" fmla="*/ 674527 w 976579"/>
+                <a:gd name="csY8" fmla="*/ 511982 h 703382"/>
+                <a:gd name="csX9" fmla="*/ 674527 w 976579"/>
+                <a:gd name="csY9" fmla="*/ 568426 h 703382"/>
+                <a:gd name="csX10" fmla="*/ 588927 w 976579"/>
+                <a:gd name="csY10" fmla="*/ 568426 h 703382"/>
+                <a:gd name="csX11" fmla="*/ 588927 w 976579"/>
+                <a:gd name="csY11" fmla="*/ 602140 h 703382"/>
+                <a:gd name="csX12" fmla="*/ 407160 w 976579"/>
+                <a:gd name="csY12" fmla="*/ 602140 h 703382"/>
+                <a:gd name="csX13" fmla="*/ 407160 w 976579"/>
+                <a:gd name="csY13" fmla="*/ 658889 h 703382"/>
+                <a:gd name="csX14" fmla="*/ 339063 w 976579"/>
+                <a:gd name="csY14" fmla="*/ 658889 h 703382"/>
+                <a:gd name="csX15" fmla="*/ 339063 w 976579"/>
+                <a:gd name="csY15" fmla="*/ 703382 h 703382"/>
+                <a:gd name="csX16" fmla="*/ 212084 w 976579"/>
+                <a:gd name="csY16" fmla="*/ 703382 h 703382"/>
+                <a:gd name="csX17" fmla="*/ 212084 w 976579"/>
+                <a:gd name="csY17" fmla="*/ 623625 h 703382"/>
+                <a:gd name="csX18" fmla="*/ 212153 w 976579"/>
+                <a:gd name="csY18" fmla="*/ 623625 h 703382"/>
+                <a:gd name="csX19" fmla="*/ 212153 w 976579"/>
+                <a:gd name="csY19" fmla="*/ 579132 h 703382"/>
+                <a:gd name="csX20" fmla="*/ 248762 w 976579"/>
+                <a:gd name="csY20" fmla="*/ 579132 h 703382"/>
+                <a:gd name="csX21" fmla="*/ 248761 w 976579"/>
+                <a:gd name="csY21" fmla="*/ 522383 h 703382"/>
+                <a:gd name="csX22" fmla="*/ 317447 w 976579"/>
+                <a:gd name="csY22" fmla="*/ 522383 h 703382"/>
+                <a:gd name="csX23" fmla="*/ 317447 w 976579"/>
+                <a:gd name="csY23" fmla="*/ 488669 h 703382"/>
+                <a:gd name="csX24" fmla="*/ 401976 w 976579"/>
+                <a:gd name="csY24" fmla="*/ 488669 h 703382"/>
+                <a:gd name="csX25" fmla="*/ 401976 w 976579"/>
+                <a:gd name="csY25" fmla="*/ 432225 h 703382"/>
+                <a:gd name="csX26" fmla="*/ 441549 w 976579"/>
+                <a:gd name="csY26" fmla="*/ 432225 h 703382"/>
+                <a:gd name="csX27" fmla="*/ 441549 w 976579"/>
+                <a:gd name="csY27" fmla="*/ 338966 h 703382"/>
+                <a:gd name="csX28" fmla="*/ 367971 w 976579"/>
+                <a:gd name="csY28" fmla="*/ 265002 h 703382"/>
+                <a:gd name="csX29" fmla="*/ 368053 w 976579"/>
+                <a:gd name="csY29" fmla="*/ 233559 h 703382"/>
+                <a:gd name="csX30" fmla="*/ 255370 w 976579"/>
+                <a:gd name="csY30" fmla="*/ 233559 h 703382"/>
+                <a:gd name="csX31" fmla="*/ 144464 w 976579"/>
+                <a:gd name="csY31" fmla="*/ 412824 h 703382"/>
+                <a:gd name="csX32" fmla="*/ 134482 w 976579"/>
+                <a:gd name="csY32" fmla="*/ 633860 h 703382"/>
+                <a:gd name="csX33" fmla="*/ 21234 w 976579"/>
+                <a:gd name="csY33" fmla="*/ 657137 h 703382"/>
+                <a:gd name="csX34" fmla="*/ 0 w 976579"/>
+                <a:gd name="csY34" fmla="*/ 405620 h 703382"/>
+                <a:gd name="csX35" fmla="*/ 120003 w 976579"/>
+                <a:gd name="csY35" fmla="*/ 122470 h 703382"/>
+                <a:gd name="csX36" fmla="*/ 235204 w 976579"/>
+                <a:gd name="csY36" fmla="*/ 12605 h 703382"/>
+                <a:gd name="csX37" fmla="*/ 235204 w 976579"/>
+                <a:gd name="csY37" fmla="*/ 1522 h 703382"/>
+                <a:gd name="csX38" fmla="*/ 244218 w 976579"/>
+                <a:gd name="csY38" fmla="*/ 1522 h 703382"/>
+                <a:gd name="csX39" fmla="*/ 245456 w 976579"/>
+                <a:gd name="csY39" fmla="*/ 0 h 703382"/>
+                <a:gd name="csX40" fmla="*/ 247328 w 976579"/>
+                <a:gd name="csY40" fmla="*/ 1522 h 703382"/>
+                <a:gd name="csX41" fmla="*/ 976579 w 976579"/>
+                <a:gd name="csY41" fmla="*/ 1522 h 703382"/>
+                <a:gd name="csX0" fmla="*/ 982597 w 982597"/>
+                <a:gd name="csY0" fmla="*/ 1522 h 703382"/>
+                <a:gd name="csX1" fmla="*/ 982597 w 982597"/>
+                <a:gd name="csY1" fmla="*/ 233559 h 703382"/>
+                <a:gd name="csX2" fmla="*/ 981623 w 982597"/>
+                <a:gd name="csY2" fmla="*/ 233559 h 703382"/>
+                <a:gd name="csX3" fmla="*/ 981319 w 982597"/>
+                <a:gd name="csY3" fmla="*/ 350240 h 703382"/>
+                <a:gd name="csX4" fmla="*/ 813150 w 982597"/>
+                <a:gd name="csY4" fmla="*/ 349802 h 703382"/>
+                <a:gd name="csX5" fmla="*/ 813149 w 982597"/>
+                <a:gd name="csY5" fmla="*/ 456025 h 703382"/>
+                <a:gd name="csX6" fmla="*/ 765074 w 982597"/>
+                <a:gd name="csY6" fmla="*/ 456025 h 703382"/>
+                <a:gd name="csX7" fmla="*/ 765074 w 982597"/>
+                <a:gd name="csY7" fmla="*/ 511982 h 703382"/>
+                <a:gd name="csX8" fmla="*/ 680545 w 982597"/>
+                <a:gd name="csY8" fmla="*/ 511982 h 703382"/>
+                <a:gd name="csX9" fmla="*/ 680545 w 982597"/>
+                <a:gd name="csY9" fmla="*/ 568426 h 703382"/>
+                <a:gd name="csX10" fmla="*/ 594945 w 982597"/>
+                <a:gd name="csY10" fmla="*/ 568426 h 703382"/>
+                <a:gd name="csX11" fmla="*/ 594945 w 982597"/>
+                <a:gd name="csY11" fmla="*/ 602140 h 703382"/>
+                <a:gd name="csX12" fmla="*/ 413178 w 982597"/>
+                <a:gd name="csY12" fmla="*/ 602140 h 703382"/>
+                <a:gd name="csX13" fmla="*/ 413178 w 982597"/>
+                <a:gd name="csY13" fmla="*/ 658889 h 703382"/>
+                <a:gd name="csX14" fmla="*/ 345081 w 982597"/>
+                <a:gd name="csY14" fmla="*/ 658889 h 703382"/>
+                <a:gd name="csX15" fmla="*/ 345081 w 982597"/>
+                <a:gd name="csY15" fmla="*/ 703382 h 703382"/>
+                <a:gd name="csX16" fmla="*/ 218102 w 982597"/>
+                <a:gd name="csY16" fmla="*/ 703382 h 703382"/>
+                <a:gd name="csX17" fmla="*/ 218102 w 982597"/>
+                <a:gd name="csY17" fmla="*/ 623625 h 703382"/>
+                <a:gd name="csX18" fmla="*/ 218171 w 982597"/>
+                <a:gd name="csY18" fmla="*/ 623625 h 703382"/>
+                <a:gd name="csX19" fmla="*/ 218171 w 982597"/>
+                <a:gd name="csY19" fmla="*/ 579132 h 703382"/>
+                <a:gd name="csX20" fmla="*/ 254780 w 982597"/>
+                <a:gd name="csY20" fmla="*/ 579132 h 703382"/>
+                <a:gd name="csX21" fmla="*/ 254779 w 982597"/>
+                <a:gd name="csY21" fmla="*/ 522383 h 703382"/>
+                <a:gd name="csX22" fmla="*/ 323465 w 982597"/>
+                <a:gd name="csY22" fmla="*/ 522383 h 703382"/>
+                <a:gd name="csX23" fmla="*/ 323465 w 982597"/>
+                <a:gd name="csY23" fmla="*/ 488669 h 703382"/>
+                <a:gd name="csX24" fmla="*/ 407994 w 982597"/>
+                <a:gd name="csY24" fmla="*/ 488669 h 703382"/>
+                <a:gd name="csX25" fmla="*/ 407994 w 982597"/>
+                <a:gd name="csY25" fmla="*/ 432225 h 703382"/>
+                <a:gd name="csX26" fmla="*/ 447567 w 982597"/>
+                <a:gd name="csY26" fmla="*/ 432225 h 703382"/>
+                <a:gd name="csX27" fmla="*/ 447567 w 982597"/>
+                <a:gd name="csY27" fmla="*/ 338966 h 703382"/>
+                <a:gd name="csX28" fmla="*/ 373989 w 982597"/>
+                <a:gd name="csY28" fmla="*/ 265002 h 703382"/>
+                <a:gd name="csX29" fmla="*/ 374071 w 982597"/>
+                <a:gd name="csY29" fmla="*/ 233559 h 703382"/>
+                <a:gd name="csX30" fmla="*/ 261388 w 982597"/>
+                <a:gd name="csY30" fmla="*/ 233559 h 703382"/>
+                <a:gd name="csX31" fmla="*/ 150482 w 982597"/>
+                <a:gd name="csY31" fmla="*/ 412824 h 703382"/>
+                <a:gd name="csX32" fmla="*/ 140500 w 982597"/>
+                <a:gd name="csY32" fmla="*/ 633860 h 703382"/>
+                <a:gd name="csX33" fmla="*/ 0 w 982597"/>
+                <a:gd name="csY33" fmla="*/ 630324 h 703382"/>
+                <a:gd name="csX34" fmla="*/ 6018 w 982597"/>
+                <a:gd name="csY34" fmla="*/ 405620 h 703382"/>
+                <a:gd name="csX35" fmla="*/ 126021 w 982597"/>
+                <a:gd name="csY35" fmla="*/ 122470 h 703382"/>
+                <a:gd name="csX36" fmla="*/ 241222 w 982597"/>
+                <a:gd name="csY36" fmla="*/ 12605 h 703382"/>
+                <a:gd name="csX37" fmla="*/ 241222 w 982597"/>
+                <a:gd name="csY37" fmla="*/ 1522 h 703382"/>
+                <a:gd name="csX38" fmla="*/ 250236 w 982597"/>
+                <a:gd name="csY38" fmla="*/ 1522 h 703382"/>
+                <a:gd name="csX39" fmla="*/ 251474 w 982597"/>
+                <a:gd name="csY39" fmla="*/ 0 h 703382"/>
+                <a:gd name="csX40" fmla="*/ 253346 w 982597"/>
+                <a:gd name="csY40" fmla="*/ 1522 h 703382"/>
+                <a:gd name="csX41" fmla="*/ 982597 w 982597"/>
+                <a:gd name="csY41" fmla="*/ 1522 h 703382"/>
+                <a:gd name="csX0" fmla="*/ 982597 w 982597"/>
+                <a:gd name="csY0" fmla="*/ 1522 h 703382"/>
+                <a:gd name="csX1" fmla="*/ 982597 w 982597"/>
+                <a:gd name="csY1" fmla="*/ 233559 h 703382"/>
+                <a:gd name="csX2" fmla="*/ 981623 w 982597"/>
+                <a:gd name="csY2" fmla="*/ 233559 h 703382"/>
+                <a:gd name="csX3" fmla="*/ 981319 w 982597"/>
+                <a:gd name="csY3" fmla="*/ 350240 h 703382"/>
+                <a:gd name="csX4" fmla="*/ 813150 w 982597"/>
+                <a:gd name="csY4" fmla="*/ 349802 h 703382"/>
+                <a:gd name="csX5" fmla="*/ 813149 w 982597"/>
+                <a:gd name="csY5" fmla="*/ 456025 h 703382"/>
+                <a:gd name="csX6" fmla="*/ 765074 w 982597"/>
+                <a:gd name="csY6" fmla="*/ 456025 h 703382"/>
+                <a:gd name="csX7" fmla="*/ 765074 w 982597"/>
+                <a:gd name="csY7" fmla="*/ 511982 h 703382"/>
+                <a:gd name="csX8" fmla="*/ 680545 w 982597"/>
+                <a:gd name="csY8" fmla="*/ 511982 h 703382"/>
+                <a:gd name="csX9" fmla="*/ 680545 w 982597"/>
+                <a:gd name="csY9" fmla="*/ 568426 h 703382"/>
+                <a:gd name="csX10" fmla="*/ 594945 w 982597"/>
+                <a:gd name="csY10" fmla="*/ 568426 h 703382"/>
+                <a:gd name="csX11" fmla="*/ 594945 w 982597"/>
+                <a:gd name="csY11" fmla="*/ 602140 h 703382"/>
+                <a:gd name="csX12" fmla="*/ 413178 w 982597"/>
+                <a:gd name="csY12" fmla="*/ 602140 h 703382"/>
+                <a:gd name="csX13" fmla="*/ 413178 w 982597"/>
+                <a:gd name="csY13" fmla="*/ 658889 h 703382"/>
+                <a:gd name="csX14" fmla="*/ 345081 w 982597"/>
+                <a:gd name="csY14" fmla="*/ 658889 h 703382"/>
+                <a:gd name="csX15" fmla="*/ 345081 w 982597"/>
+                <a:gd name="csY15" fmla="*/ 703382 h 703382"/>
+                <a:gd name="csX16" fmla="*/ 218102 w 982597"/>
+                <a:gd name="csY16" fmla="*/ 703382 h 703382"/>
+                <a:gd name="csX17" fmla="*/ 218102 w 982597"/>
+                <a:gd name="csY17" fmla="*/ 623625 h 703382"/>
+                <a:gd name="csX18" fmla="*/ 218171 w 982597"/>
+                <a:gd name="csY18" fmla="*/ 623625 h 703382"/>
+                <a:gd name="csX19" fmla="*/ 218171 w 982597"/>
+                <a:gd name="csY19" fmla="*/ 579132 h 703382"/>
+                <a:gd name="csX20" fmla="*/ 254780 w 982597"/>
+                <a:gd name="csY20" fmla="*/ 579132 h 703382"/>
+                <a:gd name="csX21" fmla="*/ 254779 w 982597"/>
+                <a:gd name="csY21" fmla="*/ 522383 h 703382"/>
+                <a:gd name="csX22" fmla="*/ 323465 w 982597"/>
+                <a:gd name="csY22" fmla="*/ 522383 h 703382"/>
+                <a:gd name="csX23" fmla="*/ 323465 w 982597"/>
+                <a:gd name="csY23" fmla="*/ 488669 h 703382"/>
+                <a:gd name="csX24" fmla="*/ 407994 w 982597"/>
+                <a:gd name="csY24" fmla="*/ 488669 h 703382"/>
+                <a:gd name="csX25" fmla="*/ 407994 w 982597"/>
+                <a:gd name="csY25" fmla="*/ 432225 h 703382"/>
+                <a:gd name="csX26" fmla="*/ 447567 w 982597"/>
+                <a:gd name="csY26" fmla="*/ 432225 h 703382"/>
+                <a:gd name="csX27" fmla="*/ 447567 w 982597"/>
+                <a:gd name="csY27" fmla="*/ 338966 h 703382"/>
+                <a:gd name="csX28" fmla="*/ 373989 w 982597"/>
+                <a:gd name="csY28" fmla="*/ 265002 h 703382"/>
+                <a:gd name="csX29" fmla="*/ 374071 w 982597"/>
+                <a:gd name="csY29" fmla="*/ 233559 h 703382"/>
+                <a:gd name="csX30" fmla="*/ 261388 w 982597"/>
+                <a:gd name="csY30" fmla="*/ 233559 h 703382"/>
+                <a:gd name="csX31" fmla="*/ 150482 w 982597"/>
+                <a:gd name="csY31" fmla="*/ 412824 h 703382"/>
+                <a:gd name="csX32" fmla="*/ 140500 w 982597"/>
+                <a:gd name="csY32" fmla="*/ 633860 h 703382"/>
+                <a:gd name="csX33" fmla="*/ 0 w 982597"/>
+                <a:gd name="csY33" fmla="*/ 630324 h 703382"/>
+                <a:gd name="csX34" fmla="*/ 6018 w 982597"/>
+                <a:gd name="csY34" fmla="*/ 405620 h 703382"/>
+                <a:gd name="csX35" fmla="*/ 126021 w 982597"/>
+                <a:gd name="csY35" fmla="*/ 122470 h 703382"/>
+                <a:gd name="csX36" fmla="*/ 241222 w 982597"/>
+                <a:gd name="csY36" fmla="*/ 12605 h 703382"/>
+                <a:gd name="csX37" fmla="*/ 241222 w 982597"/>
+                <a:gd name="csY37" fmla="*/ 1522 h 703382"/>
+                <a:gd name="csX38" fmla="*/ 250236 w 982597"/>
+                <a:gd name="csY38" fmla="*/ 1522 h 703382"/>
+                <a:gd name="csX39" fmla="*/ 251474 w 982597"/>
+                <a:gd name="csY39" fmla="*/ 0 h 703382"/>
+                <a:gd name="csX40" fmla="*/ 253346 w 982597"/>
+                <a:gd name="csY40" fmla="*/ 1522 h 703382"/>
+                <a:gd name="csX41" fmla="*/ 982597 w 982597"/>
+                <a:gd name="csY41" fmla="*/ 1522 h 703382"/>
+                <a:gd name="csX0" fmla="*/ 982597 w 982597"/>
+                <a:gd name="csY0" fmla="*/ 1522 h 703382"/>
+                <a:gd name="csX1" fmla="*/ 982597 w 982597"/>
+                <a:gd name="csY1" fmla="*/ 233559 h 703382"/>
+                <a:gd name="csX2" fmla="*/ 981623 w 982597"/>
+                <a:gd name="csY2" fmla="*/ 233559 h 703382"/>
+                <a:gd name="csX3" fmla="*/ 981319 w 982597"/>
+                <a:gd name="csY3" fmla="*/ 350240 h 703382"/>
+                <a:gd name="csX4" fmla="*/ 813150 w 982597"/>
+                <a:gd name="csY4" fmla="*/ 349802 h 703382"/>
+                <a:gd name="csX5" fmla="*/ 792077 w 982597"/>
+                <a:gd name="csY5" fmla="*/ 406413 h 703382"/>
+                <a:gd name="csX6" fmla="*/ 765074 w 982597"/>
+                <a:gd name="csY6" fmla="*/ 456025 h 703382"/>
+                <a:gd name="csX7" fmla="*/ 765074 w 982597"/>
+                <a:gd name="csY7" fmla="*/ 511982 h 703382"/>
+                <a:gd name="csX8" fmla="*/ 680545 w 982597"/>
+                <a:gd name="csY8" fmla="*/ 511982 h 703382"/>
+                <a:gd name="csX9" fmla="*/ 680545 w 982597"/>
+                <a:gd name="csY9" fmla="*/ 568426 h 703382"/>
+                <a:gd name="csX10" fmla="*/ 594945 w 982597"/>
+                <a:gd name="csY10" fmla="*/ 568426 h 703382"/>
+                <a:gd name="csX11" fmla="*/ 594945 w 982597"/>
+                <a:gd name="csY11" fmla="*/ 602140 h 703382"/>
+                <a:gd name="csX12" fmla="*/ 413178 w 982597"/>
+                <a:gd name="csY12" fmla="*/ 602140 h 703382"/>
+                <a:gd name="csX13" fmla="*/ 413178 w 982597"/>
+                <a:gd name="csY13" fmla="*/ 658889 h 703382"/>
+                <a:gd name="csX14" fmla="*/ 345081 w 982597"/>
+                <a:gd name="csY14" fmla="*/ 658889 h 703382"/>
+                <a:gd name="csX15" fmla="*/ 345081 w 982597"/>
+                <a:gd name="csY15" fmla="*/ 703382 h 703382"/>
+                <a:gd name="csX16" fmla="*/ 218102 w 982597"/>
+                <a:gd name="csY16" fmla="*/ 703382 h 703382"/>
+                <a:gd name="csX17" fmla="*/ 218102 w 982597"/>
+                <a:gd name="csY17" fmla="*/ 623625 h 703382"/>
+                <a:gd name="csX18" fmla="*/ 218171 w 982597"/>
+                <a:gd name="csY18" fmla="*/ 623625 h 703382"/>
+                <a:gd name="csX19" fmla="*/ 218171 w 982597"/>
+                <a:gd name="csY19" fmla="*/ 579132 h 703382"/>
+                <a:gd name="csX20" fmla="*/ 254780 w 982597"/>
+                <a:gd name="csY20" fmla="*/ 579132 h 703382"/>
+                <a:gd name="csX21" fmla="*/ 254779 w 982597"/>
+                <a:gd name="csY21" fmla="*/ 522383 h 703382"/>
+                <a:gd name="csX22" fmla="*/ 323465 w 982597"/>
+                <a:gd name="csY22" fmla="*/ 522383 h 703382"/>
+                <a:gd name="csX23" fmla="*/ 323465 w 982597"/>
+                <a:gd name="csY23" fmla="*/ 488669 h 703382"/>
+                <a:gd name="csX24" fmla="*/ 407994 w 982597"/>
+                <a:gd name="csY24" fmla="*/ 488669 h 703382"/>
+                <a:gd name="csX25" fmla="*/ 407994 w 982597"/>
+                <a:gd name="csY25" fmla="*/ 432225 h 703382"/>
+                <a:gd name="csX26" fmla="*/ 447567 w 982597"/>
+                <a:gd name="csY26" fmla="*/ 432225 h 703382"/>
+                <a:gd name="csX27" fmla="*/ 447567 w 982597"/>
+                <a:gd name="csY27" fmla="*/ 338966 h 703382"/>
+                <a:gd name="csX28" fmla="*/ 373989 w 982597"/>
+                <a:gd name="csY28" fmla="*/ 265002 h 703382"/>
+                <a:gd name="csX29" fmla="*/ 374071 w 982597"/>
+                <a:gd name="csY29" fmla="*/ 233559 h 703382"/>
+                <a:gd name="csX30" fmla="*/ 261388 w 982597"/>
+                <a:gd name="csY30" fmla="*/ 233559 h 703382"/>
+                <a:gd name="csX31" fmla="*/ 150482 w 982597"/>
+                <a:gd name="csY31" fmla="*/ 412824 h 703382"/>
+                <a:gd name="csX32" fmla="*/ 140500 w 982597"/>
+                <a:gd name="csY32" fmla="*/ 633860 h 703382"/>
+                <a:gd name="csX33" fmla="*/ 0 w 982597"/>
+                <a:gd name="csY33" fmla="*/ 630324 h 703382"/>
+                <a:gd name="csX34" fmla="*/ 6018 w 982597"/>
+                <a:gd name="csY34" fmla="*/ 405620 h 703382"/>
+                <a:gd name="csX35" fmla="*/ 126021 w 982597"/>
+                <a:gd name="csY35" fmla="*/ 122470 h 703382"/>
+                <a:gd name="csX36" fmla="*/ 241222 w 982597"/>
+                <a:gd name="csY36" fmla="*/ 12605 h 703382"/>
+                <a:gd name="csX37" fmla="*/ 241222 w 982597"/>
+                <a:gd name="csY37" fmla="*/ 1522 h 703382"/>
+                <a:gd name="csX38" fmla="*/ 250236 w 982597"/>
+                <a:gd name="csY38" fmla="*/ 1522 h 703382"/>
+                <a:gd name="csX39" fmla="*/ 251474 w 982597"/>
+                <a:gd name="csY39" fmla="*/ 0 h 703382"/>
+                <a:gd name="csX40" fmla="*/ 253346 w 982597"/>
+                <a:gd name="csY40" fmla="*/ 1522 h 703382"/>
+                <a:gd name="csX41" fmla="*/ 982597 w 982597"/>
+                <a:gd name="csY41" fmla="*/ 1522 h 703382"/>
+                <a:gd name="csX0" fmla="*/ 982597 w 982597"/>
+                <a:gd name="csY0" fmla="*/ 1522 h 703382"/>
+                <a:gd name="csX1" fmla="*/ 982597 w 982597"/>
+                <a:gd name="csY1" fmla="*/ 233559 h 703382"/>
+                <a:gd name="csX2" fmla="*/ 981623 w 982597"/>
+                <a:gd name="csY2" fmla="*/ 233559 h 703382"/>
+                <a:gd name="csX3" fmla="*/ 981319 w 982597"/>
+                <a:gd name="csY3" fmla="*/ 350240 h 703382"/>
+                <a:gd name="csX4" fmla="*/ 813150 w 982597"/>
+                <a:gd name="csY4" fmla="*/ 349802 h 703382"/>
+                <a:gd name="csX5" fmla="*/ 792077 w 982597"/>
+                <a:gd name="csY5" fmla="*/ 406413 h 703382"/>
+                <a:gd name="csX6" fmla="*/ 765074 w 982597"/>
+                <a:gd name="csY6" fmla="*/ 456025 h 703382"/>
+                <a:gd name="csX7" fmla="*/ 733223 w 982597"/>
+                <a:gd name="csY7" fmla="*/ 483943 h 703382"/>
+                <a:gd name="csX8" fmla="*/ 680545 w 982597"/>
+                <a:gd name="csY8" fmla="*/ 511982 h 703382"/>
+                <a:gd name="csX9" fmla="*/ 680545 w 982597"/>
+                <a:gd name="csY9" fmla="*/ 568426 h 703382"/>
+                <a:gd name="csX10" fmla="*/ 594945 w 982597"/>
+                <a:gd name="csY10" fmla="*/ 568426 h 703382"/>
+                <a:gd name="csX11" fmla="*/ 594945 w 982597"/>
+                <a:gd name="csY11" fmla="*/ 602140 h 703382"/>
+                <a:gd name="csX12" fmla="*/ 413178 w 982597"/>
+                <a:gd name="csY12" fmla="*/ 602140 h 703382"/>
+                <a:gd name="csX13" fmla="*/ 413178 w 982597"/>
+                <a:gd name="csY13" fmla="*/ 658889 h 703382"/>
+                <a:gd name="csX14" fmla="*/ 345081 w 982597"/>
+                <a:gd name="csY14" fmla="*/ 658889 h 703382"/>
+                <a:gd name="csX15" fmla="*/ 345081 w 982597"/>
+                <a:gd name="csY15" fmla="*/ 703382 h 703382"/>
+                <a:gd name="csX16" fmla="*/ 218102 w 982597"/>
+                <a:gd name="csY16" fmla="*/ 703382 h 703382"/>
+                <a:gd name="csX17" fmla="*/ 218102 w 982597"/>
+                <a:gd name="csY17" fmla="*/ 623625 h 703382"/>
+                <a:gd name="csX18" fmla="*/ 218171 w 982597"/>
+                <a:gd name="csY18" fmla="*/ 623625 h 703382"/>
+                <a:gd name="csX19" fmla="*/ 218171 w 982597"/>
+                <a:gd name="csY19" fmla="*/ 579132 h 703382"/>
+                <a:gd name="csX20" fmla="*/ 254780 w 982597"/>
+                <a:gd name="csY20" fmla="*/ 579132 h 703382"/>
+                <a:gd name="csX21" fmla="*/ 254779 w 982597"/>
+                <a:gd name="csY21" fmla="*/ 522383 h 703382"/>
+                <a:gd name="csX22" fmla="*/ 323465 w 982597"/>
+                <a:gd name="csY22" fmla="*/ 522383 h 703382"/>
+                <a:gd name="csX23" fmla="*/ 323465 w 982597"/>
+                <a:gd name="csY23" fmla="*/ 488669 h 703382"/>
+                <a:gd name="csX24" fmla="*/ 407994 w 982597"/>
+                <a:gd name="csY24" fmla="*/ 488669 h 703382"/>
+                <a:gd name="csX25" fmla="*/ 407994 w 982597"/>
+                <a:gd name="csY25" fmla="*/ 432225 h 703382"/>
+                <a:gd name="csX26" fmla="*/ 447567 w 982597"/>
+                <a:gd name="csY26" fmla="*/ 432225 h 703382"/>
+                <a:gd name="csX27" fmla="*/ 447567 w 982597"/>
+                <a:gd name="csY27" fmla="*/ 338966 h 703382"/>
+                <a:gd name="csX28" fmla="*/ 373989 w 982597"/>
+                <a:gd name="csY28" fmla="*/ 265002 h 703382"/>
+                <a:gd name="csX29" fmla="*/ 374071 w 982597"/>
+                <a:gd name="csY29" fmla="*/ 233559 h 703382"/>
+                <a:gd name="csX30" fmla="*/ 261388 w 982597"/>
+                <a:gd name="csY30" fmla="*/ 233559 h 703382"/>
+                <a:gd name="csX31" fmla="*/ 150482 w 982597"/>
+                <a:gd name="csY31" fmla="*/ 412824 h 703382"/>
+                <a:gd name="csX32" fmla="*/ 140500 w 982597"/>
+                <a:gd name="csY32" fmla="*/ 633860 h 703382"/>
+                <a:gd name="csX33" fmla="*/ 0 w 982597"/>
+                <a:gd name="csY33" fmla="*/ 630324 h 703382"/>
+                <a:gd name="csX34" fmla="*/ 6018 w 982597"/>
+                <a:gd name="csY34" fmla="*/ 405620 h 703382"/>
+                <a:gd name="csX35" fmla="*/ 126021 w 982597"/>
+                <a:gd name="csY35" fmla="*/ 122470 h 703382"/>
+                <a:gd name="csX36" fmla="*/ 241222 w 982597"/>
+                <a:gd name="csY36" fmla="*/ 12605 h 703382"/>
+                <a:gd name="csX37" fmla="*/ 241222 w 982597"/>
+                <a:gd name="csY37" fmla="*/ 1522 h 703382"/>
+                <a:gd name="csX38" fmla="*/ 250236 w 982597"/>
+                <a:gd name="csY38" fmla="*/ 1522 h 703382"/>
+                <a:gd name="csX39" fmla="*/ 251474 w 982597"/>
+                <a:gd name="csY39" fmla="*/ 0 h 703382"/>
+                <a:gd name="csX40" fmla="*/ 253346 w 982597"/>
+                <a:gd name="csY40" fmla="*/ 1522 h 703382"/>
+                <a:gd name="csX41" fmla="*/ 982597 w 982597"/>
+                <a:gd name="csY41" fmla="*/ 1522 h 703382"/>
+                <a:gd name="csX0" fmla="*/ 982597 w 982597"/>
+                <a:gd name="csY0" fmla="*/ 1522 h 703382"/>
+                <a:gd name="csX1" fmla="*/ 982597 w 982597"/>
+                <a:gd name="csY1" fmla="*/ 233559 h 703382"/>
+                <a:gd name="csX2" fmla="*/ 981623 w 982597"/>
+                <a:gd name="csY2" fmla="*/ 233559 h 703382"/>
+                <a:gd name="csX3" fmla="*/ 981319 w 982597"/>
+                <a:gd name="csY3" fmla="*/ 350240 h 703382"/>
+                <a:gd name="csX4" fmla="*/ 813150 w 982597"/>
+                <a:gd name="csY4" fmla="*/ 349802 h 703382"/>
+                <a:gd name="csX5" fmla="*/ 792077 w 982597"/>
+                <a:gd name="csY5" fmla="*/ 406413 h 703382"/>
+                <a:gd name="csX6" fmla="*/ 765074 w 982597"/>
+                <a:gd name="csY6" fmla="*/ 456025 h 703382"/>
+                <a:gd name="csX7" fmla="*/ 733223 w 982597"/>
+                <a:gd name="csY7" fmla="*/ 483943 h 703382"/>
+                <a:gd name="csX8" fmla="*/ 680545 w 982597"/>
+                <a:gd name="csY8" fmla="*/ 511982 h 703382"/>
+                <a:gd name="csX9" fmla="*/ 634551 w 982597"/>
+                <a:gd name="csY9" fmla="*/ 556175 h 703382"/>
+                <a:gd name="csX10" fmla="*/ 594945 w 982597"/>
+                <a:gd name="csY10" fmla="*/ 568426 h 703382"/>
+                <a:gd name="csX11" fmla="*/ 594945 w 982597"/>
+                <a:gd name="csY11" fmla="*/ 602140 h 703382"/>
+                <a:gd name="csX12" fmla="*/ 413178 w 982597"/>
+                <a:gd name="csY12" fmla="*/ 602140 h 703382"/>
+                <a:gd name="csX13" fmla="*/ 413178 w 982597"/>
+                <a:gd name="csY13" fmla="*/ 658889 h 703382"/>
+                <a:gd name="csX14" fmla="*/ 345081 w 982597"/>
+                <a:gd name="csY14" fmla="*/ 658889 h 703382"/>
+                <a:gd name="csX15" fmla="*/ 345081 w 982597"/>
+                <a:gd name="csY15" fmla="*/ 703382 h 703382"/>
+                <a:gd name="csX16" fmla="*/ 218102 w 982597"/>
+                <a:gd name="csY16" fmla="*/ 703382 h 703382"/>
+                <a:gd name="csX17" fmla="*/ 218102 w 982597"/>
+                <a:gd name="csY17" fmla="*/ 623625 h 703382"/>
+                <a:gd name="csX18" fmla="*/ 218171 w 982597"/>
+                <a:gd name="csY18" fmla="*/ 623625 h 703382"/>
+                <a:gd name="csX19" fmla="*/ 218171 w 982597"/>
+                <a:gd name="csY19" fmla="*/ 579132 h 703382"/>
+                <a:gd name="csX20" fmla="*/ 254780 w 982597"/>
+                <a:gd name="csY20" fmla="*/ 579132 h 703382"/>
+                <a:gd name="csX21" fmla="*/ 254779 w 982597"/>
+                <a:gd name="csY21" fmla="*/ 522383 h 703382"/>
+                <a:gd name="csX22" fmla="*/ 323465 w 982597"/>
+                <a:gd name="csY22" fmla="*/ 522383 h 703382"/>
+                <a:gd name="csX23" fmla="*/ 323465 w 982597"/>
+                <a:gd name="csY23" fmla="*/ 488669 h 703382"/>
+                <a:gd name="csX24" fmla="*/ 407994 w 982597"/>
+                <a:gd name="csY24" fmla="*/ 488669 h 703382"/>
+                <a:gd name="csX25" fmla="*/ 407994 w 982597"/>
+                <a:gd name="csY25" fmla="*/ 432225 h 703382"/>
+                <a:gd name="csX26" fmla="*/ 447567 w 982597"/>
+                <a:gd name="csY26" fmla="*/ 432225 h 703382"/>
+                <a:gd name="csX27" fmla="*/ 447567 w 982597"/>
+                <a:gd name="csY27" fmla="*/ 338966 h 703382"/>
+                <a:gd name="csX28" fmla="*/ 373989 w 982597"/>
+                <a:gd name="csY28" fmla="*/ 265002 h 703382"/>
+                <a:gd name="csX29" fmla="*/ 374071 w 982597"/>
+                <a:gd name="csY29" fmla="*/ 233559 h 703382"/>
+                <a:gd name="csX30" fmla="*/ 261388 w 982597"/>
+                <a:gd name="csY30" fmla="*/ 233559 h 703382"/>
+                <a:gd name="csX31" fmla="*/ 150482 w 982597"/>
+                <a:gd name="csY31" fmla="*/ 412824 h 703382"/>
+                <a:gd name="csX32" fmla="*/ 140500 w 982597"/>
+                <a:gd name="csY32" fmla="*/ 633860 h 703382"/>
+                <a:gd name="csX33" fmla="*/ 0 w 982597"/>
+                <a:gd name="csY33" fmla="*/ 630324 h 703382"/>
+                <a:gd name="csX34" fmla="*/ 6018 w 982597"/>
+                <a:gd name="csY34" fmla="*/ 405620 h 703382"/>
+                <a:gd name="csX35" fmla="*/ 126021 w 982597"/>
+                <a:gd name="csY35" fmla="*/ 122470 h 703382"/>
+                <a:gd name="csX36" fmla="*/ 241222 w 982597"/>
+                <a:gd name="csY36" fmla="*/ 12605 h 703382"/>
+                <a:gd name="csX37" fmla="*/ 241222 w 982597"/>
+                <a:gd name="csY37" fmla="*/ 1522 h 703382"/>
+                <a:gd name="csX38" fmla="*/ 250236 w 982597"/>
+                <a:gd name="csY38" fmla="*/ 1522 h 703382"/>
+                <a:gd name="csX39" fmla="*/ 251474 w 982597"/>
+                <a:gd name="csY39" fmla="*/ 0 h 703382"/>
+                <a:gd name="csX40" fmla="*/ 253346 w 982597"/>
+                <a:gd name="csY40" fmla="*/ 1522 h 703382"/>
+                <a:gd name="csX41" fmla="*/ 982597 w 982597"/>
+                <a:gd name="csY41" fmla="*/ 1522 h 703382"/>
+                <a:gd name="csX0" fmla="*/ 982597 w 982597"/>
+                <a:gd name="csY0" fmla="*/ 1522 h 703382"/>
+                <a:gd name="csX1" fmla="*/ 982597 w 982597"/>
+                <a:gd name="csY1" fmla="*/ 233559 h 703382"/>
+                <a:gd name="csX2" fmla="*/ 981623 w 982597"/>
+                <a:gd name="csY2" fmla="*/ 233559 h 703382"/>
+                <a:gd name="csX3" fmla="*/ 981319 w 982597"/>
+                <a:gd name="csY3" fmla="*/ 350240 h 703382"/>
+                <a:gd name="csX4" fmla="*/ 813150 w 982597"/>
+                <a:gd name="csY4" fmla="*/ 349802 h 703382"/>
+                <a:gd name="csX5" fmla="*/ 792077 w 982597"/>
+                <a:gd name="csY5" fmla="*/ 406413 h 703382"/>
+                <a:gd name="csX6" fmla="*/ 765074 w 982597"/>
+                <a:gd name="csY6" fmla="*/ 456025 h 703382"/>
+                <a:gd name="csX7" fmla="*/ 733223 w 982597"/>
+                <a:gd name="csY7" fmla="*/ 483943 h 703382"/>
+                <a:gd name="csX8" fmla="*/ 680545 w 982597"/>
+                <a:gd name="csY8" fmla="*/ 511982 h 703382"/>
+                <a:gd name="csX9" fmla="*/ 634551 w 982597"/>
+                <a:gd name="csY9" fmla="*/ 556175 h 703382"/>
+                <a:gd name="csX10" fmla="*/ 594945 w 982597"/>
+                <a:gd name="csY10" fmla="*/ 568426 h 703382"/>
+                <a:gd name="csX11" fmla="*/ 534262 w 982597"/>
+                <a:gd name="csY11" fmla="*/ 571310 h 703382"/>
+                <a:gd name="csX12" fmla="*/ 413178 w 982597"/>
+                <a:gd name="csY12" fmla="*/ 602140 h 703382"/>
+                <a:gd name="csX13" fmla="*/ 413178 w 982597"/>
+                <a:gd name="csY13" fmla="*/ 658889 h 703382"/>
+                <a:gd name="csX14" fmla="*/ 345081 w 982597"/>
+                <a:gd name="csY14" fmla="*/ 658889 h 703382"/>
+                <a:gd name="csX15" fmla="*/ 345081 w 982597"/>
+                <a:gd name="csY15" fmla="*/ 703382 h 703382"/>
+                <a:gd name="csX16" fmla="*/ 218102 w 982597"/>
+                <a:gd name="csY16" fmla="*/ 703382 h 703382"/>
+                <a:gd name="csX17" fmla="*/ 218102 w 982597"/>
+                <a:gd name="csY17" fmla="*/ 623625 h 703382"/>
+                <a:gd name="csX18" fmla="*/ 218171 w 982597"/>
+                <a:gd name="csY18" fmla="*/ 623625 h 703382"/>
+                <a:gd name="csX19" fmla="*/ 218171 w 982597"/>
+                <a:gd name="csY19" fmla="*/ 579132 h 703382"/>
+                <a:gd name="csX20" fmla="*/ 254780 w 982597"/>
+                <a:gd name="csY20" fmla="*/ 579132 h 703382"/>
+                <a:gd name="csX21" fmla="*/ 254779 w 982597"/>
+                <a:gd name="csY21" fmla="*/ 522383 h 703382"/>
+                <a:gd name="csX22" fmla="*/ 323465 w 982597"/>
+                <a:gd name="csY22" fmla="*/ 522383 h 703382"/>
+                <a:gd name="csX23" fmla="*/ 323465 w 982597"/>
+                <a:gd name="csY23" fmla="*/ 488669 h 703382"/>
+                <a:gd name="csX24" fmla="*/ 407994 w 982597"/>
+                <a:gd name="csY24" fmla="*/ 488669 h 703382"/>
+                <a:gd name="csX25" fmla="*/ 407994 w 982597"/>
+                <a:gd name="csY25" fmla="*/ 432225 h 703382"/>
+                <a:gd name="csX26" fmla="*/ 447567 w 982597"/>
+                <a:gd name="csY26" fmla="*/ 432225 h 703382"/>
+                <a:gd name="csX27" fmla="*/ 447567 w 982597"/>
+                <a:gd name="csY27" fmla="*/ 338966 h 703382"/>
+                <a:gd name="csX28" fmla="*/ 373989 w 982597"/>
+                <a:gd name="csY28" fmla="*/ 265002 h 703382"/>
+                <a:gd name="csX29" fmla="*/ 374071 w 982597"/>
+                <a:gd name="csY29" fmla="*/ 233559 h 703382"/>
+                <a:gd name="csX30" fmla="*/ 261388 w 982597"/>
+                <a:gd name="csY30" fmla="*/ 233559 h 703382"/>
+                <a:gd name="csX31" fmla="*/ 150482 w 982597"/>
+                <a:gd name="csY31" fmla="*/ 412824 h 703382"/>
+                <a:gd name="csX32" fmla="*/ 140500 w 982597"/>
+                <a:gd name="csY32" fmla="*/ 633860 h 703382"/>
+                <a:gd name="csX33" fmla="*/ 0 w 982597"/>
+                <a:gd name="csY33" fmla="*/ 630324 h 703382"/>
+                <a:gd name="csX34" fmla="*/ 6018 w 982597"/>
+                <a:gd name="csY34" fmla="*/ 405620 h 703382"/>
+                <a:gd name="csX35" fmla="*/ 126021 w 982597"/>
+                <a:gd name="csY35" fmla="*/ 122470 h 703382"/>
+                <a:gd name="csX36" fmla="*/ 241222 w 982597"/>
+                <a:gd name="csY36" fmla="*/ 12605 h 703382"/>
+                <a:gd name="csX37" fmla="*/ 241222 w 982597"/>
+                <a:gd name="csY37" fmla="*/ 1522 h 703382"/>
+                <a:gd name="csX38" fmla="*/ 250236 w 982597"/>
+                <a:gd name="csY38" fmla="*/ 1522 h 703382"/>
+                <a:gd name="csX39" fmla="*/ 251474 w 982597"/>
+                <a:gd name="csY39" fmla="*/ 0 h 703382"/>
+                <a:gd name="csX40" fmla="*/ 253346 w 982597"/>
+                <a:gd name="csY40" fmla="*/ 1522 h 703382"/>
+                <a:gd name="csX41" fmla="*/ 982597 w 982597"/>
+                <a:gd name="csY41" fmla="*/ 1522 h 703382"/>
+              </a:gdLst>
+              <a:ahLst/>
+              <a:cxnLst>
+                <a:cxn ang="0">
+                  <a:pos x="csX0" y="csY0"/>
+                </a:cxn>
+                <a:cxn ang="0">
+                  <a:pos x="csX1" y="csY1"/>
+                </a:cxn>
+                <a:cxn ang="0">
+                  <a:pos x="csX2" y="csY2"/>
+                </a:cxn>
+                <a:cxn ang="0">
+                  <a:pos x="csX3" y="csY3"/>
+                </a:cxn>
+                <a:cxn ang="0">
+                  <a:pos x="csX4" y="csY4"/>
+                </a:cxn>
+                <a:cxn ang="0">
+                  <a:pos x="csX5" y="csY5"/>
+                </a:cxn>
+                <a:cxn ang="0">
+                  <a:pos x="csX6" y="csY6"/>
+                </a:cxn>
+                <a:cxn ang="0">
+                  <a:pos x="csX7" y="csY7"/>
+                </a:cxn>
+                <a:cxn ang="0">
+                  <a:pos x="csX8" y="csY8"/>
+                </a:cxn>
+                <a:cxn ang="0">
+                  <a:pos x="csX9" y="csY9"/>
+                </a:cxn>
+                <a:cxn ang="0">
+                  <a:pos x="csX10" y="csY10"/>
+                </a:cxn>
+                <a:cxn ang="0">
+                  <a:pos x="csX11" y="csY11"/>
+                </a:cxn>
+                <a:cxn ang="0">
+                  <a:pos x="csX12" y="csY12"/>
+                </a:cxn>
+                <a:cxn ang="0">
+                  <a:pos x="csX13" y="csY13"/>
+                </a:cxn>
+                <a:cxn ang="0">
+                  <a:pos x="csX14" y="csY14"/>
+                </a:cxn>
+                <a:cxn ang="0">
+                  <a:pos x="csX15" y="csY15"/>
+                </a:cxn>
+                <a:cxn ang="0">
+                  <a:pos x="csX16" y="csY16"/>
+                </a:cxn>
+                <a:cxn ang="0">
+                  <a:pos x="csX17" y="csY17"/>
+                </a:cxn>
+                <a:cxn ang="0">
+                  <a:pos x="csX18" y="csY18"/>
+                </a:cxn>
+                <a:cxn ang="0">
+                  <a:pos x="csX19" y="csY19"/>
+                </a:cxn>
+                <a:cxn ang="0">
+                  <a:pos x="csX20" y="csY20"/>
+                </a:cxn>
+                <a:cxn ang="0">
+                  <a:pos x="csX21" y="csY21"/>
+                </a:cxn>
+                <a:cxn ang="0">
+                  <a:pos x="csX22" y="csY22"/>
+                </a:cxn>
+                <a:cxn ang="0">
+                  <a:pos x="csX23" y="csY23"/>
+                </a:cxn>
+                <a:cxn ang="0">
+                  <a:pos x="csX24" y="csY24"/>
+                </a:cxn>
+                <a:cxn ang="0">
+                  <a:pos x="csX25" y="csY25"/>
+                </a:cxn>
+                <a:cxn ang="0">
+                  <a:pos x="csX26" y="csY26"/>
+                </a:cxn>
+                <a:cxn ang="0">
+                  <a:pos x="csX27" y="csY27"/>
+                </a:cxn>
+                <a:cxn ang="0">
+                  <a:pos x="csX28" y="csY28"/>
+                </a:cxn>
+                <a:cxn ang="0">
+                  <a:pos x="csX29" y="csY29"/>
+                </a:cxn>
+                <a:cxn ang="0">
+                  <a:pos x="csX30" y="csY30"/>
+                </a:cxn>
+                <a:cxn ang="0">
+                  <a:pos x="csX31" y="csY31"/>
+                </a:cxn>
+                <a:cxn ang="0">
+                  <a:pos x="csX32" y="csY32"/>
+                </a:cxn>
+                <a:cxn ang="0">
+                  <a:pos x="csX33" y="csY33"/>
+                </a:cxn>
+                <a:cxn ang="0">
+                  <a:pos x="csX34" y="csY34"/>
+                </a:cxn>
+                <a:cxn ang="0">
+                  <a:pos x="csX35" y="csY35"/>
+                </a:cxn>
+                <a:cxn ang="0">
+                  <a:pos x="csX36" y="csY36"/>
+                </a:cxn>
+                <a:cxn ang="0">
+                  <a:pos x="csX37" y="csY37"/>
+                </a:cxn>
+                <a:cxn ang="0">
+                  <a:pos x="csX38" y="csY38"/>
+                </a:cxn>
+                <a:cxn ang="0">
+                  <a:pos x="csX39" y="csY39"/>
+                </a:cxn>
+                <a:cxn ang="0">
+                  <a:pos x="csX40" y="csY40"/>
+                </a:cxn>
+                <a:cxn ang="0">
+                  <a:pos x="csX41" y="csY41"/>
+                </a:cxn>
+              </a:cxnLst>
+              <a:rect l="l" t="t" r="r" b="b"/>
+              <a:pathLst>
+                <a:path w="982597" h="703382">
+                  <a:moveTo>
+                    <a:pt x="982597" y="1522"/>
+                  </a:moveTo>
+                  <a:lnTo>
+                    <a:pt x="982597" y="233559"/>
+                  </a:lnTo>
+                  <a:lnTo>
+                    <a:pt x="981623" y="233559"/>
+                  </a:lnTo>
+                  <a:cubicBezTo>
+                    <a:pt x="981522" y="272453"/>
+                    <a:pt x="981420" y="311346"/>
+                    <a:pt x="981319" y="350240"/>
+                  </a:cubicBezTo>
+                  <a:lnTo>
+                    <a:pt x="813150" y="349802"/>
+                  </a:lnTo>
+                  <a:cubicBezTo>
+                    <a:pt x="813150" y="385210"/>
+                    <a:pt x="792077" y="371005"/>
+                    <a:pt x="792077" y="406413"/>
+                  </a:cubicBezTo>
+                  <a:lnTo>
+                    <a:pt x="765074" y="456025"/>
+                  </a:lnTo>
+                  <a:lnTo>
+                    <a:pt x="733223" y="483943"/>
+                  </a:lnTo>
+                  <a:lnTo>
+                    <a:pt x="680545" y="511982"/>
+                  </a:lnTo>
+                  <a:lnTo>
+                    <a:pt x="634551" y="556175"/>
+                  </a:lnTo>
+                  <a:lnTo>
+                    <a:pt x="594945" y="568426"/>
+                  </a:lnTo>
+                  <a:lnTo>
+                    <a:pt x="534262" y="571310"/>
+                  </a:lnTo>
+                  <a:lnTo>
+                    <a:pt x="413178" y="602140"/>
+                  </a:lnTo>
+                  <a:lnTo>
+                    <a:pt x="413178" y="658889"/>
+                  </a:lnTo>
+                  <a:lnTo>
+                    <a:pt x="345081" y="658889"/>
+                  </a:lnTo>
+                  <a:lnTo>
+                    <a:pt x="345081" y="703382"/>
+                  </a:lnTo>
+                  <a:lnTo>
+                    <a:pt x="218102" y="703382"/>
+                  </a:lnTo>
+                  <a:lnTo>
+                    <a:pt x="218102" y="623625"/>
+                  </a:lnTo>
+                  <a:lnTo>
+                    <a:pt x="218171" y="623625"/>
+                  </a:lnTo>
+                  <a:lnTo>
+                    <a:pt x="218171" y="579132"/>
+                  </a:lnTo>
+                  <a:lnTo>
+                    <a:pt x="254780" y="579132"/>
+                  </a:lnTo>
+                  <a:cubicBezTo>
+                    <a:pt x="254780" y="560216"/>
+                    <a:pt x="254779" y="541299"/>
+                    <a:pt x="254779" y="522383"/>
+                  </a:cubicBezTo>
+                  <a:lnTo>
+                    <a:pt x="323465" y="522383"/>
+                  </a:lnTo>
+                  <a:lnTo>
+                    <a:pt x="323465" y="488669"/>
+                  </a:lnTo>
+                  <a:lnTo>
+                    <a:pt x="407994" y="488669"/>
+                  </a:lnTo>
+                  <a:lnTo>
+                    <a:pt x="407994" y="432225"/>
+                  </a:lnTo>
+                  <a:lnTo>
+                    <a:pt x="447567" y="432225"/>
+                  </a:lnTo>
+                  <a:lnTo>
+                    <a:pt x="447567" y="338966"/>
+                  </a:lnTo>
+                  <a:lnTo>
+                    <a:pt x="373989" y="265002"/>
+                  </a:lnTo>
+                  <a:cubicBezTo>
+                    <a:pt x="374016" y="254521"/>
+                    <a:pt x="374044" y="244040"/>
+                    <a:pt x="374071" y="233559"/>
+                  </a:cubicBezTo>
+                  <a:lnTo>
+                    <a:pt x="261388" y="233559"/>
+                  </a:lnTo>
+                  <a:lnTo>
+                    <a:pt x="150482" y="412824"/>
+                  </a:lnTo>
+                  <a:lnTo>
+                    <a:pt x="140500" y="633860"/>
+                  </a:lnTo>
+                  <a:cubicBezTo>
+                    <a:pt x="93667" y="632681"/>
+                    <a:pt x="78684" y="659542"/>
+                    <a:pt x="0" y="630324"/>
+                  </a:cubicBezTo>
+                  <a:lnTo>
+                    <a:pt x="6018" y="405620"/>
+                  </a:lnTo>
+                  <a:lnTo>
+                    <a:pt x="126021" y="122470"/>
+                  </a:lnTo>
+                  <a:lnTo>
+                    <a:pt x="241222" y="12605"/>
+                  </a:lnTo>
+                  <a:lnTo>
+                    <a:pt x="241222" y="1522"/>
+                  </a:lnTo>
+                  <a:lnTo>
+                    <a:pt x="250236" y="1522"/>
+                  </a:lnTo>
+                  <a:lnTo>
+                    <a:pt x="251474" y="0"/>
+                  </a:lnTo>
+                  <a:lnTo>
+                    <a:pt x="253346" y="1522"/>
+                  </a:lnTo>
+                  <a:lnTo>
+                    <a:pt x="982597" y="1522"/>
+                  </a:lnTo>
+                  <a:close/>
+                </a:path>
+              </a:pathLst>
+            </a:custGeom>
+            <a:solidFill>
+              <a:schemeClr val="bg1"/>
+            </a:solidFill>
+            <a:ln>
+              <a:noFill/>
+            </a:ln>
+          </p:spPr>
+          <p:style>
+            <a:lnRef idx="2">
+              <a:schemeClr val="accent1">
+                <a:shade val="15000"/>
+              </a:schemeClr>
+            </a:lnRef>
+            <a:fillRef idx="1">
+              <a:schemeClr val="accent1"/>
+            </a:fillRef>
+            <a:effectRef idx="0">
+              <a:schemeClr val="accent1"/>
+            </a:effectRef>
+            <a:fontRef idx="minor">
+              <a:schemeClr val="lt1"/>
+            </a:fontRef>
+          </p:style>
+          <p:txBody>
+            <a:bodyPr wrap="square" rtlCol="0" anchor="ctr">
+              <a:noAutofit/>
+            </a:bodyPr>
+            <a:lstStyle/>
+            <a:p>
+              <a:pPr algn="ctr"/>
+              <a:endParaRPr lang="en-GB"/>
+            </a:p>
+          </p:txBody>
+        </p:sp>
+        <p:pic>
+          <p:nvPicPr>
+            <p:cNvPr id="87" name="Picture 86" descr="A black background with a black square&#10;&#10;AI-generated content may be incorrect.">
+              <a:extLst>
+                <a:ext uri="{FF2B5EF4-FFF2-40B4-BE49-F238E27FC236}">
+                  <a16:creationId xmlns:a16="http://schemas.microsoft.com/office/drawing/2014/main" id="{9C5AD3B9-9941-53B5-342D-AC1B1F1ECE22}"/>
+                </a:ext>
+              </a:extLst>
+            </p:cNvPr>
+            <p:cNvPicPr>
+              <a:picLocks noChangeAspect="1"/>
+            </p:cNvPicPr>
+            <p:nvPr/>
+          </p:nvPicPr>
+          <p:blipFill>
+            <a:blip r:embed="rId2">
+              <a:extLst>
+                <a:ext uri="{28A0092B-C50C-407E-A947-70E740481C1C}">
+                  <a14:useLocalDpi xmlns:a14="http://schemas.microsoft.com/office/drawing/2010/main" val="0"/>
+                </a:ext>
+              </a:extLst>
+            </a:blip>
+            <a:srcRect l="21551" t="28916"/>
+            <a:stretch>
+              <a:fillRect/>
+            </a:stretch>
+          </p:blipFill>
+          <p:spPr>
+            <a:xfrm rot="16200000" flipH="1">
+              <a:off x="4104308" y="3519801"/>
+              <a:ext cx="996173" cy="902661"/>
+            </a:xfrm>
+            <a:prstGeom prst="rect">
+              <a:avLst/>
+            </a:prstGeom>
+          </p:spPr>
+        </p:pic>
+        <p:pic>
+          <p:nvPicPr>
+            <p:cNvPr id="88" name="Picture 87" descr="A black background with a black square&#10;&#10;AI-generated content may be incorrect.">
+              <a:extLst>
+                <a:ext uri="{FF2B5EF4-FFF2-40B4-BE49-F238E27FC236}">
+                  <a16:creationId xmlns:a16="http://schemas.microsoft.com/office/drawing/2014/main" id="{4116CA8C-53DF-376E-E9E9-5C21C7BA62D0}"/>
+                </a:ext>
+              </a:extLst>
+            </p:cNvPr>
+            <p:cNvPicPr>
+              <a:picLocks noChangeAspect="1"/>
+            </p:cNvPicPr>
+            <p:nvPr/>
+          </p:nvPicPr>
+          <p:blipFill>
+            <a:blip r:embed="rId2">
+              <a:extLst>
+                <a:ext uri="{28A0092B-C50C-407E-A947-70E740481C1C}">
+                  <a14:useLocalDpi xmlns:a14="http://schemas.microsoft.com/office/drawing/2010/main" val="0"/>
+                </a:ext>
+              </a:extLst>
+            </a:blip>
+            <a:srcRect l="37467" t="623" r="37145" b="77021"/>
+            <a:stretch>
+              <a:fillRect/>
+            </a:stretch>
+          </p:blipFill>
+          <p:spPr>
+            <a:xfrm rot="15291856" flipH="1">
+              <a:off x="3802074" y="3776324"/>
+              <a:ext cx="303914" cy="270380"/>
+            </a:xfrm>
+            <a:prstGeom prst="rect">
+              <a:avLst/>
+            </a:prstGeom>
+          </p:spPr>
+        </p:pic>
+        <p:pic>
+          <p:nvPicPr>
+            <p:cNvPr id="92" name="Picture 91" descr="A black background with a black square&#10;&#10;AI-generated content may be incorrect.">
+              <a:extLst>
+                <a:ext uri="{FF2B5EF4-FFF2-40B4-BE49-F238E27FC236}">
+                  <a16:creationId xmlns:a16="http://schemas.microsoft.com/office/drawing/2014/main" id="{9AC39D46-A631-968F-01EC-A13D8CD15A06}"/>
+                </a:ext>
+              </a:extLst>
+            </p:cNvPr>
+            <p:cNvPicPr>
+              <a:picLocks noChangeAspect="1"/>
+            </p:cNvPicPr>
+            <p:nvPr/>
+          </p:nvPicPr>
+          <p:blipFill>
+            <a:blip r:embed="rId2">
+              <a:extLst>
+                <a:ext uri="{28A0092B-C50C-407E-A947-70E740481C1C}">
+                  <a14:useLocalDpi xmlns:a14="http://schemas.microsoft.com/office/drawing/2010/main" val="0"/>
+                </a:ext>
+              </a:extLst>
+            </a:blip>
+            <a:srcRect l="44927" t="23153" r="34824" b="66054"/>
+            <a:stretch>
+              <a:fillRect/>
+            </a:stretch>
+          </p:blipFill>
+          <p:spPr>
+            <a:xfrm rot="14636352" flipH="1">
+              <a:off x="4034742" y="3852722"/>
+              <a:ext cx="222988" cy="148903"/>
+            </a:xfrm>
+            <a:prstGeom prst="rect">
+              <a:avLst/>
+            </a:prstGeom>
+          </p:spPr>
+        </p:pic>
+        <p:pic>
+          <p:nvPicPr>
+            <p:cNvPr id="95" name="Picture 94" descr="A black background with a black square&#10;&#10;AI-generated content may be incorrect.">
+              <a:extLst>
+                <a:ext uri="{FF2B5EF4-FFF2-40B4-BE49-F238E27FC236}">
+                  <a16:creationId xmlns:a16="http://schemas.microsoft.com/office/drawing/2014/main" id="{F95C6041-CEAF-49DE-296D-9E7AB9CF935B}"/>
+                </a:ext>
+              </a:extLst>
+            </p:cNvPr>
+            <p:cNvPicPr>
+              <a:picLocks noChangeAspect="1"/>
+            </p:cNvPicPr>
+            <p:nvPr/>
+          </p:nvPicPr>
+          <p:blipFill>
+            <a:blip r:embed="rId2">
+              <a:extLst>
+                <a:ext uri="{28A0092B-C50C-407E-A947-70E740481C1C}">
+                  <a14:useLocalDpi xmlns:a14="http://schemas.microsoft.com/office/drawing/2010/main" val="0"/>
+                </a:ext>
+              </a:extLst>
+            </a:blip>
+            <a:srcRect l="26387" t="13347" r="57672" b="70348"/>
+            <a:stretch>
+              <a:fillRect/>
+            </a:stretch>
+          </p:blipFill>
+          <p:spPr>
+            <a:xfrm rot="15698569" flipH="1">
+              <a:off x="3928442" y="3562822"/>
+              <a:ext cx="210357" cy="193613"/>
+            </a:xfrm>
+            <a:prstGeom prst="rect">
+              <a:avLst/>
+            </a:prstGeom>
+          </p:spPr>
+        </p:pic>
+        <p:pic>
+          <p:nvPicPr>
+            <p:cNvPr id="89" name="Picture 88" descr="A black background with a black square&#10;&#10;AI-generated content may be incorrect.">
+              <a:extLst>
+                <a:ext uri="{FF2B5EF4-FFF2-40B4-BE49-F238E27FC236}">
+                  <a16:creationId xmlns:a16="http://schemas.microsoft.com/office/drawing/2014/main" id="{611B7F78-70DC-5246-E3BD-5C58D187E7F8}"/>
+                </a:ext>
+              </a:extLst>
+            </p:cNvPr>
+            <p:cNvPicPr>
+              <a:picLocks noChangeAspect="1"/>
+            </p:cNvPicPr>
+            <p:nvPr/>
+          </p:nvPicPr>
+          <p:blipFill>
+            <a:blip r:embed="rId2">
+              <a:extLst>
+                <a:ext uri="{28A0092B-C50C-407E-A947-70E740481C1C}">
+                  <a14:useLocalDpi xmlns:a14="http://schemas.microsoft.com/office/drawing/2010/main" val="0"/>
+                </a:ext>
+              </a:extLst>
+            </a:blip>
+            <a:srcRect l="68203" b="70596"/>
+            <a:stretch>
+              <a:fillRect/>
+            </a:stretch>
+          </p:blipFill>
+          <p:spPr>
+            <a:xfrm rot="15427643" flipH="1">
+              <a:off x="3882452" y="4041707"/>
+              <a:ext cx="403782" cy="379891"/>
+            </a:xfrm>
+            <a:prstGeom prst="rect">
+              <a:avLst/>
+            </a:prstGeom>
+          </p:spPr>
+        </p:pic>
+        <p:grpSp>
+          <p:nvGrpSpPr>
+            <p:cNvPr id="76" name="Group 75">
+              <a:extLst>
+                <a:ext uri="{FF2B5EF4-FFF2-40B4-BE49-F238E27FC236}">
+                  <a16:creationId xmlns:a16="http://schemas.microsoft.com/office/drawing/2014/main" id="{A71F2C31-CA17-4E32-DAD2-D950442E5642}"/>
+                </a:ext>
+              </a:extLst>
+            </p:cNvPr>
+            <p:cNvGrpSpPr>
+              <a:grpSpLocks/>
+            </p:cNvGrpSpPr>
+            <p:nvPr/>
+          </p:nvGrpSpPr>
+          <p:grpSpPr>
+            <a:xfrm>
+              <a:off x="4720361" y="3359753"/>
+              <a:ext cx="330658" cy="431994"/>
+              <a:chOff x="6340581" y="2572446"/>
+              <a:chExt cx="330658" cy="431994"/>
+            </a:xfrm>
+          </p:grpSpPr>
+          <p:pic>
+            <p:nvPicPr>
+              <p:cNvPr id="78" name="Picture 77" descr="A black background with a black square&#10;&#10;AI-generated content may be incorrect.">
+                <a:extLst>
+                  <a:ext uri="{FF2B5EF4-FFF2-40B4-BE49-F238E27FC236}">
+                    <a16:creationId xmlns:a16="http://schemas.microsoft.com/office/drawing/2014/main" id="{000E5B24-E55B-B21D-1842-8E9476138910}"/>
+                  </a:ext>
+                </a:extLst>
+              </p:cNvPr>
+              <p:cNvPicPr>
+                <a:picLocks noChangeAspect="1"/>
+              </p:cNvPicPr>
+              <p:nvPr/>
+            </p:nvPicPr>
+            <p:blipFill>
+              <a:blip r:embed="rId2">
+                <a:extLst>
+                  <a:ext uri="{28A0092B-C50C-407E-A947-70E740481C1C}">
+                    <a14:useLocalDpi xmlns:a14="http://schemas.microsoft.com/office/drawing/2010/main" val="0"/>
+                  </a:ext>
+                </a:extLst>
+              </a:blip>
+              <a:srcRect l="10182" t="73782" r="68815" b="9209"/>
+              <a:stretch/>
+            </p:blipFill>
+            <p:spPr>
+              <a:xfrm rot="10800000" flipV="1">
+                <a:off x="6340581" y="2788443"/>
+                <a:ext cx="266701" cy="215997"/>
+              </a:xfrm>
+              <a:prstGeom prst="rect">
+                <a:avLst/>
+              </a:prstGeom>
+            </p:spPr>
+          </p:pic>
+          <p:pic>
+            <p:nvPicPr>
+              <p:cNvPr id="79" name="Picture 78" descr="A black background with a black square&#10;&#10;AI-generated content may be incorrect.">
+                <a:extLst>
+                  <a:ext uri="{FF2B5EF4-FFF2-40B4-BE49-F238E27FC236}">
+                    <a16:creationId xmlns:a16="http://schemas.microsoft.com/office/drawing/2014/main" id="{3A9FEC80-AD17-BA8B-C280-2A2AD04AB098}"/>
+                  </a:ext>
+                </a:extLst>
+              </p:cNvPr>
+              <p:cNvPicPr>
+                <a:picLocks noChangeAspect="1"/>
+              </p:cNvPicPr>
+              <p:nvPr/>
+            </p:nvPicPr>
+            <p:blipFill>
+              <a:blip r:embed="rId2">
+                <a:extLst>
+                  <a:ext uri="{28A0092B-C50C-407E-A947-70E740481C1C}">
+                    <a14:useLocalDpi xmlns:a14="http://schemas.microsoft.com/office/drawing/2010/main" val="0"/>
+                  </a:ext>
+                </a:extLst>
+              </a:blip>
+              <a:srcRect l="10182" t="73782" r="68815" b="9209"/>
+              <a:stretch/>
+            </p:blipFill>
+            <p:spPr>
+              <a:xfrm rot="10800000" flipH="1">
+                <a:off x="6404538" y="2572446"/>
+                <a:ext cx="266701" cy="215997"/>
+              </a:xfrm>
+              <a:prstGeom prst="rect">
+                <a:avLst/>
+              </a:prstGeom>
+            </p:spPr>
+          </p:pic>
+        </p:grpSp>
+        <p:pic>
+          <p:nvPicPr>
+            <p:cNvPr id="77" name="Picture 76" descr="A black background with a black square&#10;&#10;AI-generated content may be incorrect.">
+              <a:extLst>
+                <a:ext uri="{FF2B5EF4-FFF2-40B4-BE49-F238E27FC236}">
+                  <a16:creationId xmlns:a16="http://schemas.microsoft.com/office/drawing/2014/main" id="{E1F66FEE-C8E8-0B51-54B7-2B2D297B27E8}"/>
+                </a:ext>
+              </a:extLst>
+            </p:cNvPr>
+            <p:cNvPicPr>
+              <a:picLocks noChangeAspect="1"/>
+            </p:cNvPicPr>
+            <p:nvPr/>
+          </p:nvPicPr>
+          <p:blipFill>
+            <a:blip r:embed="rId2">
+              <a:extLst>
+                <a:ext uri="{28A0092B-C50C-407E-A947-70E740481C1C}">
+                  <a14:useLocalDpi xmlns:a14="http://schemas.microsoft.com/office/drawing/2010/main" val="0"/>
+                </a:ext>
+              </a:extLst>
+            </a:blip>
+            <a:srcRect l="10200" t="49411" r="76847"/>
+            <a:stretch/>
+          </p:blipFill>
+          <p:spPr>
+            <a:xfrm rot="16200000" flipH="1">
+              <a:off x="4586789" y="3105598"/>
+              <a:ext cx="164481" cy="642408"/>
+            </a:xfrm>
+            <a:prstGeom prst="rect">
+              <a:avLst/>
+            </a:prstGeom>
+          </p:spPr>
+        </p:pic>
+        <p:pic>
+          <p:nvPicPr>
+            <p:cNvPr id="1048" name="Picture 1047" descr="A black background with a black square&#10;&#10;AI-generated content may be incorrect.">
+              <a:extLst>
+                <a:ext uri="{FF2B5EF4-FFF2-40B4-BE49-F238E27FC236}">
+                  <a16:creationId xmlns:a16="http://schemas.microsoft.com/office/drawing/2014/main" id="{DA4EEB58-A2C2-FE90-15D2-43E9F77C2F47}"/>
+                </a:ext>
+              </a:extLst>
+            </p:cNvPr>
+            <p:cNvPicPr>
+              <a:picLocks noChangeAspect="1"/>
+            </p:cNvPicPr>
+            <p:nvPr/>
+          </p:nvPicPr>
+          <p:blipFill>
+            <a:blip r:embed="rId2">
+              <a:extLst>
+                <a:ext uri="{28A0092B-C50C-407E-A947-70E740481C1C}">
+                  <a14:useLocalDpi xmlns:a14="http://schemas.microsoft.com/office/drawing/2010/main" val="0"/>
+                </a:ext>
+              </a:extLst>
+            </a:blip>
+            <a:srcRect l="10200" t="78821" r="76847" b="15154"/>
+            <a:stretch>
+              <a:fillRect/>
+            </a:stretch>
+          </p:blipFill>
+          <p:spPr>
+            <a:xfrm rot="16000379" flipV="1">
+              <a:off x="4041043" y="3555152"/>
+              <a:ext cx="177626" cy="74439"/>
+            </a:xfrm>
+            <a:prstGeom prst="rect">
+              <a:avLst/>
+            </a:prstGeom>
+          </p:spPr>
+        </p:pic>
+      </p:grpSp>
       <p:pic>
         <p:nvPicPr>
           <p:cNvPr id="38" name="Picture 4" descr="Windows Mouse Cursor: Over 3,504 Royalty-Free Licensable Stock  Illustrations &amp; Drawings | Shutterstock">
@@ -11021,7 +12895,7 @@
           <p:nvPr/>
         </p:nvPicPr>
         <p:blipFill rotWithShape="1">
-          <a:blip r:embed="rId2">
+          <a:blip r:embed="rId3">
             <a:clrChange>
               <a:clrFrom>
                 <a:srgbClr val="FFFFFF"/>
@@ -11035,7 +12909,7 @@
             <a:extLst>
               <a:ext uri="{BEBA8EAE-BF5A-486C-A8C5-ECC9F3942E4B}">
                 <a14:imgProps xmlns:a14="http://schemas.microsoft.com/office/drawing/2010/main">
-                  <a14:imgLayer r:embed="rId3">
+                  <a14:imgLayer r:embed="rId4">
                     <a14:imgEffect>
                       <a14:backgroundRemoval t="23929" b="69643" l="76788" r="88999">
                         <a14:foregroundMark x1="79428" y1="26429" x2="79428" y2="26429"/>
@@ -11079,7 +12953,7 @@
         </p:blipFill>
         <p:spPr bwMode="auto">
           <a:xfrm>
-            <a:off x="4630326" y="4892629"/>
+            <a:off x="4008009" y="551202"/>
             <a:ext cx="171937" cy="190500"/>
           </a:xfrm>
           <a:prstGeom prst="rect">
@@ -11424,7 +13298,7 @@
             <p:nvPr/>
           </p:nvPicPr>
           <p:blipFill>
-            <a:blip r:embed="rId4">
+            <a:blip r:embed="rId5">
               <a:extLst>
                 <a:ext uri="{28A0092B-C50C-407E-A947-70E740481C1C}">
                   <a14:useLocalDpi xmlns:a14="http://schemas.microsoft.com/office/drawing/2010/main" val="0"/>
@@ -11751,7 +13625,7 @@
               <p:nvPr/>
             </p:nvPicPr>
             <p:blipFill>
-              <a:blip r:embed="rId5">
+              <a:blip r:embed="rId6">
                 <a:extLst>
                   <a:ext uri="{28A0092B-C50C-407E-A947-70E740481C1C}">
                     <a14:useLocalDpi xmlns:a14="http://schemas.microsoft.com/office/drawing/2010/main" val="0"/>
@@ -12097,7 +13971,7 @@
             <p:nvPr/>
           </p:nvPicPr>
           <p:blipFill>
-            <a:blip r:embed="rId4">
+            <a:blip r:embed="rId5">
               <a:extLst>
                 <a:ext uri="{28A0092B-C50C-407E-A947-70E740481C1C}">
                   <a14:useLocalDpi xmlns:a14="http://schemas.microsoft.com/office/drawing/2010/main" val="0"/>
@@ -12421,7 +14295,7 @@
               <p:nvPr/>
             </p:nvPicPr>
             <p:blipFill>
-              <a:blip r:embed="rId5">
+              <a:blip r:embed="rId6">
                 <a:extLst>
                   <a:ext uri="{28A0092B-C50C-407E-A947-70E740481C1C}">
                     <a14:useLocalDpi xmlns:a14="http://schemas.microsoft.com/office/drawing/2010/main" val="0"/>
@@ -12458,7 +14332,7 @@
           <p:nvPr/>
         </p:nvPicPr>
         <p:blipFill>
-          <a:blip r:embed="rId4">
+          <a:blip r:embed="rId5">
             <a:extLst>
               <a:ext uri="{28A0092B-C50C-407E-A947-70E740481C1C}">
                 <a14:useLocalDpi xmlns:a14="http://schemas.microsoft.com/office/drawing/2010/main" val="0"/>
@@ -12568,7 +14442,7 @@
             <p:nvPr/>
           </p:nvPicPr>
           <p:blipFill>
-            <a:blip r:embed="rId5">
+            <a:blip r:embed="rId6">
               <a:extLst>
                 <a:ext uri="{28A0092B-C50C-407E-A947-70E740481C1C}">
                   <a14:useLocalDpi xmlns:a14="http://schemas.microsoft.com/office/drawing/2010/main" val="0"/>
@@ -12869,7 +14743,7 @@
           <p:nvPr/>
         </p:nvPicPr>
         <p:blipFill>
-          <a:blip r:embed="rId6">
+          <a:blip r:embed="rId7">
             <a:extLst>
               <a:ext uri="{28A0092B-C50C-407E-A947-70E740481C1C}">
                 <a14:useLocalDpi xmlns:a14="http://schemas.microsoft.com/office/drawing/2010/main" val="0"/>
@@ -13150,7 +15024,7 @@
             <p:nvPr/>
           </p:nvPicPr>
           <p:blipFill>
-            <a:blip r:embed="rId6">
+            <a:blip r:embed="rId7">
               <a:extLst>
                 <a:ext uri="{28A0092B-C50C-407E-A947-70E740481C1C}">
                   <a14:useLocalDpi xmlns:a14="http://schemas.microsoft.com/office/drawing/2010/main" val="0"/>
@@ -13435,7 +15309,7 @@
             <p:nvPr/>
           </p:nvPicPr>
           <p:blipFill rotWithShape="1">
-            <a:blip r:embed="rId6">
+            <a:blip r:embed="rId7">
               <a:extLst>
                 <a:ext uri="{28A0092B-C50C-407E-A947-70E740481C1C}">
                   <a14:useLocalDpi xmlns:a14="http://schemas.microsoft.com/office/drawing/2010/main" val="0"/>
@@ -13471,7 +15345,7 @@
           <p:nvPr/>
         </p:nvPicPr>
         <p:blipFill>
-          <a:blip r:embed="rId7">
+          <a:blip r:embed="rId2">
             <a:extLst>
               <a:ext uri="{28A0092B-C50C-407E-A947-70E740481C1C}">
                 <a14:useLocalDpi xmlns:a14="http://schemas.microsoft.com/office/drawing/2010/main" val="0"/>
@@ -13484,7 +15358,7 @@
         </p:blipFill>
         <p:spPr>
           <a:xfrm rot="16200000" flipH="1">
-            <a:off x="6826515" y="539854"/>
+            <a:off x="10296787" y="1808423"/>
             <a:ext cx="1269841" cy="1269841"/>
           </a:xfrm>
           <a:prstGeom prst="rect">
@@ -13506,7 +15380,7 @@
         </p:nvGrpSpPr>
         <p:grpSpPr>
           <a:xfrm>
-            <a:off x="6364435" y="2698620"/>
+            <a:off x="5473756" y="1832963"/>
             <a:ext cx="1269841" cy="1111256"/>
             <a:chOff x="6364435" y="2698620"/>
             <a:chExt cx="1269841" cy="1111256"/>
@@ -13943,7 +15817,7 @@
               <p:nvPr/>
             </p:nvPicPr>
             <p:blipFill>
-              <a:blip r:embed="rId7">
+              <a:blip r:embed="rId2">
                 <a:extLst>
                   <a:ext uri="{28A0092B-C50C-407E-A947-70E740481C1C}">
                     <a14:useLocalDpi xmlns:a14="http://schemas.microsoft.com/office/drawing/2010/main" val="0"/>
@@ -13998,7 +15872,7 @@
                 <p:nvPr/>
               </p:nvPicPr>
               <p:blipFill>
-                <a:blip r:embed="rId7">
+                <a:blip r:embed="rId2">
                   <a:extLst>
                     <a:ext uri="{28A0092B-C50C-407E-A947-70E740481C1C}">
                       <a14:useLocalDpi xmlns:a14="http://schemas.microsoft.com/office/drawing/2010/main" val="0"/>
@@ -14033,7 +15907,7 @@
                 <p:nvPr/>
               </p:nvPicPr>
               <p:blipFill>
-                <a:blip r:embed="rId7">
+                <a:blip r:embed="rId2">
                   <a:extLst>
                     <a:ext uri="{28A0092B-C50C-407E-A947-70E740481C1C}">
                       <a14:useLocalDpi xmlns:a14="http://schemas.microsoft.com/office/drawing/2010/main" val="0"/>
@@ -14069,7 +15943,7 @@
               <p:nvPr/>
             </p:nvPicPr>
             <p:blipFill>
-              <a:blip r:embed="rId7">
+              <a:blip r:embed="rId2">
                 <a:extLst>
                   <a:ext uri="{28A0092B-C50C-407E-A947-70E740481C1C}">
                     <a14:useLocalDpi xmlns:a14="http://schemas.microsoft.com/office/drawing/2010/main" val="0"/>
@@ -14107,7 +15981,7 @@
         </p:nvGrpSpPr>
         <p:grpSpPr>
           <a:xfrm>
-            <a:off x="5012916" y="2811015"/>
+            <a:off x="3822563" y="1829439"/>
             <a:ext cx="1269841" cy="1111992"/>
             <a:chOff x="6364435" y="2698620"/>
             <a:chExt cx="1269841" cy="1111992"/>
@@ -14545,7 +16419,7 @@
               <p:nvPr/>
             </p:nvPicPr>
             <p:blipFill>
-              <a:blip r:embed="rId7">
+              <a:blip r:embed="rId2">
                 <a:extLst>
                   <a:ext uri="{28A0092B-C50C-407E-A947-70E740481C1C}">
                     <a14:useLocalDpi xmlns:a14="http://schemas.microsoft.com/office/drawing/2010/main" val="0"/>
@@ -14602,7 +16476,7 @@
                 <p:nvPr/>
               </p:nvPicPr>
               <p:blipFill>
-                <a:blip r:embed="rId7">
+                <a:blip r:embed="rId2">
                   <a:extLst>
                     <a:ext uri="{28A0092B-C50C-407E-A947-70E740481C1C}">
                       <a14:useLocalDpi xmlns:a14="http://schemas.microsoft.com/office/drawing/2010/main" val="0"/>
@@ -14637,7 +16511,7 @@
                 <p:nvPr/>
               </p:nvPicPr>
               <p:blipFill>
-                <a:blip r:embed="rId7">
+                <a:blip r:embed="rId2">
                   <a:extLst>
                     <a:ext uri="{28A0092B-C50C-407E-A947-70E740481C1C}">
                       <a14:useLocalDpi xmlns:a14="http://schemas.microsoft.com/office/drawing/2010/main" val="0"/>
@@ -14673,7 +16547,7 @@
               <p:nvPr/>
             </p:nvPicPr>
             <p:blipFill>
-              <a:blip r:embed="rId7">
+              <a:blip r:embed="rId2">
                 <a:extLst>
                   <a:ext uri="{28A0092B-C50C-407E-A947-70E740481C1C}">
                     <a14:useLocalDpi xmlns:a14="http://schemas.microsoft.com/office/drawing/2010/main" val="0"/>
@@ -14734,7 +16608,7 @@
         </p:blipFill>
         <p:spPr bwMode="auto">
           <a:xfrm>
-            <a:off x="5115323" y="4892629"/>
+            <a:off x="4493006" y="551202"/>
             <a:ext cx="171938" cy="190500"/>
           </a:xfrm>
           <a:prstGeom prst="rect">
@@ -14768,7 +16642,7 @@
         </p:nvSpPr>
         <p:spPr>
           <a:xfrm>
-            <a:off x="6692148" y="4797379"/>
+            <a:off x="7902596" y="3652611"/>
             <a:ext cx="1146105" cy="1269840"/>
           </a:xfrm>
           <a:prstGeom prst="rect">
@@ -14824,7 +16698,7 @@
         </p:nvSpPr>
         <p:spPr>
           <a:xfrm>
-            <a:off x="8475880" y="3596560"/>
+            <a:off x="10020300" y="3718804"/>
             <a:ext cx="1189975" cy="1702359"/>
           </a:xfrm>
           <a:prstGeom prst="rect">
@@ -14862,6 +16736,2024 @@
           </a:p>
         </p:txBody>
       </p:sp>
+      <p:pic>
+        <p:nvPicPr>
+          <p:cNvPr id="1043" name="Picture 1042">
+            <a:extLst>
+              <a:ext uri="{FF2B5EF4-FFF2-40B4-BE49-F238E27FC236}">
+                <a16:creationId xmlns:a16="http://schemas.microsoft.com/office/drawing/2014/main" id="{71EA9D97-3170-736D-2F00-D03CB1DB8576}"/>
+              </a:ext>
+            </a:extLst>
+          </p:cNvPr>
+          <p:cNvPicPr>
+            <a:picLocks noChangeAspect="1"/>
+          </p:cNvPicPr>
+          <p:nvPr/>
+        </p:nvPicPr>
+        <p:blipFill>
+          <a:blip r:embed="rId9">
+            <a:extLst>
+              <a:ext uri="{28A0092B-C50C-407E-A947-70E740481C1C}">
+                <a14:useLocalDpi xmlns:a14="http://schemas.microsoft.com/office/drawing/2010/main" val="0"/>
+              </a:ext>
+            </a:extLst>
+          </a:blip>
+          <a:stretch>
+            <a:fillRect/>
+          </a:stretch>
+        </p:blipFill>
+        <p:spPr>
+          <a:xfrm>
+            <a:off x="4513777" y="5083586"/>
+            <a:ext cx="209550" cy="183471"/>
+          </a:xfrm>
+          <a:prstGeom prst="rect">
+            <a:avLst/>
+          </a:prstGeom>
+        </p:spPr>
+      </p:pic>
+      <p:pic>
+        <p:nvPicPr>
+          <p:cNvPr id="1045" name="Picture 1044">
+            <a:extLst>
+              <a:ext uri="{FF2B5EF4-FFF2-40B4-BE49-F238E27FC236}">
+                <a16:creationId xmlns:a16="http://schemas.microsoft.com/office/drawing/2014/main" id="{99E9E48B-1FFD-515D-C1B5-594BAE1754D5}"/>
+              </a:ext>
+            </a:extLst>
+          </p:cNvPr>
+          <p:cNvPicPr>
+            <a:picLocks noChangeAspect="1"/>
+          </p:cNvPicPr>
+          <p:nvPr/>
+        </p:nvPicPr>
+        <p:blipFill>
+          <a:blip r:embed="rId10">
+            <a:extLst>
+              <a:ext uri="{28A0092B-C50C-407E-A947-70E740481C1C}">
+                <a14:useLocalDpi xmlns:a14="http://schemas.microsoft.com/office/drawing/2010/main" val="0"/>
+              </a:ext>
+            </a:extLst>
+          </a:blip>
+          <a:stretch>
+            <a:fillRect/>
+          </a:stretch>
+        </p:blipFill>
+        <p:spPr>
+          <a:xfrm>
+            <a:off x="5851775" y="5050095"/>
+            <a:ext cx="209550" cy="183928"/>
+          </a:xfrm>
+          <a:prstGeom prst="rect">
+            <a:avLst/>
+          </a:prstGeom>
+        </p:spPr>
+      </p:pic>
+      <p:grpSp>
+        <p:nvGrpSpPr>
+          <p:cNvPr id="1079" name="Group 1078">
+            <a:extLst>
+              <a:ext uri="{FF2B5EF4-FFF2-40B4-BE49-F238E27FC236}">
+                <a16:creationId xmlns:a16="http://schemas.microsoft.com/office/drawing/2014/main" id="{B926B9C4-2696-2369-6095-9C41E4F09B89}"/>
+              </a:ext>
+            </a:extLst>
+          </p:cNvPr>
+          <p:cNvGrpSpPr/>
+          <p:nvPr/>
+        </p:nvGrpSpPr>
+        <p:grpSpPr>
+          <a:xfrm>
+            <a:off x="5307871" y="3281696"/>
+            <a:ext cx="1234884" cy="1124657"/>
+            <a:chOff x="5307871" y="3281696"/>
+            <a:chExt cx="1234884" cy="1124657"/>
+          </a:xfrm>
+        </p:grpSpPr>
+        <p:sp>
+          <p:nvSpPr>
+            <p:cNvPr id="1068" name="Freeform: Shape 1067">
+              <a:extLst>
+                <a:ext uri="{FF2B5EF4-FFF2-40B4-BE49-F238E27FC236}">
+                  <a16:creationId xmlns:a16="http://schemas.microsoft.com/office/drawing/2014/main" id="{14CBED7B-3A7C-2A17-5AE7-A4EFE147F03F}"/>
+                </a:ext>
+              </a:extLst>
+            </p:cNvPr>
+            <p:cNvSpPr>
+              <a:spLocks/>
+            </p:cNvSpPr>
+            <p:nvPr/>
+          </p:nvSpPr>
+          <p:spPr>
+            <a:xfrm rot="20697523">
+              <a:off x="5432678" y="3442233"/>
+              <a:ext cx="982597" cy="709560"/>
+            </a:xfrm>
+            <a:custGeom>
+              <a:avLst/>
+              <a:gdLst>
+                <a:gd name="connsiteX0" fmla="*/ 1085707 w 1085707"/>
+                <a:gd name="connsiteY0" fmla="*/ 1522 h 703382"/>
+                <a:gd name="connsiteX1" fmla="*/ 1085707 w 1085707"/>
+                <a:gd name="connsiteY1" fmla="*/ 233559 h 703382"/>
+                <a:gd name="connsiteX2" fmla="*/ 1084733 w 1085707"/>
+                <a:gd name="connsiteY2" fmla="*/ 233559 h 703382"/>
+                <a:gd name="connsiteX3" fmla="*/ 1084429 w 1085707"/>
+                <a:gd name="connsiteY3" fmla="*/ 350240 h 703382"/>
+                <a:gd name="connsiteX4" fmla="*/ 916260 w 1085707"/>
+                <a:gd name="connsiteY4" fmla="*/ 349802 h 703382"/>
+                <a:gd name="connsiteX5" fmla="*/ 916259 w 1085707"/>
+                <a:gd name="connsiteY5" fmla="*/ 456025 h 703382"/>
+                <a:gd name="connsiteX6" fmla="*/ 868184 w 1085707"/>
+                <a:gd name="connsiteY6" fmla="*/ 456025 h 703382"/>
+                <a:gd name="connsiteX7" fmla="*/ 868184 w 1085707"/>
+                <a:gd name="connsiteY7" fmla="*/ 511982 h 703382"/>
+                <a:gd name="connsiteX8" fmla="*/ 783655 w 1085707"/>
+                <a:gd name="connsiteY8" fmla="*/ 511982 h 703382"/>
+                <a:gd name="connsiteX9" fmla="*/ 783655 w 1085707"/>
+                <a:gd name="connsiteY9" fmla="*/ 568426 h 703382"/>
+                <a:gd name="connsiteX10" fmla="*/ 698055 w 1085707"/>
+                <a:gd name="connsiteY10" fmla="*/ 568426 h 703382"/>
+                <a:gd name="connsiteX11" fmla="*/ 698055 w 1085707"/>
+                <a:gd name="connsiteY11" fmla="*/ 602140 h 703382"/>
+                <a:gd name="connsiteX12" fmla="*/ 516288 w 1085707"/>
+                <a:gd name="connsiteY12" fmla="*/ 602140 h 703382"/>
+                <a:gd name="connsiteX13" fmla="*/ 516288 w 1085707"/>
+                <a:gd name="connsiteY13" fmla="*/ 658889 h 703382"/>
+                <a:gd name="connsiteX14" fmla="*/ 448191 w 1085707"/>
+                <a:gd name="connsiteY14" fmla="*/ 658889 h 703382"/>
+                <a:gd name="connsiteX15" fmla="*/ 448191 w 1085707"/>
+                <a:gd name="connsiteY15" fmla="*/ 703382 h 703382"/>
+                <a:gd name="connsiteX16" fmla="*/ 321212 w 1085707"/>
+                <a:gd name="connsiteY16" fmla="*/ 703382 h 703382"/>
+                <a:gd name="connsiteX17" fmla="*/ 321212 w 1085707"/>
+                <a:gd name="connsiteY17" fmla="*/ 623625 h 703382"/>
+                <a:gd name="connsiteX18" fmla="*/ 321281 w 1085707"/>
+                <a:gd name="connsiteY18" fmla="*/ 623625 h 703382"/>
+                <a:gd name="connsiteX19" fmla="*/ 321281 w 1085707"/>
+                <a:gd name="connsiteY19" fmla="*/ 579132 h 703382"/>
+                <a:gd name="connsiteX20" fmla="*/ 357890 w 1085707"/>
+                <a:gd name="connsiteY20" fmla="*/ 579132 h 703382"/>
+                <a:gd name="connsiteX21" fmla="*/ 357889 w 1085707"/>
+                <a:gd name="connsiteY21" fmla="*/ 522383 h 703382"/>
+                <a:gd name="connsiteX22" fmla="*/ 426575 w 1085707"/>
+                <a:gd name="connsiteY22" fmla="*/ 522383 h 703382"/>
+                <a:gd name="connsiteX23" fmla="*/ 426575 w 1085707"/>
+                <a:gd name="connsiteY23" fmla="*/ 488669 h 703382"/>
+                <a:gd name="connsiteX24" fmla="*/ 511104 w 1085707"/>
+                <a:gd name="connsiteY24" fmla="*/ 488669 h 703382"/>
+                <a:gd name="connsiteX25" fmla="*/ 511104 w 1085707"/>
+                <a:gd name="connsiteY25" fmla="*/ 432225 h 703382"/>
+                <a:gd name="connsiteX26" fmla="*/ 550677 w 1085707"/>
+                <a:gd name="connsiteY26" fmla="*/ 432225 h 703382"/>
+                <a:gd name="connsiteX27" fmla="*/ 550677 w 1085707"/>
+                <a:gd name="connsiteY27" fmla="*/ 338966 h 703382"/>
+                <a:gd name="connsiteX28" fmla="*/ 477099 w 1085707"/>
+                <a:gd name="connsiteY28" fmla="*/ 265002 h 703382"/>
+                <a:gd name="connsiteX29" fmla="*/ 477181 w 1085707"/>
+                <a:gd name="connsiteY29" fmla="*/ 233559 h 703382"/>
+                <a:gd name="connsiteX30" fmla="*/ 364498 w 1085707"/>
+                <a:gd name="connsiteY30" fmla="*/ 233559 h 703382"/>
+                <a:gd name="connsiteX31" fmla="*/ 211854 w 1085707"/>
+                <a:gd name="connsiteY31" fmla="*/ 421260 h 703382"/>
+                <a:gd name="connsiteX32" fmla="*/ 141047 w 1085707"/>
+                <a:gd name="connsiteY32" fmla="*/ 684756 h 703382"/>
+                <a:gd name="connsiteX33" fmla="*/ 0 w 1085707"/>
+                <a:gd name="connsiteY33" fmla="*/ 646854 h 703382"/>
+                <a:gd name="connsiteX34" fmla="*/ 73913 w 1085707"/>
+                <a:gd name="connsiteY34" fmla="*/ 371797 h 703382"/>
+                <a:gd name="connsiteX35" fmla="*/ 60860 w 1085707"/>
+                <a:gd name="connsiteY35" fmla="*/ 361181 h 703382"/>
+                <a:gd name="connsiteX36" fmla="*/ 344332 w 1085707"/>
+                <a:gd name="connsiteY36" fmla="*/ 12605 h 703382"/>
+                <a:gd name="connsiteX37" fmla="*/ 344332 w 1085707"/>
+                <a:gd name="connsiteY37" fmla="*/ 1522 h 703382"/>
+                <a:gd name="connsiteX38" fmla="*/ 353346 w 1085707"/>
+                <a:gd name="connsiteY38" fmla="*/ 1522 h 703382"/>
+                <a:gd name="connsiteX39" fmla="*/ 354584 w 1085707"/>
+                <a:gd name="connsiteY39" fmla="*/ 0 h 703382"/>
+                <a:gd name="connsiteX40" fmla="*/ 356456 w 1085707"/>
+                <a:gd name="connsiteY40" fmla="*/ 1522 h 703382"/>
+                <a:gd name="csX0" fmla="*/ 1085707 w 1085707"/>
+                <a:gd name="csY0" fmla="*/ 1522 h 703382"/>
+                <a:gd name="csX1" fmla="*/ 1085707 w 1085707"/>
+                <a:gd name="csY1" fmla="*/ 233559 h 703382"/>
+                <a:gd name="csX2" fmla="*/ 1084733 w 1085707"/>
+                <a:gd name="csY2" fmla="*/ 233559 h 703382"/>
+                <a:gd name="csX3" fmla="*/ 1084429 w 1085707"/>
+                <a:gd name="csY3" fmla="*/ 350240 h 703382"/>
+                <a:gd name="csX4" fmla="*/ 916260 w 1085707"/>
+                <a:gd name="csY4" fmla="*/ 349802 h 703382"/>
+                <a:gd name="csX5" fmla="*/ 916259 w 1085707"/>
+                <a:gd name="csY5" fmla="*/ 456025 h 703382"/>
+                <a:gd name="csX6" fmla="*/ 868184 w 1085707"/>
+                <a:gd name="csY6" fmla="*/ 456025 h 703382"/>
+                <a:gd name="csX7" fmla="*/ 868184 w 1085707"/>
+                <a:gd name="csY7" fmla="*/ 511982 h 703382"/>
+                <a:gd name="csX8" fmla="*/ 783655 w 1085707"/>
+                <a:gd name="csY8" fmla="*/ 511982 h 703382"/>
+                <a:gd name="csX9" fmla="*/ 783655 w 1085707"/>
+                <a:gd name="csY9" fmla="*/ 568426 h 703382"/>
+                <a:gd name="csX10" fmla="*/ 698055 w 1085707"/>
+                <a:gd name="csY10" fmla="*/ 568426 h 703382"/>
+                <a:gd name="csX11" fmla="*/ 698055 w 1085707"/>
+                <a:gd name="csY11" fmla="*/ 602140 h 703382"/>
+                <a:gd name="csX12" fmla="*/ 516288 w 1085707"/>
+                <a:gd name="csY12" fmla="*/ 602140 h 703382"/>
+                <a:gd name="csX13" fmla="*/ 516288 w 1085707"/>
+                <a:gd name="csY13" fmla="*/ 658889 h 703382"/>
+                <a:gd name="csX14" fmla="*/ 448191 w 1085707"/>
+                <a:gd name="csY14" fmla="*/ 658889 h 703382"/>
+                <a:gd name="csX15" fmla="*/ 448191 w 1085707"/>
+                <a:gd name="csY15" fmla="*/ 703382 h 703382"/>
+                <a:gd name="csX16" fmla="*/ 321212 w 1085707"/>
+                <a:gd name="csY16" fmla="*/ 703382 h 703382"/>
+                <a:gd name="csX17" fmla="*/ 321212 w 1085707"/>
+                <a:gd name="csY17" fmla="*/ 623625 h 703382"/>
+                <a:gd name="csX18" fmla="*/ 321281 w 1085707"/>
+                <a:gd name="csY18" fmla="*/ 623625 h 703382"/>
+                <a:gd name="csX19" fmla="*/ 321281 w 1085707"/>
+                <a:gd name="csY19" fmla="*/ 579132 h 703382"/>
+                <a:gd name="csX20" fmla="*/ 357890 w 1085707"/>
+                <a:gd name="csY20" fmla="*/ 579132 h 703382"/>
+                <a:gd name="csX21" fmla="*/ 357889 w 1085707"/>
+                <a:gd name="csY21" fmla="*/ 522383 h 703382"/>
+                <a:gd name="csX22" fmla="*/ 426575 w 1085707"/>
+                <a:gd name="csY22" fmla="*/ 522383 h 703382"/>
+                <a:gd name="csX23" fmla="*/ 426575 w 1085707"/>
+                <a:gd name="csY23" fmla="*/ 488669 h 703382"/>
+                <a:gd name="csX24" fmla="*/ 511104 w 1085707"/>
+                <a:gd name="csY24" fmla="*/ 488669 h 703382"/>
+                <a:gd name="csX25" fmla="*/ 511104 w 1085707"/>
+                <a:gd name="csY25" fmla="*/ 432225 h 703382"/>
+                <a:gd name="csX26" fmla="*/ 550677 w 1085707"/>
+                <a:gd name="csY26" fmla="*/ 432225 h 703382"/>
+                <a:gd name="csX27" fmla="*/ 550677 w 1085707"/>
+                <a:gd name="csY27" fmla="*/ 338966 h 703382"/>
+                <a:gd name="csX28" fmla="*/ 477099 w 1085707"/>
+                <a:gd name="csY28" fmla="*/ 265002 h 703382"/>
+                <a:gd name="csX29" fmla="*/ 477181 w 1085707"/>
+                <a:gd name="csY29" fmla="*/ 233559 h 703382"/>
+                <a:gd name="csX30" fmla="*/ 364498 w 1085707"/>
+                <a:gd name="csY30" fmla="*/ 233559 h 703382"/>
+                <a:gd name="csX31" fmla="*/ 211854 w 1085707"/>
+                <a:gd name="csY31" fmla="*/ 421260 h 703382"/>
+                <a:gd name="csX32" fmla="*/ 243610 w 1085707"/>
+                <a:gd name="csY32" fmla="*/ 633860 h 703382"/>
+                <a:gd name="csX33" fmla="*/ 0 w 1085707"/>
+                <a:gd name="csY33" fmla="*/ 646854 h 703382"/>
+                <a:gd name="csX34" fmla="*/ 73913 w 1085707"/>
+                <a:gd name="csY34" fmla="*/ 371797 h 703382"/>
+                <a:gd name="csX35" fmla="*/ 60860 w 1085707"/>
+                <a:gd name="csY35" fmla="*/ 361181 h 703382"/>
+                <a:gd name="csX36" fmla="*/ 344332 w 1085707"/>
+                <a:gd name="csY36" fmla="*/ 12605 h 703382"/>
+                <a:gd name="csX37" fmla="*/ 344332 w 1085707"/>
+                <a:gd name="csY37" fmla="*/ 1522 h 703382"/>
+                <a:gd name="csX38" fmla="*/ 353346 w 1085707"/>
+                <a:gd name="csY38" fmla="*/ 1522 h 703382"/>
+                <a:gd name="csX39" fmla="*/ 354584 w 1085707"/>
+                <a:gd name="csY39" fmla="*/ 0 h 703382"/>
+                <a:gd name="csX40" fmla="*/ 356456 w 1085707"/>
+                <a:gd name="csY40" fmla="*/ 1522 h 703382"/>
+                <a:gd name="csX41" fmla="*/ 1085707 w 1085707"/>
+                <a:gd name="csY41" fmla="*/ 1522 h 703382"/>
+                <a:gd name="csX0" fmla="*/ 1085707 w 1085707"/>
+                <a:gd name="csY0" fmla="*/ 1522 h 703382"/>
+                <a:gd name="csX1" fmla="*/ 1085707 w 1085707"/>
+                <a:gd name="csY1" fmla="*/ 233559 h 703382"/>
+                <a:gd name="csX2" fmla="*/ 1084733 w 1085707"/>
+                <a:gd name="csY2" fmla="*/ 233559 h 703382"/>
+                <a:gd name="csX3" fmla="*/ 1084429 w 1085707"/>
+                <a:gd name="csY3" fmla="*/ 350240 h 703382"/>
+                <a:gd name="csX4" fmla="*/ 916260 w 1085707"/>
+                <a:gd name="csY4" fmla="*/ 349802 h 703382"/>
+                <a:gd name="csX5" fmla="*/ 916259 w 1085707"/>
+                <a:gd name="csY5" fmla="*/ 456025 h 703382"/>
+                <a:gd name="csX6" fmla="*/ 868184 w 1085707"/>
+                <a:gd name="csY6" fmla="*/ 456025 h 703382"/>
+                <a:gd name="csX7" fmla="*/ 868184 w 1085707"/>
+                <a:gd name="csY7" fmla="*/ 511982 h 703382"/>
+                <a:gd name="csX8" fmla="*/ 783655 w 1085707"/>
+                <a:gd name="csY8" fmla="*/ 511982 h 703382"/>
+                <a:gd name="csX9" fmla="*/ 783655 w 1085707"/>
+                <a:gd name="csY9" fmla="*/ 568426 h 703382"/>
+                <a:gd name="csX10" fmla="*/ 698055 w 1085707"/>
+                <a:gd name="csY10" fmla="*/ 568426 h 703382"/>
+                <a:gd name="csX11" fmla="*/ 698055 w 1085707"/>
+                <a:gd name="csY11" fmla="*/ 602140 h 703382"/>
+                <a:gd name="csX12" fmla="*/ 516288 w 1085707"/>
+                <a:gd name="csY12" fmla="*/ 602140 h 703382"/>
+                <a:gd name="csX13" fmla="*/ 516288 w 1085707"/>
+                <a:gd name="csY13" fmla="*/ 658889 h 703382"/>
+                <a:gd name="csX14" fmla="*/ 448191 w 1085707"/>
+                <a:gd name="csY14" fmla="*/ 658889 h 703382"/>
+                <a:gd name="csX15" fmla="*/ 448191 w 1085707"/>
+                <a:gd name="csY15" fmla="*/ 703382 h 703382"/>
+                <a:gd name="csX16" fmla="*/ 321212 w 1085707"/>
+                <a:gd name="csY16" fmla="*/ 703382 h 703382"/>
+                <a:gd name="csX17" fmla="*/ 321212 w 1085707"/>
+                <a:gd name="csY17" fmla="*/ 623625 h 703382"/>
+                <a:gd name="csX18" fmla="*/ 321281 w 1085707"/>
+                <a:gd name="csY18" fmla="*/ 623625 h 703382"/>
+                <a:gd name="csX19" fmla="*/ 321281 w 1085707"/>
+                <a:gd name="csY19" fmla="*/ 579132 h 703382"/>
+                <a:gd name="csX20" fmla="*/ 357890 w 1085707"/>
+                <a:gd name="csY20" fmla="*/ 579132 h 703382"/>
+                <a:gd name="csX21" fmla="*/ 357889 w 1085707"/>
+                <a:gd name="csY21" fmla="*/ 522383 h 703382"/>
+                <a:gd name="csX22" fmla="*/ 426575 w 1085707"/>
+                <a:gd name="csY22" fmla="*/ 522383 h 703382"/>
+                <a:gd name="csX23" fmla="*/ 426575 w 1085707"/>
+                <a:gd name="csY23" fmla="*/ 488669 h 703382"/>
+                <a:gd name="csX24" fmla="*/ 511104 w 1085707"/>
+                <a:gd name="csY24" fmla="*/ 488669 h 703382"/>
+                <a:gd name="csX25" fmla="*/ 511104 w 1085707"/>
+                <a:gd name="csY25" fmla="*/ 432225 h 703382"/>
+                <a:gd name="csX26" fmla="*/ 550677 w 1085707"/>
+                <a:gd name="csY26" fmla="*/ 432225 h 703382"/>
+                <a:gd name="csX27" fmla="*/ 550677 w 1085707"/>
+                <a:gd name="csY27" fmla="*/ 338966 h 703382"/>
+                <a:gd name="csX28" fmla="*/ 477099 w 1085707"/>
+                <a:gd name="csY28" fmla="*/ 265002 h 703382"/>
+                <a:gd name="csX29" fmla="*/ 477181 w 1085707"/>
+                <a:gd name="csY29" fmla="*/ 233559 h 703382"/>
+                <a:gd name="csX30" fmla="*/ 364498 w 1085707"/>
+                <a:gd name="csY30" fmla="*/ 233559 h 703382"/>
+                <a:gd name="csX31" fmla="*/ 253592 w 1085707"/>
+                <a:gd name="csY31" fmla="*/ 412824 h 703382"/>
+                <a:gd name="csX32" fmla="*/ 243610 w 1085707"/>
+                <a:gd name="csY32" fmla="*/ 633860 h 703382"/>
+                <a:gd name="csX33" fmla="*/ 0 w 1085707"/>
+                <a:gd name="csY33" fmla="*/ 646854 h 703382"/>
+                <a:gd name="csX34" fmla="*/ 73913 w 1085707"/>
+                <a:gd name="csY34" fmla="*/ 371797 h 703382"/>
+                <a:gd name="csX35" fmla="*/ 60860 w 1085707"/>
+                <a:gd name="csY35" fmla="*/ 361181 h 703382"/>
+                <a:gd name="csX36" fmla="*/ 344332 w 1085707"/>
+                <a:gd name="csY36" fmla="*/ 12605 h 703382"/>
+                <a:gd name="csX37" fmla="*/ 344332 w 1085707"/>
+                <a:gd name="csY37" fmla="*/ 1522 h 703382"/>
+                <a:gd name="csX38" fmla="*/ 353346 w 1085707"/>
+                <a:gd name="csY38" fmla="*/ 1522 h 703382"/>
+                <a:gd name="csX39" fmla="*/ 354584 w 1085707"/>
+                <a:gd name="csY39" fmla="*/ 0 h 703382"/>
+                <a:gd name="csX40" fmla="*/ 356456 w 1085707"/>
+                <a:gd name="csY40" fmla="*/ 1522 h 703382"/>
+                <a:gd name="csX41" fmla="*/ 1085707 w 1085707"/>
+                <a:gd name="csY41" fmla="*/ 1522 h 703382"/>
+                <a:gd name="csX0" fmla="*/ 1085707 w 1085707"/>
+                <a:gd name="csY0" fmla="*/ 1522 h 703382"/>
+                <a:gd name="csX1" fmla="*/ 1085707 w 1085707"/>
+                <a:gd name="csY1" fmla="*/ 233559 h 703382"/>
+                <a:gd name="csX2" fmla="*/ 1084733 w 1085707"/>
+                <a:gd name="csY2" fmla="*/ 233559 h 703382"/>
+                <a:gd name="csX3" fmla="*/ 1084429 w 1085707"/>
+                <a:gd name="csY3" fmla="*/ 350240 h 703382"/>
+                <a:gd name="csX4" fmla="*/ 916260 w 1085707"/>
+                <a:gd name="csY4" fmla="*/ 349802 h 703382"/>
+                <a:gd name="csX5" fmla="*/ 916259 w 1085707"/>
+                <a:gd name="csY5" fmla="*/ 456025 h 703382"/>
+                <a:gd name="csX6" fmla="*/ 868184 w 1085707"/>
+                <a:gd name="csY6" fmla="*/ 456025 h 703382"/>
+                <a:gd name="csX7" fmla="*/ 868184 w 1085707"/>
+                <a:gd name="csY7" fmla="*/ 511982 h 703382"/>
+                <a:gd name="csX8" fmla="*/ 783655 w 1085707"/>
+                <a:gd name="csY8" fmla="*/ 511982 h 703382"/>
+                <a:gd name="csX9" fmla="*/ 783655 w 1085707"/>
+                <a:gd name="csY9" fmla="*/ 568426 h 703382"/>
+                <a:gd name="csX10" fmla="*/ 698055 w 1085707"/>
+                <a:gd name="csY10" fmla="*/ 568426 h 703382"/>
+                <a:gd name="csX11" fmla="*/ 698055 w 1085707"/>
+                <a:gd name="csY11" fmla="*/ 602140 h 703382"/>
+                <a:gd name="csX12" fmla="*/ 516288 w 1085707"/>
+                <a:gd name="csY12" fmla="*/ 602140 h 703382"/>
+                <a:gd name="csX13" fmla="*/ 516288 w 1085707"/>
+                <a:gd name="csY13" fmla="*/ 658889 h 703382"/>
+                <a:gd name="csX14" fmla="*/ 448191 w 1085707"/>
+                <a:gd name="csY14" fmla="*/ 658889 h 703382"/>
+                <a:gd name="csX15" fmla="*/ 448191 w 1085707"/>
+                <a:gd name="csY15" fmla="*/ 703382 h 703382"/>
+                <a:gd name="csX16" fmla="*/ 321212 w 1085707"/>
+                <a:gd name="csY16" fmla="*/ 703382 h 703382"/>
+                <a:gd name="csX17" fmla="*/ 321212 w 1085707"/>
+                <a:gd name="csY17" fmla="*/ 623625 h 703382"/>
+                <a:gd name="csX18" fmla="*/ 321281 w 1085707"/>
+                <a:gd name="csY18" fmla="*/ 623625 h 703382"/>
+                <a:gd name="csX19" fmla="*/ 321281 w 1085707"/>
+                <a:gd name="csY19" fmla="*/ 579132 h 703382"/>
+                <a:gd name="csX20" fmla="*/ 357890 w 1085707"/>
+                <a:gd name="csY20" fmla="*/ 579132 h 703382"/>
+                <a:gd name="csX21" fmla="*/ 357889 w 1085707"/>
+                <a:gd name="csY21" fmla="*/ 522383 h 703382"/>
+                <a:gd name="csX22" fmla="*/ 426575 w 1085707"/>
+                <a:gd name="csY22" fmla="*/ 522383 h 703382"/>
+                <a:gd name="csX23" fmla="*/ 426575 w 1085707"/>
+                <a:gd name="csY23" fmla="*/ 488669 h 703382"/>
+                <a:gd name="csX24" fmla="*/ 511104 w 1085707"/>
+                <a:gd name="csY24" fmla="*/ 488669 h 703382"/>
+                <a:gd name="csX25" fmla="*/ 511104 w 1085707"/>
+                <a:gd name="csY25" fmla="*/ 432225 h 703382"/>
+                <a:gd name="csX26" fmla="*/ 550677 w 1085707"/>
+                <a:gd name="csY26" fmla="*/ 432225 h 703382"/>
+                <a:gd name="csX27" fmla="*/ 550677 w 1085707"/>
+                <a:gd name="csY27" fmla="*/ 338966 h 703382"/>
+                <a:gd name="csX28" fmla="*/ 477099 w 1085707"/>
+                <a:gd name="csY28" fmla="*/ 265002 h 703382"/>
+                <a:gd name="csX29" fmla="*/ 477181 w 1085707"/>
+                <a:gd name="csY29" fmla="*/ 233559 h 703382"/>
+                <a:gd name="csX30" fmla="*/ 364498 w 1085707"/>
+                <a:gd name="csY30" fmla="*/ 233559 h 703382"/>
+                <a:gd name="csX31" fmla="*/ 253592 w 1085707"/>
+                <a:gd name="csY31" fmla="*/ 412824 h 703382"/>
+                <a:gd name="csX32" fmla="*/ 243610 w 1085707"/>
+                <a:gd name="csY32" fmla="*/ 633860 h 703382"/>
+                <a:gd name="csX33" fmla="*/ 0 w 1085707"/>
+                <a:gd name="csY33" fmla="*/ 646854 h 703382"/>
+                <a:gd name="csX34" fmla="*/ 73913 w 1085707"/>
+                <a:gd name="csY34" fmla="*/ 371797 h 703382"/>
+                <a:gd name="csX35" fmla="*/ 116599 w 1085707"/>
+                <a:gd name="csY35" fmla="*/ 410248 h 703382"/>
+                <a:gd name="csX36" fmla="*/ 344332 w 1085707"/>
+                <a:gd name="csY36" fmla="*/ 12605 h 703382"/>
+                <a:gd name="csX37" fmla="*/ 344332 w 1085707"/>
+                <a:gd name="csY37" fmla="*/ 1522 h 703382"/>
+                <a:gd name="csX38" fmla="*/ 353346 w 1085707"/>
+                <a:gd name="csY38" fmla="*/ 1522 h 703382"/>
+                <a:gd name="csX39" fmla="*/ 354584 w 1085707"/>
+                <a:gd name="csY39" fmla="*/ 0 h 703382"/>
+                <a:gd name="csX40" fmla="*/ 356456 w 1085707"/>
+                <a:gd name="csY40" fmla="*/ 1522 h 703382"/>
+                <a:gd name="csX41" fmla="*/ 1085707 w 1085707"/>
+                <a:gd name="csY41" fmla="*/ 1522 h 703382"/>
+                <a:gd name="csX0" fmla="*/ 1085707 w 1085707"/>
+                <a:gd name="csY0" fmla="*/ 1522 h 703382"/>
+                <a:gd name="csX1" fmla="*/ 1085707 w 1085707"/>
+                <a:gd name="csY1" fmla="*/ 233559 h 703382"/>
+                <a:gd name="csX2" fmla="*/ 1084733 w 1085707"/>
+                <a:gd name="csY2" fmla="*/ 233559 h 703382"/>
+                <a:gd name="csX3" fmla="*/ 1084429 w 1085707"/>
+                <a:gd name="csY3" fmla="*/ 350240 h 703382"/>
+                <a:gd name="csX4" fmla="*/ 916260 w 1085707"/>
+                <a:gd name="csY4" fmla="*/ 349802 h 703382"/>
+                <a:gd name="csX5" fmla="*/ 916259 w 1085707"/>
+                <a:gd name="csY5" fmla="*/ 456025 h 703382"/>
+                <a:gd name="csX6" fmla="*/ 868184 w 1085707"/>
+                <a:gd name="csY6" fmla="*/ 456025 h 703382"/>
+                <a:gd name="csX7" fmla="*/ 868184 w 1085707"/>
+                <a:gd name="csY7" fmla="*/ 511982 h 703382"/>
+                <a:gd name="csX8" fmla="*/ 783655 w 1085707"/>
+                <a:gd name="csY8" fmla="*/ 511982 h 703382"/>
+                <a:gd name="csX9" fmla="*/ 783655 w 1085707"/>
+                <a:gd name="csY9" fmla="*/ 568426 h 703382"/>
+                <a:gd name="csX10" fmla="*/ 698055 w 1085707"/>
+                <a:gd name="csY10" fmla="*/ 568426 h 703382"/>
+                <a:gd name="csX11" fmla="*/ 698055 w 1085707"/>
+                <a:gd name="csY11" fmla="*/ 602140 h 703382"/>
+                <a:gd name="csX12" fmla="*/ 516288 w 1085707"/>
+                <a:gd name="csY12" fmla="*/ 602140 h 703382"/>
+                <a:gd name="csX13" fmla="*/ 516288 w 1085707"/>
+                <a:gd name="csY13" fmla="*/ 658889 h 703382"/>
+                <a:gd name="csX14" fmla="*/ 448191 w 1085707"/>
+                <a:gd name="csY14" fmla="*/ 658889 h 703382"/>
+                <a:gd name="csX15" fmla="*/ 448191 w 1085707"/>
+                <a:gd name="csY15" fmla="*/ 703382 h 703382"/>
+                <a:gd name="csX16" fmla="*/ 321212 w 1085707"/>
+                <a:gd name="csY16" fmla="*/ 703382 h 703382"/>
+                <a:gd name="csX17" fmla="*/ 321212 w 1085707"/>
+                <a:gd name="csY17" fmla="*/ 623625 h 703382"/>
+                <a:gd name="csX18" fmla="*/ 321281 w 1085707"/>
+                <a:gd name="csY18" fmla="*/ 623625 h 703382"/>
+                <a:gd name="csX19" fmla="*/ 321281 w 1085707"/>
+                <a:gd name="csY19" fmla="*/ 579132 h 703382"/>
+                <a:gd name="csX20" fmla="*/ 357890 w 1085707"/>
+                <a:gd name="csY20" fmla="*/ 579132 h 703382"/>
+                <a:gd name="csX21" fmla="*/ 357889 w 1085707"/>
+                <a:gd name="csY21" fmla="*/ 522383 h 703382"/>
+                <a:gd name="csX22" fmla="*/ 426575 w 1085707"/>
+                <a:gd name="csY22" fmla="*/ 522383 h 703382"/>
+                <a:gd name="csX23" fmla="*/ 426575 w 1085707"/>
+                <a:gd name="csY23" fmla="*/ 488669 h 703382"/>
+                <a:gd name="csX24" fmla="*/ 511104 w 1085707"/>
+                <a:gd name="csY24" fmla="*/ 488669 h 703382"/>
+                <a:gd name="csX25" fmla="*/ 511104 w 1085707"/>
+                <a:gd name="csY25" fmla="*/ 432225 h 703382"/>
+                <a:gd name="csX26" fmla="*/ 550677 w 1085707"/>
+                <a:gd name="csY26" fmla="*/ 432225 h 703382"/>
+                <a:gd name="csX27" fmla="*/ 550677 w 1085707"/>
+                <a:gd name="csY27" fmla="*/ 338966 h 703382"/>
+                <a:gd name="csX28" fmla="*/ 477099 w 1085707"/>
+                <a:gd name="csY28" fmla="*/ 265002 h 703382"/>
+                <a:gd name="csX29" fmla="*/ 477181 w 1085707"/>
+                <a:gd name="csY29" fmla="*/ 233559 h 703382"/>
+                <a:gd name="csX30" fmla="*/ 364498 w 1085707"/>
+                <a:gd name="csY30" fmla="*/ 233559 h 703382"/>
+                <a:gd name="csX31" fmla="*/ 253592 w 1085707"/>
+                <a:gd name="csY31" fmla="*/ 412824 h 703382"/>
+                <a:gd name="csX32" fmla="*/ 243610 w 1085707"/>
+                <a:gd name="csY32" fmla="*/ 633860 h 703382"/>
+                <a:gd name="csX33" fmla="*/ 0 w 1085707"/>
+                <a:gd name="csY33" fmla="*/ 646854 h 703382"/>
+                <a:gd name="csX34" fmla="*/ 73913 w 1085707"/>
+                <a:gd name="csY34" fmla="*/ 371797 h 703382"/>
+                <a:gd name="csX35" fmla="*/ 229131 w 1085707"/>
+                <a:gd name="csY35" fmla="*/ 122470 h 703382"/>
+                <a:gd name="csX36" fmla="*/ 344332 w 1085707"/>
+                <a:gd name="csY36" fmla="*/ 12605 h 703382"/>
+                <a:gd name="csX37" fmla="*/ 344332 w 1085707"/>
+                <a:gd name="csY37" fmla="*/ 1522 h 703382"/>
+                <a:gd name="csX38" fmla="*/ 353346 w 1085707"/>
+                <a:gd name="csY38" fmla="*/ 1522 h 703382"/>
+                <a:gd name="csX39" fmla="*/ 354584 w 1085707"/>
+                <a:gd name="csY39" fmla="*/ 0 h 703382"/>
+                <a:gd name="csX40" fmla="*/ 356456 w 1085707"/>
+                <a:gd name="csY40" fmla="*/ 1522 h 703382"/>
+                <a:gd name="csX41" fmla="*/ 1085707 w 1085707"/>
+                <a:gd name="csY41" fmla="*/ 1522 h 703382"/>
+                <a:gd name="csX0" fmla="*/ 1085707 w 1085707"/>
+                <a:gd name="csY0" fmla="*/ 1522 h 703382"/>
+                <a:gd name="csX1" fmla="*/ 1085707 w 1085707"/>
+                <a:gd name="csY1" fmla="*/ 233559 h 703382"/>
+                <a:gd name="csX2" fmla="*/ 1084733 w 1085707"/>
+                <a:gd name="csY2" fmla="*/ 233559 h 703382"/>
+                <a:gd name="csX3" fmla="*/ 1084429 w 1085707"/>
+                <a:gd name="csY3" fmla="*/ 350240 h 703382"/>
+                <a:gd name="csX4" fmla="*/ 916260 w 1085707"/>
+                <a:gd name="csY4" fmla="*/ 349802 h 703382"/>
+                <a:gd name="csX5" fmla="*/ 916259 w 1085707"/>
+                <a:gd name="csY5" fmla="*/ 456025 h 703382"/>
+                <a:gd name="csX6" fmla="*/ 868184 w 1085707"/>
+                <a:gd name="csY6" fmla="*/ 456025 h 703382"/>
+                <a:gd name="csX7" fmla="*/ 868184 w 1085707"/>
+                <a:gd name="csY7" fmla="*/ 511982 h 703382"/>
+                <a:gd name="csX8" fmla="*/ 783655 w 1085707"/>
+                <a:gd name="csY8" fmla="*/ 511982 h 703382"/>
+                <a:gd name="csX9" fmla="*/ 783655 w 1085707"/>
+                <a:gd name="csY9" fmla="*/ 568426 h 703382"/>
+                <a:gd name="csX10" fmla="*/ 698055 w 1085707"/>
+                <a:gd name="csY10" fmla="*/ 568426 h 703382"/>
+                <a:gd name="csX11" fmla="*/ 698055 w 1085707"/>
+                <a:gd name="csY11" fmla="*/ 602140 h 703382"/>
+                <a:gd name="csX12" fmla="*/ 516288 w 1085707"/>
+                <a:gd name="csY12" fmla="*/ 602140 h 703382"/>
+                <a:gd name="csX13" fmla="*/ 516288 w 1085707"/>
+                <a:gd name="csY13" fmla="*/ 658889 h 703382"/>
+                <a:gd name="csX14" fmla="*/ 448191 w 1085707"/>
+                <a:gd name="csY14" fmla="*/ 658889 h 703382"/>
+                <a:gd name="csX15" fmla="*/ 448191 w 1085707"/>
+                <a:gd name="csY15" fmla="*/ 703382 h 703382"/>
+                <a:gd name="csX16" fmla="*/ 321212 w 1085707"/>
+                <a:gd name="csY16" fmla="*/ 703382 h 703382"/>
+                <a:gd name="csX17" fmla="*/ 321212 w 1085707"/>
+                <a:gd name="csY17" fmla="*/ 623625 h 703382"/>
+                <a:gd name="csX18" fmla="*/ 321281 w 1085707"/>
+                <a:gd name="csY18" fmla="*/ 623625 h 703382"/>
+                <a:gd name="csX19" fmla="*/ 321281 w 1085707"/>
+                <a:gd name="csY19" fmla="*/ 579132 h 703382"/>
+                <a:gd name="csX20" fmla="*/ 357890 w 1085707"/>
+                <a:gd name="csY20" fmla="*/ 579132 h 703382"/>
+                <a:gd name="csX21" fmla="*/ 357889 w 1085707"/>
+                <a:gd name="csY21" fmla="*/ 522383 h 703382"/>
+                <a:gd name="csX22" fmla="*/ 426575 w 1085707"/>
+                <a:gd name="csY22" fmla="*/ 522383 h 703382"/>
+                <a:gd name="csX23" fmla="*/ 426575 w 1085707"/>
+                <a:gd name="csY23" fmla="*/ 488669 h 703382"/>
+                <a:gd name="csX24" fmla="*/ 511104 w 1085707"/>
+                <a:gd name="csY24" fmla="*/ 488669 h 703382"/>
+                <a:gd name="csX25" fmla="*/ 511104 w 1085707"/>
+                <a:gd name="csY25" fmla="*/ 432225 h 703382"/>
+                <a:gd name="csX26" fmla="*/ 550677 w 1085707"/>
+                <a:gd name="csY26" fmla="*/ 432225 h 703382"/>
+                <a:gd name="csX27" fmla="*/ 550677 w 1085707"/>
+                <a:gd name="csY27" fmla="*/ 338966 h 703382"/>
+                <a:gd name="csX28" fmla="*/ 477099 w 1085707"/>
+                <a:gd name="csY28" fmla="*/ 265002 h 703382"/>
+                <a:gd name="csX29" fmla="*/ 477181 w 1085707"/>
+                <a:gd name="csY29" fmla="*/ 233559 h 703382"/>
+                <a:gd name="csX30" fmla="*/ 364498 w 1085707"/>
+                <a:gd name="csY30" fmla="*/ 233559 h 703382"/>
+                <a:gd name="csX31" fmla="*/ 253592 w 1085707"/>
+                <a:gd name="csY31" fmla="*/ 412824 h 703382"/>
+                <a:gd name="csX32" fmla="*/ 243610 w 1085707"/>
+                <a:gd name="csY32" fmla="*/ 633860 h 703382"/>
+                <a:gd name="csX33" fmla="*/ 0 w 1085707"/>
+                <a:gd name="csY33" fmla="*/ 646854 h 703382"/>
+                <a:gd name="csX34" fmla="*/ 138649 w 1085707"/>
+                <a:gd name="csY34" fmla="*/ 369488 h 703382"/>
+                <a:gd name="csX35" fmla="*/ 229131 w 1085707"/>
+                <a:gd name="csY35" fmla="*/ 122470 h 703382"/>
+                <a:gd name="csX36" fmla="*/ 344332 w 1085707"/>
+                <a:gd name="csY36" fmla="*/ 12605 h 703382"/>
+                <a:gd name="csX37" fmla="*/ 344332 w 1085707"/>
+                <a:gd name="csY37" fmla="*/ 1522 h 703382"/>
+                <a:gd name="csX38" fmla="*/ 353346 w 1085707"/>
+                <a:gd name="csY38" fmla="*/ 1522 h 703382"/>
+                <a:gd name="csX39" fmla="*/ 354584 w 1085707"/>
+                <a:gd name="csY39" fmla="*/ 0 h 703382"/>
+                <a:gd name="csX40" fmla="*/ 356456 w 1085707"/>
+                <a:gd name="csY40" fmla="*/ 1522 h 703382"/>
+                <a:gd name="csX41" fmla="*/ 1085707 w 1085707"/>
+                <a:gd name="csY41" fmla="*/ 1522 h 703382"/>
+                <a:gd name="csX0" fmla="*/ 1085707 w 1085707"/>
+                <a:gd name="csY0" fmla="*/ 1522 h 703382"/>
+                <a:gd name="csX1" fmla="*/ 1085707 w 1085707"/>
+                <a:gd name="csY1" fmla="*/ 233559 h 703382"/>
+                <a:gd name="csX2" fmla="*/ 1084733 w 1085707"/>
+                <a:gd name="csY2" fmla="*/ 233559 h 703382"/>
+                <a:gd name="csX3" fmla="*/ 1084429 w 1085707"/>
+                <a:gd name="csY3" fmla="*/ 350240 h 703382"/>
+                <a:gd name="csX4" fmla="*/ 916260 w 1085707"/>
+                <a:gd name="csY4" fmla="*/ 349802 h 703382"/>
+                <a:gd name="csX5" fmla="*/ 916259 w 1085707"/>
+                <a:gd name="csY5" fmla="*/ 456025 h 703382"/>
+                <a:gd name="csX6" fmla="*/ 868184 w 1085707"/>
+                <a:gd name="csY6" fmla="*/ 456025 h 703382"/>
+                <a:gd name="csX7" fmla="*/ 868184 w 1085707"/>
+                <a:gd name="csY7" fmla="*/ 511982 h 703382"/>
+                <a:gd name="csX8" fmla="*/ 783655 w 1085707"/>
+                <a:gd name="csY8" fmla="*/ 511982 h 703382"/>
+                <a:gd name="csX9" fmla="*/ 783655 w 1085707"/>
+                <a:gd name="csY9" fmla="*/ 568426 h 703382"/>
+                <a:gd name="csX10" fmla="*/ 698055 w 1085707"/>
+                <a:gd name="csY10" fmla="*/ 568426 h 703382"/>
+                <a:gd name="csX11" fmla="*/ 698055 w 1085707"/>
+                <a:gd name="csY11" fmla="*/ 602140 h 703382"/>
+                <a:gd name="csX12" fmla="*/ 516288 w 1085707"/>
+                <a:gd name="csY12" fmla="*/ 602140 h 703382"/>
+                <a:gd name="csX13" fmla="*/ 516288 w 1085707"/>
+                <a:gd name="csY13" fmla="*/ 658889 h 703382"/>
+                <a:gd name="csX14" fmla="*/ 448191 w 1085707"/>
+                <a:gd name="csY14" fmla="*/ 658889 h 703382"/>
+                <a:gd name="csX15" fmla="*/ 448191 w 1085707"/>
+                <a:gd name="csY15" fmla="*/ 703382 h 703382"/>
+                <a:gd name="csX16" fmla="*/ 321212 w 1085707"/>
+                <a:gd name="csY16" fmla="*/ 703382 h 703382"/>
+                <a:gd name="csX17" fmla="*/ 321212 w 1085707"/>
+                <a:gd name="csY17" fmla="*/ 623625 h 703382"/>
+                <a:gd name="csX18" fmla="*/ 321281 w 1085707"/>
+                <a:gd name="csY18" fmla="*/ 623625 h 703382"/>
+                <a:gd name="csX19" fmla="*/ 321281 w 1085707"/>
+                <a:gd name="csY19" fmla="*/ 579132 h 703382"/>
+                <a:gd name="csX20" fmla="*/ 357890 w 1085707"/>
+                <a:gd name="csY20" fmla="*/ 579132 h 703382"/>
+                <a:gd name="csX21" fmla="*/ 357889 w 1085707"/>
+                <a:gd name="csY21" fmla="*/ 522383 h 703382"/>
+                <a:gd name="csX22" fmla="*/ 426575 w 1085707"/>
+                <a:gd name="csY22" fmla="*/ 522383 h 703382"/>
+                <a:gd name="csX23" fmla="*/ 426575 w 1085707"/>
+                <a:gd name="csY23" fmla="*/ 488669 h 703382"/>
+                <a:gd name="csX24" fmla="*/ 511104 w 1085707"/>
+                <a:gd name="csY24" fmla="*/ 488669 h 703382"/>
+                <a:gd name="csX25" fmla="*/ 511104 w 1085707"/>
+                <a:gd name="csY25" fmla="*/ 432225 h 703382"/>
+                <a:gd name="csX26" fmla="*/ 550677 w 1085707"/>
+                <a:gd name="csY26" fmla="*/ 432225 h 703382"/>
+                <a:gd name="csX27" fmla="*/ 550677 w 1085707"/>
+                <a:gd name="csY27" fmla="*/ 338966 h 703382"/>
+                <a:gd name="csX28" fmla="*/ 477099 w 1085707"/>
+                <a:gd name="csY28" fmla="*/ 265002 h 703382"/>
+                <a:gd name="csX29" fmla="*/ 477181 w 1085707"/>
+                <a:gd name="csY29" fmla="*/ 233559 h 703382"/>
+                <a:gd name="csX30" fmla="*/ 364498 w 1085707"/>
+                <a:gd name="csY30" fmla="*/ 233559 h 703382"/>
+                <a:gd name="csX31" fmla="*/ 253592 w 1085707"/>
+                <a:gd name="csY31" fmla="*/ 412824 h 703382"/>
+                <a:gd name="csX32" fmla="*/ 243610 w 1085707"/>
+                <a:gd name="csY32" fmla="*/ 633860 h 703382"/>
+                <a:gd name="csX33" fmla="*/ 0 w 1085707"/>
+                <a:gd name="csY33" fmla="*/ 646854 h 703382"/>
+                <a:gd name="csX34" fmla="*/ 109128 w 1085707"/>
+                <a:gd name="csY34" fmla="*/ 405620 h 703382"/>
+                <a:gd name="csX35" fmla="*/ 229131 w 1085707"/>
+                <a:gd name="csY35" fmla="*/ 122470 h 703382"/>
+                <a:gd name="csX36" fmla="*/ 344332 w 1085707"/>
+                <a:gd name="csY36" fmla="*/ 12605 h 703382"/>
+                <a:gd name="csX37" fmla="*/ 344332 w 1085707"/>
+                <a:gd name="csY37" fmla="*/ 1522 h 703382"/>
+                <a:gd name="csX38" fmla="*/ 353346 w 1085707"/>
+                <a:gd name="csY38" fmla="*/ 1522 h 703382"/>
+                <a:gd name="csX39" fmla="*/ 354584 w 1085707"/>
+                <a:gd name="csY39" fmla="*/ 0 h 703382"/>
+                <a:gd name="csX40" fmla="*/ 356456 w 1085707"/>
+                <a:gd name="csY40" fmla="*/ 1522 h 703382"/>
+                <a:gd name="csX41" fmla="*/ 1085707 w 1085707"/>
+                <a:gd name="csY41" fmla="*/ 1522 h 703382"/>
+                <a:gd name="csX0" fmla="*/ 976579 w 976579"/>
+                <a:gd name="csY0" fmla="*/ 1522 h 703382"/>
+                <a:gd name="csX1" fmla="*/ 976579 w 976579"/>
+                <a:gd name="csY1" fmla="*/ 233559 h 703382"/>
+                <a:gd name="csX2" fmla="*/ 975605 w 976579"/>
+                <a:gd name="csY2" fmla="*/ 233559 h 703382"/>
+                <a:gd name="csX3" fmla="*/ 975301 w 976579"/>
+                <a:gd name="csY3" fmla="*/ 350240 h 703382"/>
+                <a:gd name="csX4" fmla="*/ 807132 w 976579"/>
+                <a:gd name="csY4" fmla="*/ 349802 h 703382"/>
+                <a:gd name="csX5" fmla="*/ 807131 w 976579"/>
+                <a:gd name="csY5" fmla="*/ 456025 h 703382"/>
+                <a:gd name="csX6" fmla="*/ 759056 w 976579"/>
+                <a:gd name="csY6" fmla="*/ 456025 h 703382"/>
+                <a:gd name="csX7" fmla="*/ 759056 w 976579"/>
+                <a:gd name="csY7" fmla="*/ 511982 h 703382"/>
+                <a:gd name="csX8" fmla="*/ 674527 w 976579"/>
+                <a:gd name="csY8" fmla="*/ 511982 h 703382"/>
+                <a:gd name="csX9" fmla="*/ 674527 w 976579"/>
+                <a:gd name="csY9" fmla="*/ 568426 h 703382"/>
+                <a:gd name="csX10" fmla="*/ 588927 w 976579"/>
+                <a:gd name="csY10" fmla="*/ 568426 h 703382"/>
+                <a:gd name="csX11" fmla="*/ 588927 w 976579"/>
+                <a:gd name="csY11" fmla="*/ 602140 h 703382"/>
+                <a:gd name="csX12" fmla="*/ 407160 w 976579"/>
+                <a:gd name="csY12" fmla="*/ 602140 h 703382"/>
+                <a:gd name="csX13" fmla="*/ 407160 w 976579"/>
+                <a:gd name="csY13" fmla="*/ 658889 h 703382"/>
+                <a:gd name="csX14" fmla="*/ 339063 w 976579"/>
+                <a:gd name="csY14" fmla="*/ 658889 h 703382"/>
+                <a:gd name="csX15" fmla="*/ 339063 w 976579"/>
+                <a:gd name="csY15" fmla="*/ 703382 h 703382"/>
+                <a:gd name="csX16" fmla="*/ 212084 w 976579"/>
+                <a:gd name="csY16" fmla="*/ 703382 h 703382"/>
+                <a:gd name="csX17" fmla="*/ 212084 w 976579"/>
+                <a:gd name="csY17" fmla="*/ 623625 h 703382"/>
+                <a:gd name="csX18" fmla="*/ 212153 w 976579"/>
+                <a:gd name="csY18" fmla="*/ 623625 h 703382"/>
+                <a:gd name="csX19" fmla="*/ 212153 w 976579"/>
+                <a:gd name="csY19" fmla="*/ 579132 h 703382"/>
+                <a:gd name="csX20" fmla="*/ 248762 w 976579"/>
+                <a:gd name="csY20" fmla="*/ 579132 h 703382"/>
+                <a:gd name="csX21" fmla="*/ 248761 w 976579"/>
+                <a:gd name="csY21" fmla="*/ 522383 h 703382"/>
+                <a:gd name="csX22" fmla="*/ 317447 w 976579"/>
+                <a:gd name="csY22" fmla="*/ 522383 h 703382"/>
+                <a:gd name="csX23" fmla="*/ 317447 w 976579"/>
+                <a:gd name="csY23" fmla="*/ 488669 h 703382"/>
+                <a:gd name="csX24" fmla="*/ 401976 w 976579"/>
+                <a:gd name="csY24" fmla="*/ 488669 h 703382"/>
+                <a:gd name="csX25" fmla="*/ 401976 w 976579"/>
+                <a:gd name="csY25" fmla="*/ 432225 h 703382"/>
+                <a:gd name="csX26" fmla="*/ 441549 w 976579"/>
+                <a:gd name="csY26" fmla="*/ 432225 h 703382"/>
+                <a:gd name="csX27" fmla="*/ 441549 w 976579"/>
+                <a:gd name="csY27" fmla="*/ 338966 h 703382"/>
+                <a:gd name="csX28" fmla="*/ 367971 w 976579"/>
+                <a:gd name="csY28" fmla="*/ 265002 h 703382"/>
+                <a:gd name="csX29" fmla="*/ 368053 w 976579"/>
+                <a:gd name="csY29" fmla="*/ 233559 h 703382"/>
+                <a:gd name="csX30" fmla="*/ 255370 w 976579"/>
+                <a:gd name="csY30" fmla="*/ 233559 h 703382"/>
+                <a:gd name="csX31" fmla="*/ 144464 w 976579"/>
+                <a:gd name="csY31" fmla="*/ 412824 h 703382"/>
+                <a:gd name="csX32" fmla="*/ 134482 w 976579"/>
+                <a:gd name="csY32" fmla="*/ 633860 h 703382"/>
+                <a:gd name="csX33" fmla="*/ 21234 w 976579"/>
+                <a:gd name="csY33" fmla="*/ 657137 h 703382"/>
+                <a:gd name="csX34" fmla="*/ 0 w 976579"/>
+                <a:gd name="csY34" fmla="*/ 405620 h 703382"/>
+                <a:gd name="csX35" fmla="*/ 120003 w 976579"/>
+                <a:gd name="csY35" fmla="*/ 122470 h 703382"/>
+                <a:gd name="csX36" fmla="*/ 235204 w 976579"/>
+                <a:gd name="csY36" fmla="*/ 12605 h 703382"/>
+                <a:gd name="csX37" fmla="*/ 235204 w 976579"/>
+                <a:gd name="csY37" fmla="*/ 1522 h 703382"/>
+                <a:gd name="csX38" fmla="*/ 244218 w 976579"/>
+                <a:gd name="csY38" fmla="*/ 1522 h 703382"/>
+                <a:gd name="csX39" fmla="*/ 245456 w 976579"/>
+                <a:gd name="csY39" fmla="*/ 0 h 703382"/>
+                <a:gd name="csX40" fmla="*/ 247328 w 976579"/>
+                <a:gd name="csY40" fmla="*/ 1522 h 703382"/>
+                <a:gd name="csX41" fmla="*/ 976579 w 976579"/>
+                <a:gd name="csY41" fmla="*/ 1522 h 703382"/>
+                <a:gd name="csX0" fmla="*/ 982597 w 982597"/>
+                <a:gd name="csY0" fmla="*/ 1522 h 703382"/>
+                <a:gd name="csX1" fmla="*/ 982597 w 982597"/>
+                <a:gd name="csY1" fmla="*/ 233559 h 703382"/>
+                <a:gd name="csX2" fmla="*/ 981623 w 982597"/>
+                <a:gd name="csY2" fmla="*/ 233559 h 703382"/>
+                <a:gd name="csX3" fmla="*/ 981319 w 982597"/>
+                <a:gd name="csY3" fmla="*/ 350240 h 703382"/>
+                <a:gd name="csX4" fmla="*/ 813150 w 982597"/>
+                <a:gd name="csY4" fmla="*/ 349802 h 703382"/>
+                <a:gd name="csX5" fmla="*/ 813149 w 982597"/>
+                <a:gd name="csY5" fmla="*/ 456025 h 703382"/>
+                <a:gd name="csX6" fmla="*/ 765074 w 982597"/>
+                <a:gd name="csY6" fmla="*/ 456025 h 703382"/>
+                <a:gd name="csX7" fmla="*/ 765074 w 982597"/>
+                <a:gd name="csY7" fmla="*/ 511982 h 703382"/>
+                <a:gd name="csX8" fmla="*/ 680545 w 982597"/>
+                <a:gd name="csY8" fmla="*/ 511982 h 703382"/>
+                <a:gd name="csX9" fmla="*/ 680545 w 982597"/>
+                <a:gd name="csY9" fmla="*/ 568426 h 703382"/>
+                <a:gd name="csX10" fmla="*/ 594945 w 982597"/>
+                <a:gd name="csY10" fmla="*/ 568426 h 703382"/>
+                <a:gd name="csX11" fmla="*/ 594945 w 982597"/>
+                <a:gd name="csY11" fmla="*/ 602140 h 703382"/>
+                <a:gd name="csX12" fmla="*/ 413178 w 982597"/>
+                <a:gd name="csY12" fmla="*/ 602140 h 703382"/>
+                <a:gd name="csX13" fmla="*/ 413178 w 982597"/>
+                <a:gd name="csY13" fmla="*/ 658889 h 703382"/>
+                <a:gd name="csX14" fmla="*/ 345081 w 982597"/>
+                <a:gd name="csY14" fmla="*/ 658889 h 703382"/>
+                <a:gd name="csX15" fmla="*/ 345081 w 982597"/>
+                <a:gd name="csY15" fmla="*/ 703382 h 703382"/>
+                <a:gd name="csX16" fmla="*/ 218102 w 982597"/>
+                <a:gd name="csY16" fmla="*/ 703382 h 703382"/>
+                <a:gd name="csX17" fmla="*/ 218102 w 982597"/>
+                <a:gd name="csY17" fmla="*/ 623625 h 703382"/>
+                <a:gd name="csX18" fmla="*/ 218171 w 982597"/>
+                <a:gd name="csY18" fmla="*/ 623625 h 703382"/>
+                <a:gd name="csX19" fmla="*/ 218171 w 982597"/>
+                <a:gd name="csY19" fmla="*/ 579132 h 703382"/>
+                <a:gd name="csX20" fmla="*/ 254780 w 982597"/>
+                <a:gd name="csY20" fmla="*/ 579132 h 703382"/>
+                <a:gd name="csX21" fmla="*/ 254779 w 982597"/>
+                <a:gd name="csY21" fmla="*/ 522383 h 703382"/>
+                <a:gd name="csX22" fmla="*/ 323465 w 982597"/>
+                <a:gd name="csY22" fmla="*/ 522383 h 703382"/>
+                <a:gd name="csX23" fmla="*/ 323465 w 982597"/>
+                <a:gd name="csY23" fmla="*/ 488669 h 703382"/>
+                <a:gd name="csX24" fmla="*/ 407994 w 982597"/>
+                <a:gd name="csY24" fmla="*/ 488669 h 703382"/>
+                <a:gd name="csX25" fmla="*/ 407994 w 982597"/>
+                <a:gd name="csY25" fmla="*/ 432225 h 703382"/>
+                <a:gd name="csX26" fmla="*/ 447567 w 982597"/>
+                <a:gd name="csY26" fmla="*/ 432225 h 703382"/>
+                <a:gd name="csX27" fmla="*/ 447567 w 982597"/>
+                <a:gd name="csY27" fmla="*/ 338966 h 703382"/>
+                <a:gd name="csX28" fmla="*/ 373989 w 982597"/>
+                <a:gd name="csY28" fmla="*/ 265002 h 703382"/>
+                <a:gd name="csX29" fmla="*/ 374071 w 982597"/>
+                <a:gd name="csY29" fmla="*/ 233559 h 703382"/>
+                <a:gd name="csX30" fmla="*/ 261388 w 982597"/>
+                <a:gd name="csY30" fmla="*/ 233559 h 703382"/>
+                <a:gd name="csX31" fmla="*/ 150482 w 982597"/>
+                <a:gd name="csY31" fmla="*/ 412824 h 703382"/>
+                <a:gd name="csX32" fmla="*/ 140500 w 982597"/>
+                <a:gd name="csY32" fmla="*/ 633860 h 703382"/>
+                <a:gd name="csX33" fmla="*/ 0 w 982597"/>
+                <a:gd name="csY33" fmla="*/ 630324 h 703382"/>
+                <a:gd name="csX34" fmla="*/ 6018 w 982597"/>
+                <a:gd name="csY34" fmla="*/ 405620 h 703382"/>
+                <a:gd name="csX35" fmla="*/ 126021 w 982597"/>
+                <a:gd name="csY35" fmla="*/ 122470 h 703382"/>
+                <a:gd name="csX36" fmla="*/ 241222 w 982597"/>
+                <a:gd name="csY36" fmla="*/ 12605 h 703382"/>
+                <a:gd name="csX37" fmla="*/ 241222 w 982597"/>
+                <a:gd name="csY37" fmla="*/ 1522 h 703382"/>
+                <a:gd name="csX38" fmla="*/ 250236 w 982597"/>
+                <a:gd name="csY38" fmla="*/ 1522 h 703382"/>
+                <a:gd name="csX39" fmla="*/ 251474 w 982597"/>
+                <a:gd name="csY39" fmla="*/ 0 h 703382"/>
+                <a:gd name="csX40" fmla="*/ 253346 w 982597"/>
+                <a:gd name="csY40" fmla="*/ 1522 h 703382"/>
+                <a:gd name="csX41" fmla="*/ 982597 w 982597"/>
+                <a:gd name="csY41" fmla="*/ 1522 h 703382"/>
+                <a:gd name="csX0" fmla="*/ 982597 w 982597"/>
+                <a:gd name="csY0" fmla="*/ 1522 h 703382"/>
+                <a:gd name="csX1" fmla="*/ 982597 w 982597"/>
+                <a:gd name="csY1" fmla="*/ 233559 h 703382"/>
+                <a:gd name="csX2" fmla="*/ 981623 w 982597"/>
+                <a:gd name="csY2" fmla="*/ 233559 h 703382"/>
+                <a:gd name="csX3" fmla="*/ 981319 w 982597"/>
+                <a:gd name="csY3" fmla="*/ 350240 h 703382"/>
+                <a:gd name="csX4" fmla="*/ 813150 w 982597"/>
+                <a:gd name="csY4" fmla="*/ 349802 h 703382"/>
+                <a:gd name="csX5" fmla="*/ 813149 w 982597"/>
+                <a:gd name="csY5" fmla="*/ 456025 h 703382"/>
+                <a:gd name="csX6" fmla="*/ 765074 w 982597"/>
+                <a:gd name="csY6" fmla="*/ 456025 h 703382"/>
+                <a:gd name="csX7" fmla="*/ 765074 w 982597"/>
+                <a:gd name="csY7" fmla="*/ 511982 h 703382"/>
+                <a:gd name="csX8" fmla="*/ 680545 w 982597"/>
+                <a:gd name="csY8" fmla="*/ 511982 h 703382"/>
+                <a:gd name="csX9" fmla="*/ 680545 w 982597"/>
+                <a:gd name="csY9" fmla="*/ 568426 h 703382"/>
+                <a:gd name="csX10" fmla="*/ 594945 w 982597"/>
+                <a:gd name="csY10" fmla="*/ 568426 h 703382"/>
+                <a:gd name="csX11" fmla="*/ 594945 w 982597"/>
+                <a:gd name="csY11" fmla="*/ 602140 h 703382"/>
+                <a:gd name="csX12" fmla="*/ 413178 w 982597"/>
+                <a:gd name="csY12" fmla="*/ 602140 h 703382"/>
+                <a:gd name="csX13" fmla="*/ 413178 w 982597"/>
+                <a:gd name="csY13" fmla="*/ 658889 h 703382"/>
+                <a:gd name="csX14" fmla="*/ 345081 w 982597"/>
+                <a:gd name="csY14" fmla="*/ 658889 h 703382"/>
+                <a:gd name="csX15" fmla="*/ 345081 w 982597"/>
+                <a:gd name="csY15" fmla="*/ 703382 h 703382"/>
+                <a:gd name="csX16" fmla="*/ 218102 w 982597"/>
+                <a:gd name="csY16" fmla="*/ 703382 h 703382"/>
+                <a:gd name="csX17" fmla="*/ 218102 w 982597"/>
+                <a:gd name="csY17" fmla="*/ 623625 h 703382"/>
+                <a:gd name="csX18" fmla="*/ 218171 w 982597"/>
+                <a:gd name="csY18" fmla="*/ 623625 h 703382"/>
+                <a:gd name="csX19" fmla="*/ 218171 w 982597"/>
+                <a:gd name="csY19" fmla="*/ 579132 h 703382"/>
+                <a:gd name="csX20" fmla="*/ 254780 w 982597"/>
+                <a:gd name="csY20" fmla="*/ 579132 h 703382"/>
+                <a:gd name="csX21" fmla="*/ 254779 w 982597"/>
+                <a:gd name="csY21" fmla="*/ 522383 h 703382"/>
+                <a:gd name="csX22" fmla="*/ 323465 w 982597"/>
+                <a:gd name="csY22" fmla="*/ 522383 h 703382"/>
+                <a:gd name="csX23" fmla="*/ 323465 w 982597"/>
+                <a:gd name="csY23" fmla="*/ 488669 h 703382"/>
+                <a:gd name="csX24" fmla="*/ 407994 w 982597"/>
+                <a:gd name="csY24" fmla="*/ 488669 h 703382"/>
+                <a:gd name="csX25" fmla="*/ 407994 w 982597"/>
+                <a:gd name="csY25" fmla="*/ 432225 h 703382"/>
+                <a:gd name="csX26" fmla="*/ 447567 w 982597"/>
+                <a:gd name="csY26" fmla="*/ 432225 h 703382"/>
+                <a:gd name="csX27" fmla="*/ 447567 w 982597"/>
+                <a:gd name="csY27" fmla="*/ 338966 h 703382"/>
+                <a:gd name="csX28" fmla="*/ 373989 w 982597"/>
+                <a:gd name="csY28" fmla="*/ 265002 h 703382"/>
+                <a:gd name="csX29" fmla="*/ 374071 w 982597"/>
+                <a:gd name="csY29" fmla="*/ 233559 h 703382"/>
+                <a:gd name="csX30" fmla="*/ 261388 w 982597"/>
+                <a:gd name="csY30" fmla="*/ 233559 h 703382"/>
+                <a:gd name="csX31" fmla="*/ 150482 w 982597"/>
+                <a:gd name="csY31" fmla="*/ 412824 h 703382"/>
+                <a:gd name="csX32" fmla="*/ 140500 w 982597"/>
+                <a:gd name="csY32" fmla="*/ 633860 h 703382"/>
+                <a:gd name="csX33" fmla="*/ 0 w 982597"/>
+                <a:gd name="csY33" fmla="*/ 630324 h 703382"/>
+                <a:gd name="csX34" fmla="*/ 6018 w 982597"/>
+                <a:gd name="csY34" fmla="*/ 405620 h 703382"/>
+                <a:gd name="csX35" fmla="*/ 126021 w 982597"/>
+                <a:gd name="csY35" fmla="*/ 122470 h 703382"/>
+                <a:gd name="csX36" fmla="*/ 241222 w 982597"/>
+                <a:gd name="csY36" fmla="*/ 12605 h 703382"/>
+                <a:gd name="csX37" fmla="*/ 241222 w 982597"/>
+                <a:gd name="csY37" fmla="*/ 1522 h 703382"/>
+                <a:gd name="csX38" fmla="*/ 250236 w 982597"/>
+                <a:gd name="csY38" fmla="*/ 1522 h 703382"/>
+                <a:gd name="csX39" fmla="*/ 251474 w 982597"/>
+                <a:gd name="csY39" fmla="*/ 0 h 703382"/>
+                <a:gd name="csX40" fmla="*/ 253346 w 982597"/>
+                <a:gd name="csY40" fmla="*/ 1522 h 703382"/>
+                <a:gd name="csX41" fmla="*/ 982597 w 982597"/>
+                <a:gd name="csY41" fmla="*/ 1522 h 703382"/>
+                <a:gd name="csX0" fmla="*/ 982597 w 982597"/>
+                <a:gd name="csY0" fmla="*/ 1522 h 703382"/>
+                <a:gd name="csX1" fmla="*/ 982597 w 982597"/>
+                <a:gd name="csY1" fmla="*/ 233559 h 703382"/>
+                <a:gd name="csX2" fmla="*/ 981623 w 982597"/>
+                <a:gd name="csY2" fmla="*/ 233559 h 703382"/>
+                <a:gd name="csX3" fmla="*/ 981319 w 982597"/>
+                <a:gd name="csY3" fmla="*/ 350240 h 703382"/>
+                <a:gd name="csX4" fmla="*/ 813150 w 982597"/>
+                <a:gd name="csY4" fmla="*/ 349802 h 703382"/>
+                <a:gd name="csX5" fmla="*/ 792077 w 982597"/>
+                <a:gd name="csY5" fmla="*/ 406413 h 703382"/>
+                <a:gd name="csX6" fmla="*/ 765074 w 982597"/>
+                <a:gd name="csY6" fmla="*/ 456025 h 703382"/>
+                <a:gd name="csX7" fmla="*/ 765074 w 982597"/>
+                <a:gd name="csY7" fmla="*/ 511982 h 703382"/>
+                <a:gd name="csX8" fmla="*/ 680545 w 982597"/>
+                <a:gd name="csY8" fmla="*/ 511982 h 703382"/>
+                <a:gd name="csX9" fmla="*/ 680545 w 982597"/>
+                <a:gd name="csY9" fmla="*/ 568426 h 703382"/>
+                <a:gd name="csX10" fmla="*/ 594945 w 982597"/>
+                <a:gd name="csY10" fmla="*/ 568426 h 703382"/>
+                <a:gd name="csX11" fmla="*/ 594945 w 982597"/>
+                <a:gd name="csY11" fmla="*/ 602140 h 703382"/>
+                <a:gd name="csX12" fmla="*/ 413178 w 982597"/>
+                <a:gd name="csY12" fmla="*/ 602140 h 703382"/>
+                <a:gd name="csX13" fmla="*/ 413178 w 982597"/>
+                <a:gd name="csY13" fmla="*/ 658889 h 703382"/>
+                <a:gd name="csX14" fmla="*/ 345081 w 982597"/>
+                <a:gd name="csY14" fmla="*/ 658889 h 703382"/>
+                <a:gd name="csX15" fmla="*/ 345081 w 982597"/>
+                <a:gd name="csY15" fmla="*/ 703382 h 703382"/>
+                <a:gd name="csX16" fmla="*/ 218102 w 982597"/>
+                <a:gd name="csY16" fmla="*/ 703382 h 703382"/>
+                <a:gd name="csX17" fmla="*/ 218102 w 982597"/>
+                <a:gd name="csY17" fmla="*/ 623625 h 703382"/>
+                <a:gd name="csX18" fmla="*/ 218171 w 982597"/>
+                <a:gd name="csY18" fmla="*/ 623625 h 703382"/>
+                <a:gd name="csX19" fmla="*/ 218171 w 982597"/>
+                <a:gd name="csY19" fmla="*/ 579132 h 703382"/>
+                <a:gd name="csX20" fmla="*/ 254780 w 982597"/>
+                <a:gd name="csY20" fmla="*/ 579132 h 703382"/>
+                <a:gd name="csX21" fmla="*/ 254779 w 982597"/>
+                <a:gd name="csY21" fmla="*/ 522383 h 703382"/>
+                <a:gd name="csX22" fmla="*/ 323465 w 982597"/>
+                <a:gd name="csY22" fmla="*/ 522383 h 703382"/>
+                <a:gd name="csX23" fmla="*/ 323465 w 982597"/>
+                <a:gd name="csY23" fmla="*/ 488669 h 703382"/>
+                <a:gd name="csX24" fmla="*/ 407994 w 982597"/>
+                <a:gd name="csY24" fmla="*/ 488669 h 703382"/>
+                <a:gd name="csX25" fmla="*/ 407994 w 982597"/>
+                <a:gd name="csY25" fmla="*/ 432225 h 703382"/>
+                <a:gd name="csX26" fmla="*/ 447567 w 982597"/>
+                <a:gd name="csY26" fmla="*/ 432225 h 703382"/>
+                <a:gd name="csX27" fmla="*/ 447567 w 982597"/>
+                <a:gd name="csY27" fmla="*/ 338966 h 703382"/>
+                <a:gd name="csX28" fmla="*/ 373989 w 982597"/>
+                <a:gd name="csY28" fmla="*/ 265002 h 703382"/>
+                <a:gd name="csX29" fmla="*/ 374071 w 982597"/>
+                <a:gd name="csY29" fmla="*/ 233559 h 703382"/>
+                <a:gd name="csX30" fmla="*/ 261388 w 982597"/>
+                <a:gd name="csY30" fmla="*/ 233559 h 703382"/>
+                <a:gd name="csX31" fmla="*/ 150482 w 982597"/>
+                <a:gd name="csY31" fmla="*/ 412824 h 703382"/>
+                <a:gd name="csX32" fmla="*/ 140500 w 982597"/>
+                <a:gd name="csY32" fmla="*/ 633860 h 703382"/>
+                <a:gd name="csX33" fmla="*/ 0 w 982597"/>
+                <a:gd name="csY33" fmla="*/ 630324 h 703382"/>
+                <a:gd name="csX34" fmla="*/ 6018 w 982597"/>
+                <a:gd name="csY34" fmla="*/ 405620 h 703382"/>
+                <a:gd name="csX35" fmla="*/ 126021 w 982597"/>
+                <a:gd name="csY35" fmla="*/ 122470 h 703382"/>
+                <a:gd name="csX36" fmla="*/ 241222 w 982597"/>
+                <a:gd name="csY36" fmla="*/ 12605 h 703382"/>
+                <a:gd name="csX37" fmla="*/ 241222 w 982597"/>
+                <a:gd name="csY37" fmla="*/ 1522 h 703382"/>
+                <a:gd name="csX38" fmla="*/ 250236 w 982597"/>
+                <a:gd name="csY38" fmla="*/ 1522 h 703382"/>
+                <a:gd name="csX39" fmla="*/ 251474 w 982597"/>
+                <a:gd name="csY39" fmla="*/ 0 h 703382"/>
+                <a:gd name="csX40" fmla="*/ 253346 w 982597"/>
+                <a:gd name="csY40" fmla="*/ 1522 h 703382"/>
+                <a:gd name="csX41" fmla="*/ 982597 w 982597"/>
+                <a:gd name="csY41" fmla="*/ 1522 h 703382"/>
+                <a:gd name="csX0" fmla="*/ 982597 w 982597"/>
+                <a:gd name="csY0" fmla="*/ 1522 h 703382"/>
+                <a:gd name="csX1" fmla="*/ 982597 w 982597"/>
+                <a:gd name="csY1" fmla="*/ 233559 h 703382"/>
+                <a:gd name="csX2" fmla="*/ 981623 w 982597"/>
+                <a:gd name="csY2" fmla="*/ 233559 h 703382"/>
+                <a:gd name="csX3" fmla="*/ 981319 w 982597"/>
+                <a:gd name="csY3" fmla="*/ 350240 h 703382"/>
+                <a:gd name="csX4" fmla="*/ 813150 w 982597"/>
+                <a:gd name="csY4" fmla="*/ 349802 h 703382"/>
+                <a:gd name="csX5" fmla="*/ 792077 w 982597"/>
+                <a:gd name="csY5" fmla="*/ 406413 h 703382"/>
+                <a:gd name="csX6" fmla="*/ 765074 w 982597"/>
+                <a:gd name="csY6" fmla="*/ 456025 h 703382"/>
+                <a:gd name="csX7" fmla="*/ 733223 w 982597"/>
+                <a:gd name="csY7" fmla="*/ 483943 h 703382"/>
+                <a:gd name="csX8" fmla="*/ 680545 w 982597"/>
+                <a:gd name="csY8" fmla="*/ 511982 h 703382"/>
+                <a:gd name="csX9" fmla="*/ 680545 w 982597"/>
+                <a:gd name="csY9" fmla="*/ 568426 h 703382"/>
+                <a:gd name="csX10" fmla="*/ 594945 w 982597"/>
+                <a:gd name="csY10" fmla="*/ 568426 h 703382"/>
+                <a:gd name="csX11" fmla="*/ 594945 w 982597"/>
+                <a:gd name="csY11" fmla="*/ 602140 h 703382"/>
+                <a:gd name="csX12" fmla="*/ 413178 w 982597"/>
+                <a:gd name="csY12" fmla="*/ 602140 h 703382"/>
+                <a:gd name="csX13" fmla="*/ 413178 w 982597"/>
+                <a:gd name="csY13" fmla="*/ 658889 h 703382"/>
+                <a:gd name="csX14" fmla="*/ 345081 w 982597"/>
+                <a:gd name="csY14" fmla="*/ 658889 h 703382"/>
+                <a:gd name="csX15" fmla="*/ 345081 w 982597"/>
+                <a:gd name="csY15" fmla="*/ 703382 h 703382"/>
+                <a:gd name="csX16" fmla="*/ 218102 w 982597"/>
+                <a:gd name="csY16" fmla="*/ 703382 h 703382"/>
+                <a:gd name="csX17" fmla="*/ 218102 w 982597"/>
+                <a:gd name="csY17" fmla="*/ 623625 h 703382"/>
+                <a:gd name="csX18" fmla="*/ 218171 w 982597"/>
+                <a:gd name="csY18" fmla="*/ 623625 h 703382"/>
+                <a:gd name="csX19" fmla="*/ 218171 w 982597"/>
+                <a:gd name="csY19" fmla="*/ 579132 h 703382"/>
+                <a:gd name="csX20" fmla="*/ 254780 w 982597"/>
+                <a:gd name="csY20" fmla="*/ 579132 h 703382"/>
+                <a:gd name="csX21" fmla="*/ 254779 w 982597"/>
+                <a:gd name="csY21" fmla="*/ 522383 h 703382"/>
+                <a:gd name="csX22" fmla="*/ 323465 w 982597"/>
+                <a:gd name="csY22" fmla="*/ 522383 h 703382"/>
+                <a:gd name="csX23" fmla="*/ 323465 w 982597"/>
+                <a:gd name="csY23" fmla="*/ 488669 h 703382"/>
+                <a:gd name="csX24" fmla="*/ 407994 w 982597"/>
+                <a:gd name="csY24" fmla="*/ 488669 h 703382"/>
+                <a:gd name="csX25" fmla="*/ 407994 w 982597"/>
+                <a:gd name="csY25" fmla="*/ 432225 h 703382"/>
+                <a:gd name="csX26" fmla="*/ 447567 w 982597"/>
+                <a:gd name="csY26" fmla="*/ 432225 h 703382"/>
+                <a:gd name="csX27" fmla="*/ 447567 w 982597"/>
+                <a:gd name="csY27" fmla="*/ 338966 h 703382"/>
+                <a:gd name="csX28" fmla="*/ 373989 w 982597"/>
+                <a:gd name="csY28" fmla="*/ 265002 h 703382"/>
+                <a:gd name="csX29" fmla="*/ 374071 w 982597"/>
+                <a:gd name="csY29" fmla="*/ 233559 h 703382"/>
+                <a:gd name="csX30" fmla="*/ 261388 w 982597"/>
+                <a:gd name="csY30" fmla="*/ 233559 h 703382"/>
+                <a:gd name="csX31" fmla="*/ 150482 w 982597"/>
+                <a:gd name="csY31" fmla="*/ 412824 h 703382"/>
+                <a:gd name="csX32" fmla="*/ 140500 w 982597"/>
+                <a:gd name="csY32" fmla="*/ 633860 h 703382"/>
+                <a:gd name="csX33" fmla="*/ 0 w 982597"/>
+                <a:gd name="csY33" fmla="*/ 630324 h 703382"/>
+                <a:gd name="csX34" fmla="*/ 6018 w 982597"/>
+                <a:gd name="csY34" fmla="*/ 405620 h 703382"/>
+                <a:gd name="csX35" fmla="*/ 126021 w 982597"/>
+                <a:gd name="csY35" fmla="*/ 122470 h 703382"/>
+                <a:gd name="csX36" fmla="*/ 241222 w 982597"/>
+                <a:gd name="csY36" fmla="*/ 12605 h 703382"/>
+                <a:gd name="csX37" fmla="*/ 241222 w 982597"/>
+                <a:gd name="csY37" fmla="*/ 1522 h 703382"/>
+                <a:gd name="csX38" fmla="*/ 250236 w 982597"/>
+                <a:gd name="csY38" fmla="*/ 1522 h 703382"/>
+                <a:gd name="csX39" fmla="*/ 251474 w 982597"/>
+                <a:gd name="csY39" fmla="*/ 0 h 703382"/>
+                <a:gd name="csX40" fmla="*/ 253346 w 982597"/>
+                <a:gd name="csY40" fmla="*/ 1522 h 703382"/>
+                <a:gd name="csX41" fmla="*/ 982597 w 982597"/>
+                <a:gd name="csY41" fmla="*/ 1522 h 703382"/>
+                <a:gd name="csX0" fmla="*/ 982597 w 982597"/>
+                <a:gd name="csY0" fmla="*/ 1522 h 703382"/>
+                <a:gd name="csX1" fmla="*/ 982597 w 982597"/>
+                <a:gd name="csY1" fmla="*/ 233559 h 703382"/>
+                <a:gd name="csX2" fmla="*/ 981623 w 982597"/>
+                <a:gd name="csY2" fmla="*/ 233559 h 703382"/>
+                <a:gd name="csX3" fmla="*/ 981319 w 982597"/>
+                <a:gd name="csY3" fmla="*/ 350240 h 703382"/>
+                <a:gd name="csX4" fmla="*/ 813150 w 982597"/>
+                <a:gd name="csY4" fmla="*/ 349802 h 703382"/>
+                <a:gd name="csX5" fmla="*/ 792077 w 982597"/>
+                <a:gd name="csY5" fmla="*/ 406413 h 703382"/>
+                <a:gd name="csX6" fmla="*/ 765074 w 982597"/>
+                <a:gd name="csY6" fmla="*/ 456025 h 703382"/>
+                <a:gd name="csX7" fmla="*/ 733223 w 982597"/>
+                <a:gd name="csY7" fmla="*/ 483943 h 703382"/>
+                <a:gd name="csX8" fmla="*/ 680545 w 982597"/>
+                <a:gd name="csY8" fmla="*/ 511982 h 703382"/>
+                <a:gd name="csX9" fmla="*/ 634551 w 982597"/>
+                <a:gd name="csY9" fmla="*/ 556175 h 703382"/>
+                <a:gd name="csX10" fmla="*/ 594945 w 982597"/>
+                <a:gd name="csY10" fmla="*/ 568426 h 703382"/>
+                <a:gd name="csX11" fmla="*/ 594945 w 982597"/>
+                <a:gd name="csY11" fmla="*/ 602140 h 703382"/>
+                <a:gd name="csX12" fmla="*/ 413178 w 982597"/>
+                <a:gd name="csY12" fmla="*/ 602140 h 703382"/>
+                <a:gd name="csX13" fmla="*/ 413178 w 982597"/>
+                <a:gd name="csY13" fmla="*/ 658889 h 703382"/>
+                <a:gd name="csX14" fmla="*/ 345081 w 982597"/>
+                <a:gd name="csY14" fmla="*/ 658889 h 703382"/>
+                <a:gd name="csX15" fmla="*/ 345081 w 982597"/>
+                <a:gd name="csY15" fmla="*/ 703382 h 703382"/>
+                <a:gd name="csX16" fmla="*/ 218102 w 982597"/>
+                <a:gd name="csY16" fmla="*/ 703382 h 703382"/>
+                <a:gd name="csX17" fmla="*/ 218102 w 982597"/>
+                <a:gd name="csY17" fmla="*/ 623625 h 703382"/>
+                <a:gd name="csX18" fmla="*/ 218171 w 982597"/>
+                <a:gd name="csY18" fmla="*/ 623625 h 703382"/>
+                <a:gd name="csX19" fmla="*/ 218171 w 982597"/>
+                <a:gd name="csY19" fmla="*/ 579132 h 703382"/>
+                <a:gd name="csX20" fmla="*/ 254780 w 982597"/>
+                <a:gd name="csY20" fmla="*/ 579132 h 703382"/>
+                <a:gd name="csX21" fmla="*/ 254779 w 982597"/>
+                <a:gd name="csY21" fmla="*/ 522383 h 703382"/>
+                <a:gd name="csX22" fmla="*/ 323465 w 982597"/>
+                <a:gd name="csY22" fmla="*/ 522383 h 703382"/>
+                <a:gd name="csX23" fmla="*/ 323465 w 982597"/>
+                <a:gd name="csY23" fmla="*/ 488669 h 703382"/>
+                <a:gd name="csX24" fmla="*/ 407994 w 982597"/>
+                <a:gd name="csY24" fmla="*/ 488669 h 703382"/>
+                <a:gd name="csX25" fmla="*/ 407994 w 982597"/>
+                <a:gd name="csY25" fmla="*/ 432225 h 703382"/>
+                <a:gd name="csX26" fmla="*/ 447567 w 982597"/>
+                <a:gd name="csY26" fmla="*/ 432225 h 703382"/>
+                <a:gd name="csX27" fmla="*/ 447567 w 982597"/>
+                <a:gd name="csY27" fmla="*/ 338966 h 703382"/>
+                <a:gd name="csX28" fmla="*/ 373989 w 982597"/>
+                <a:gd name="csY28" fmla="*/ 265002 h 703382"/>
+                <a:gd name="csX29" fmla="*/ 374071 w 982597"/>
+                <a:gd name="csY29" fmla="*/ 233559 h 703382"/>
+                <a:gd name="csX30" fmla="*/ 261388 w 982597"/>
+                <a:gd name="csY30" fmla="*/ 233559 h 703382"/>
+                <a:gd name="csX31" fmla="*/ 150482 w 982597"/>
+                <a:gd name="csY31" fmla="*/ 412824 h 703382"/>
+                <a:gd name="csX32" fmla="*/ 140500 w 982597"/>
+                <a:gd name="csY32" fmla="*/ 633860 h 703382"/>
+                <a:gd name="csX33" fmla="*/ 0 w 982597"/>
+                <a:gd name="csY33" fmla="*/ 630324 h 703382"/>
+                <a:gd name="csX34" fmla="*/ 6018 w 982597"/>
+                <a:gd name="csY34" fmla="*/ 405620 h 703382"/>
+                <a:gd name="csX35" fmla="*/ 126021 w 982597"/>
+                <a:gd name="csY35" fmla="*/ 122470 h 703382"/>
+                <a:gd name="csX36" fmla="*/ 241222 w 982597"/>
+                <a:gd name="csY36" fmla="*/ 12605 h 703382"/>
+                <a:gd name="csX37" fmla="*/ 241222 w 982597"/>
+                <a:gd name="csY37" fmla="*/ 1522 h 703382"/>
+                <a:gd name="csX38" fmla="*/ 250236 w 982597"/>
+                <a:gd name="csY38" fmla="*/ 1522 h 703382"/>
+                <a:gd name="csX39" fmla="*/ 251474 w 982597"/>
+                <a:gd name="csY39" fmla="*/ 0 h 703382"/>
+                <a:gd name="csX40" fmla="*/ 253346 w 982597"/>
+                <a:gd name="csY40" fmla="*/ 1522 h 703382"/>
+                <a:gd name="csX41" fmla="*/ 982597 w 982597"/>
+                <a:gd name="csY41" fmla="*/ 1522 h 703382"/>
+                <a:gd name="csX0" fmla="*/ 982597 w 982597"/>
+                <a:gd name="csY0" fmla="*/ 1522 h 703382"/>
+                <a:gd name="csX1" fmla="*/ 982597 w 982597"/>
+                <a:gd name="csY1" fmla="*/ 233559 h 703382"/>
+                <a:gd name="csX2" fmla="*/ 981623 w 982597"/>
+                <a:gd name="csY2" fmla="*/ 233559 h 703382"/>
+                <a:gd name="csX3" fmla="*/ 981319 w 982597"/>
+                <a:gd name="csY3" fmla="*/ 350240 h 703382"/>
+                <a:gd name="csX4" fmla="*/ 813150 w 982597"/>
+                <a:gd name="csY4" fmla="*/ 349802 h 703382"/>
+                <a:gd name="csX5" fmla="*/ 792077 w 982597"/>
+                <a:gd name="csY5" fmla="*/ 406413 h 703382"/>
+                <a:gd name="csX6" fmla="*/ 765074 w 982597"/>
+                <a:gd name="csY6" fmla="*/ 456025 h 703382"/>
+                <a:gd name="csX7" fmla="*/ 733223 w 982597"/>
+                <a:gd name="csY7" fmla="*/ 483943 h 703382"/>
+                <a:gd name="csX8" fmla="*/ 680545 w 982597"/>
+                <a:gd name="csY8" fmla="*/ 511982 h 703382"/>
+                <a:gd name="csX9" fmla="*/ 634551 w 982597"/>
+                <a:gd name="csY9" fmla="*/ 556175 h 703382"/>
+                <a:gd name="csX10" fmla="*/ 594945 w 982597"/>
+                <a:gd name="csY10" fmla="*/ 568426 h 703382"/>
+                <a:gd name="csX11" fmla="*/ 534262 w 982597"/>
+                <a:gd name="csY11" fmla="*/ 571310 h 703382"/>
+                <a:gd name="csX12" fmla="*/ 413178 w 982597"/>
+                <a:gd name="csY12" fmla="*/ 602140 h 703382"/>
+                <a:gd name="csX13" fmla="*/ 413178 w 982597"/>
+                <a:gd name="csY13" fmla="*/ 658889 h 703382"/>
+                <a:gd name="csX14" fmla="*/ 345081 w 982597"/>
+                <a:gd name="csY14" fmla="*/ 658889 h 703382"/>
+                <a:gd name="csX15" fmla="*/ 345081 w 982597"/>
+                <a:gd name="csY15" fmla="*/ 703382 h 703382"/>
+                <a:gd name="csX16" fmla="*/ 218102 w 982597"/>
+                <a:gd name="csY16" fmla="*/ 703382 h 703382"/>
+                <a:gd name="csX17" fmla="*/ 218102 w 982597"/>
+                <a:gd name="csY17" fmla="*/ 623625 h 703382"/>
+                <a:gd name="csX18" fmla="*/ 218171 w 982597"/>
+                <a:gd name="csY18" fmla="*/ 623625 h 703382"/>
+                <a:gd name="csX19" fmla="*/ 218171 w 982597"/>
+                <a:gd name="csY19" fmla="*/ 579132 h 703382"/>
+                <a:gd name="csX20" fmla="*/ 254780 w 982597"/>
+                <a:gd name="csY20" fmla="*/ 579132 h 703382"/>
+                <a:gd name="csX21" fmla="*/ 254779 w 982597"/>
+                <a:gd name="csY21" fmla="*/ 522383 h 703382"/>
+                <a:gd name="csX22" fmla="*/ 323465 w 982597"/>
+                <a:gd name="csY22" fmla="*/ 522383 h 703382"/>
+                <a:gd name="csX23" fmla="*/ 323465 w 982597"/>
+                <a:gd name="csY23" fmla="*/ 488669 h 703382"/>
+                <a:gd name="csX24" fmla="*/ 407994 w 982597"/>
+                <a:gd name="csY24" fmla="*/ 488669 h 703382"/>
+                <a:gd name="csX25" fmla="*/ 407994 w 982597"/>
+                <a:gd name="csY25" fmla="*/ 432225 h 703382"/>
+                <a:gd name="csX26" fmla="*/ 447567 w 982597"/>
+                <a:gd name="csY26" fmla="*/ 432225 h 703382"/>
+                <a:gd name="csX27" fmla="*/ 447567 w 982597"/>
+                <a:gd name="csY27" fmla="*/ 338966 h 703382"/>
+                <a:gd name="csX28" fmla="*/ 373989 w 982597"/>
+                <a:gd name="csY28" fmla="*/ 265002 h 703382"/>
+                <a:gd name="csX29" fmla="*/ 374071 w 982597"/>
+                <a:gd name="csY29" fmla="*/ 233559 h 703382"/>
+                <a:gd name="csX30" fmla="*/ 261388 w 982597"/>
+                <a:gd name="csY30" fmla="*/ 233559 h 703382"/>
+                <a:gd name="csX31" fmla="*/ 150482 w 982597"/>
+                <a:gd name="csY31" fmla="*/ 412824 h 703382"/>
+                <a:gd name="csX32" fmla="*/ 140500 w 982597"/>
+                <a:gd name="csY32" fmla="*/ 633860 h 703382"/>
+                <a:gd name="csX33" fmla="*/ 0 w 982597"/>
+                <a:gd name="csY33" fmla="*/ 630324 h 703382"/>
+                <a:gd name="csX34" fmla="*/ 6018 w 982597"/>
+                <a:gd name="csY34" fmla="*/ 405620 h 703382"/>
+                <a:gd name="csX35" fmla="*/ 126021 w 982597"/>
+                <a:gd name="csY35" fmla="*/ 122470 h 703382"/>
+                <a:gd name="csX36" fmla="*/ 241222 w 982597"/>
+                <a:gd name="csY36" fmla="*/ 12605 h 703382"/>
+                <a:gd name="csX37" fmla="*/ 241222 w 982597"/>
+                <a:gd name="csY37" fmla="*/ 1522 h 703382"/>
+                <a:gd name="csX38" fmla="*/ 250236 w 982597"/>
+                <a:gd name="csY38" fmla="*/ 1522 h 703382"/>
+                <a:gd name="csX39" fmla="*/ 251474 w 982597"/>
+                <a:gd name="csY39" fmla="*/ 0 h 703382"/>
+                <a:gd name="csX40" fmla="*/ 253346 w 982597"/>
+                <a:gd name="csY40" fmla="*/ 1522 h 703382"/>
+                <a:gd name="csX41" fmla="*/ 982597 w 982597"/>
+                <a:gd name="csY41" fmla="*/ 1522 h 703382"/>
+              </a:gdLst>
+              <a:ahLst/>
+              <a:cxnLst>
+                <a:cxn ang="0">
+                  <a:pos x="csX0" y="csY0"/>
+                </a:cxn>
+                <a:cxn ang="0">
+                  <a:pos x="csX1" y="csY1"/>
+                </a:cxn>
+                <a:cxn ang="0">
+                  <a:pos x="csX2" y="csY2"/>
+                </a:cxn>
+                <a:cxn ang="0">
+                  <a:pos x="csX3" y="csY3"/>
+                </a:cxn>
+                <a:cxn ang="0">
+                  <a:pos x="csX4" y="csY4"/>
+                </a:cxn>
+                <a:cxn ang="0">
+                  <a:pos x="csX5" y="csY5"/>
+                </a:cxn>
+                <a:cxn ang="0">
+                  <a:pos x="csX6" y="csY6"/>
+                </a:cxn>
+                <a:cxn ang="0">
+                  <a:pos x="csX7" y="csY7"/>
+                </a:cxn>
+                <a:cxn ang="0">
+                  <a:pos x="csX8" y="csY8"/>
+                </a:cxn>
+                <a:cxn ang="0">
+                  <a:pos x="csX9" y="csY9"/>
+                </a:cxn>
+                <a:cxn ang="0">
+                  <a:pos x="csX10" y="csY10"/>
+                </a:cxn>
+                <a:cxn ang="0">
+                  <a:pos x="csX11" y="csY11"/>
+                </a:cxn>
+                <a:cxn ang="0">
+                  <a:pos x="csX12" y="csY12"/>
+                </a:cxn>
+                <a:cxn ang="0">
+                  <a:pos x="csX13" y="csY13"/>
+                </a:cxn>
+                <a:cxn ang="0">
+                  <a:pos x="csX14" y="csY14"/>
+                </a:cxn>
+                <a:cxn ang="0">
+                  <a:pos x="csX15" y="csY15"/>
+                </a:cxn>
+                <a:cxn ang="0">
+                  <a:pos x="csX16" y="csY16"/>
+                </a:cxn>
+                <a:cxn ang="0">
+                  <a:pos x="csX17" y="csY17"/>
+                </a:cxn>
+                <a:cxn ang="0">
+                  <a:pos x="csX18" y="csY18"/>
+                </a:cxn>
+                <a:cxn ang="0">
+                  <a:pos x="csX19" y="csY19"/>
+                </a:cxn>
+                <a:cxn ang="0">
+                  <a:pos x="csX20" y="csY20"/>
+                </a:cxn>
+                <a:cxn ang="0">
+                  <a:pos x="csX21" y="csY21"/>
+                </a:cxn>
+                <a:cxn ang="0">
+                  <a:pos x="csX22" y="csY22"/>
+                </a:cxn>
+                <a:cxn ang="0">
+                  <a:pos x="csX23" y="csY23"/>
+                </a:cxn>
+                <a:cxn ang="0">
+                  <a:pos x="csX24" y="csY24"/>
+                </a:cxn>
+                <a:cxn ang="0">
+                  <a:pos x="csX25" y="csY25"/>
+                </a:cxn>
+                <a:cxn ang="0">
+                  <a:pos x="csX26" y="csY26"/>
+                </a:cxn>
+                <a:cxn ang="0">
+                  <a:pos x="csX27" y="csY27"/>
+                </a:cxn>
+                <a:cxn ang="0">
+                  <a:pos x="csX28" y="csY28"/>
+                </a:cxn>
+                <a:cxn ang="0">
+                  <a:pos x="csX29" y="csY29"/>
+                </a:cxn>
+                <a:cxn ang="0">
+                  <a:pos x="csX30" y="csY30"/>
+                </a:cxn>
+                <a:cxn ang="0">
+                  <a:pos x="csX31" y="csY31"/>
+                </a:cxn>
+                <a:cxn ang="0">
+                  <a:pos x="csX32" y="csY32"/>
+                </a:cxn>
+                <a:cxn ang="0">
+                  <a:pos x="csX33" y="csY33"/>
+                </a:cxn>
+                <a:cxn ang="0">
+                  <a:pos x="csX34" y="csY34"/>
+                </a:cxn>
+                <a:cxn ang="0">
+                  <a:pos x="csX35" y="csY35"/>
+                </a:cxn>
+                <a:cxn ang="0">
+                  <a:pos x="csX36" y="csY36"/>
+                </a:cxn>
+                <a:cxn ang="0">
+                  <a:pos x="csX37" y="csY37"/>
+                </a:cxn>
+                <a:cxn ang="0">
+                  <a:pos x="csX38" y="csY38"/>
+                </a:cxn>
+                <a:cxn ang="0">
+                  <a:pos x="csX39" y="csY39"/>
+                </a:cxn>
+                <a:cxn ang="0">
+                  <a:pos x="csX40" y="csY40"/>
+                </a:cxn>
+                <a:cxn ang="0">
+                  <a:pos x="csX41" y="csY41"/>
+                </a:cxn>
+              </a:cxnLst>
+              <a:rect l="l" t="t" r="r" b="b"/>
+              <a:pathLst>
+                <a:path w="982597" h="703382">
+                  <a:moveTo>
+                    <a:pt x="982597" y="1522"/>
+                  </a:moveTo>
+                  <a:lnTo>
+                    <a:pt x="982597" y="233559"/>
+                  </a:lnTo>
+                  <a:lnTo>
+                    <a:pt x="981623" y="233559"/>
+                  </a:lnTo>
+                  <a:cubicBezTo>
+                    <a:pt x="981522" y="272453"/>
+                    <a:pt x="981420" y="311346"/>
+                    <a:pt x="981319" y="350240"/>
+                  </a:cubicBezTo>
+                  <a:lnTo>
+                    <a:pt x="813150" y="349802"/>
+                  </a:lnTo>
+                  <a:cubicBezTo>
+                    <a:pt x="813150" y="385210"/>
+                    <a:pt x="792077" y="371005"/>
+                    <a:pt x="792077" y="406413"/>
+                  </a:cubicBezTo>
+                  <a:lnTo>
+                    <a:pt x="765074" y="456025"/>
+                  </a:lnTo>
+                  <a:lnTo>
+                    <a:pt x="733223" y="483943"/>
+                  </a:lnTo>
+                  <a:lnTo>
+                    <a:pt x="680545" y="511982"/>
+                  </a:lnTo>
+                  <a:lnTo>
+                    <a:pt x="634551" y="556175"/>
+                  </a:lnTo>
+                  <a:lnTo>
+                    <a:pt x="594945" y="568426"/>
+                  </a:lnTo>
+                  <a:lnTo>
+                    <a:pt x="534262" y="571310"/>
+                  </a:lnTo>
+                  <a:lnTo>
+                    <a:pt x="413178" y="602140"/>
+                  </a:lnTo>
+                  <a:lnTo>
+                    <a:pt x="413178" y="658889"/>
+                  </a:lnTo>
+                  <a:lnTo>
+                    <a:pt x="345081" y="658889"/>
+                  </a:lnTo>
+                  <a:lnTo>
+                    <a:pt x="345081" y="703382"/>
+                  </a:lnTo>
+                  <a:lnTo>
+                    <a:pt x="218102" y="703382"/>
+                  </a:lnTo>
+                  <a:lnTo>
+                    <a:pt x="218102" y="623625"/>
+                  </a:lnTo>
+                  <a:lnTo>
+                    <a:pt x="218171" y="623625"/>
+                  </a:lnTo>
+                  <a:lnTo>
+                    <a:pt x="218171" y="579132"/>
+                  </a:lnTo>
+                  <a:lnTo>
+                    <a:pt x="254780" y="579132"/>
+                  </a:lnTo>
+                  <a:cubicBezTo>
+                    <a:pt x="254780" y="560216"/>
+                    <a:pt x="254779" y="541299"/>
+                    <a:pt x="254779" y="522383"/>
+                  </a:cubicBezTo>
+                  <a:lnTo>
+                    <a:pt x="323465" y="522383"/>
+                  </a:lnTo>
+                  <a:lnTo>
+                    <a:pt x="323465" y="488669"/>
+                  </a:lnTo>
+                  <a:lnTo>
+                    <a:pt x="407994" y="488669"/>
+                  </a:lnTo>
+                  <a:lnTo>
+                    <a:pt x="407994" y="432225"/>
+                  </a:lnTo>
+                  <a:lnTo>
+                    <a:pt x="447567" y="432225"/>
+                  </a:lnTo>
+                  <a:lnTo>
+                    <a:pt x="447567" y="338966"/>
+                  </a:lnTo>
+                  <a:lnTo>
+                    <a:pt x="373989" y="265002"/>
+                  </a:lnTo>
+                  <a:cubicBezTo>
+                    <a:pt x="374016" y="254521"/>
+                    <a:pt x="374044" y="244040"/>
+                    <a:pt x="374071" y="233559"/>
+                  </a:cubicBezTo>
+                  <a:lnTo>
+                    <a:pt x="261388" y="233559"/>
+                  </a:lnTo>
+                  <a:lnTo>
+                    <a:pt x="150482" y="412824"/>
+                  </a:lnTo>
+                  <a:lnTo>
+                    <a:pt x="140500" y="633860"/>
+                  </a:lnTo>
+                  <a:cubicBezTo>
+                    <a:pt x="93667" y="632681"/>
+                    <a:pt x="78684" y="659542"/>
+                    <a:pt x="0" y="630324"/>
+                  </a:cubicBezTo>
+                  <a:lnTo>
+                    <a:pt x="6018" y="405620"/>
+                  </a:lnTo>
+                  <a:lnTo>
+                    <a:pt x="126021" y="122470"/>
+                  </a:lnTo>
+                  <a:lnTo>
+                    <a:pt x="241222" y="12605"/>
+                  </a:lnTo>
+                  <a:lnTo>
+                    <a:pt x="241222" y="1522"/>
+                  </a:lnTo>
+                  <a:lnTo>
+                    <a:pt x="250236" y="1522"/>
+                  </a:lnTo>
+                  <a:lnTo>
+                    <a:pt x="251474" y="0"/>
+                  </a:lnTo>
+                  <a:lnTo>
+                    <a:pt x="253346" y="1522"/>
+                  </a:lnTo>
+                  <a:lnTo>
+                    <a:pt x="982597" y="1522"/>
+                  </a:lnTo>
+                  <a:close/>
+                </a:path>
+              </a:pathLst>
+            </a:custGeom>
+            <a:solidFill>
+              <a:srgbClr val="7F7F7F"/>
+            </a:solidFill>
+            <a:ln>
+              <a:noFill/>
+            </a:ln>
+          </p:spPr>
+          <p:style>
+            <a:lnRef idx="2">
+              <a:schemeClr val="accent1">
+                <a:shade val="15000"/>
+              </a:schemeClr>
+            </a:lnRef>
+            <a:fillRef idx="1">
+              <a:schemeClr val="accent1"/>
+            </a:fillRef>
+            <a:effectRef idx="0">
+              <a:schemeClr val="accent1"/>
+            </a:effectRef>
+            <a:fontRef idx="minor">
+              <a:schemeClr val="lt1"/>
+            </a:fontRef>
+          </p:style>
+          <p:txBody>
+            <a:bodyPr wrap="square" rtlCol="0" anchor="ctr">
+              <a:noAutofit/>
+            </a:bodyPr>
+            <a:lstStyle/>
+            <a:p>
+              <a:pPr algn="ctr"/>
+              <a:endParaRPr lang="en-GB"/>
+            </a:p>
+          </p:txBody>
+        </p:sp>
+        <p:pic>
+          <p:nvPicPr>
+            <p:cNvPr id="1069" name="Picture 1068" descr="A black background with a black square&#10;&#10;AI-generated content may be incorrect.">
+              <a:extLst>
+                <a:ext uri="{FF2B5EF4-FFF2-40B4-BE49-F238E27FC236}">
+                  <a16:creationId xmlns:a16="http://schemas.microsoft.com/office/drawing/2014/main" id="{FDD6F425-19E6-0288-7485-32D4D646946F}"/>
+                </a:ext>
+              </a:extLst>
+            </p:cNvPr>
+            <p:cNvPicPr>
+              <a:picLocks noChangeAspect="1"/>
+            </p:cNvPicPr>
+            <p:nvPr/>
+          </p:nvPicPr>
+          <p:blipFill>
+            <a:blip r:embed="rId2">
+              <a:extLst>
+                <a:ext uri="{28A0092B-C50C-407E-A947-70E740481C1C}">
+                  <a14:useLocalDpi xmlns:a14="http://schemas.microsoft.com/office/drawing/2010/main" val="0"/>
+                </a:ext>
+              </a:extLst>
+            </a:blip>
+            <a:srcRect l="21551" t="28916"/>
+            <a:stretch>
+              <a:fillRect/>
+            </a:stretch>
+          </p:blipFill>
+          <p:spPr>
+            <a:xfrm rot="16200000" flipH="1">
+              <a:off x="5593338" y="3456936"/>
+              <a:ext cx="996173" cy="902661"/>
+            </a:xfrm>
+            <a:prstGeom prst="rect">
+              <a:avLst/>
+            </a:prstGeom>
+          </p:spPr>
+        </p:pic>
+        <p:pic>
+          <p:nvPicPr>
+            <p:cNvPr id="1070" name="Picture 1069" descr="A black background with a black square&#10;&#10;AI-generated content may be incorrect.">
+              <a:extLst>
+                <a:ext uri="{FF2B5EF4-FFF2-40B4-BE49-F238E27FC236}">
+                  <a16:creationId xmlns:a16="http://schemas.microsoft.com/office/drawing/2014/main" id="{B1F44E3A-7A70-B1D6-C983-45BF54E1C03E}"/>
+                </a:ext>
+              </a:extLst>
+            </p:cNvPr>
+            <p:cNvPicPr>
+              <a:picLocks noChangeAspect="1"/>
+            </p:cNvPicPr>
+            <p:nvPr/>
+          </p:nvPicPr>
+          <p:blipFill>
+            <a:blip r:embed="rId2">
+              <a:extLst>
+                <a:ext uri="{28A0092B-C50C-407E-A947-70E740481C1C}">
+                  <a14:useLocalDpi xmlns:a14="http://schemas.microsoft.com/office/drawing/2010/main" val="0"/>
+                </a:ext>
+              </a:extLst>
+            </a:blip>
+            <a:srcRect l="37467" t="623" r="37145" b="77021"/>
+            <a:stretch>
+              <a:fillRect/>
+            </a:stretch>
+          </p:blipFill>
+          <p:spPr>
+            <a:xfrm rot="15291856" flipH="1">
+              <a:off x="5291104" y="3713459"/>
+              <a:ext cx="303914" cy="270380"/>
+            </a:xfrm>
+            <a:prstGeom prst="rect">
+              <a:avLst/>
+            </a:prstGeom>
+          </p:spPr>
+        </p:pic>
+        <p:pic>
+          <p:nvPicPr>
+            <p:cNvPr id="1071" name="Picture 1070" descr="A black background with a black square&#10;&#10;AI-generated content may be incorrect.">
+              <a:extLst>
+                <a:ext uri="{FF2B5EF4-FFF2-40B4-BE49-F238E27FC236}">
+                  <a16:creationId xmlns:a16="http://schemas.microsoft.com/office/drawing/2014/main" id="{C64B21D4-5A63-97CB-07B2-78D958D3B6DC}"/>
+                </a:ext>
+              </a:extLst>
+            </p:cNvPr>
+            <p:cNvPicPr>
+              <a:picLocks noChangeAspect="1"/>
+            </p:cNvPicPr>
+            <p:nvPr/>
+          </p:nvPicPr>
+          <p:blipFill>
+            <a:blip r:embed="rId2">
+              <a:extLst>
+                <a:ext uri="{28A0092B-C50C-407E-A947-70E740481C1C}">
+                  <a14:useLocalDpi xmlns:a14="http://schemas.microsoft.com/office/drawing/2010/main" val="0"/>
+                </a:ext>
+              </a:extLst>
+            </a:blip>
+            <a:srcRect l="44927" t="23153" r="34824" b="66054"/>
+            <a:stretch>
+              <a:fillRect/>
+            </a:stretch>
+          </p:blipFill>
+          <p:spPr>
+            <a:xfrm rot="14636352" flipH="1">
+              <a:off x="5523772" y="3789857"/>
+              <a:ext cx="222988" cy="148903"/>
+            </a:xfrm>
+            <a:prstGeom prst="rect">
+              <a:avLst/>
+            </a:prstGeom>
+          </p:spPr>
+        </p:pic>
+        <p:pic>
+          <p:nvPicPr>
+            <p:cNvPr id="1072" name="Picture 1071" descr="A black background with a black square&#10;&#10;AI-generated content may be incorrect.">
+              <a:extLst>
+                <a:ext uri="{FF2B5EF4-FFF2-40B4-BE49-F238E27FC236}">
+                  <a16:creationId xmlns:a16="http://schemas.microsoft.com/office/drawing/2014/main" id="{2342CEA1-87B4-E5D7-2D5E-EA771D21B02A}"/>
+                </a:ext>
+              </a:extLst>
+            </p:cNvPr>
+            <p:cNvPicPr>
+              <a:picLocks noChangeAspect="1"/>
+            </p:cNvPicPr>
+            <p:nvPr/>
+          </p:nvPicPr>
+          <p:blipFill>
+            <a:blip r:embed="rId2">
+              <a:extLst>
+                <a:ext uri="{28A0092B-C50C-407E-A947-70E740481C1C}">
+                  <a14:useLocalDpi xmlns:a14="http://schemas.microsoft.com/office/drawing/2010/main" val="0"/>
+                </a:ext>
+              </a:extLst>
+            </a:blip>
+            <a:srcRect l="26387" t="13347" r="57672" b="70348"/>
+            <a:stretch>
+              <a:fillRect/>
+            </a:stretch>
+          </p:blipFill>
+          <p:spPr>
+            <a:xfrm rot="15698569" flipH="1">
+              <a:off x="5417472" y="3499957"/>
+              <a:ext cx="210357" cy="193613"/>
+            </a:xfrm>
+            <a:prstGeom prst="rect">
+              <a:avLst/>
+            </a:prstGeom>
+          </p:spPr>
+        </p:pic>
+        <p:pic>
+          <p:nvPicPr>
+            <p:cNvPr id="1073" name="Picture 1072" descr="A black background with a black square&#10;&#10;AI-generated content may be incorrect.">
+              <a:extLst>
+                <a:ext uri="{FF2B5EF4-FFF2-40B4-BE49-F238E27FC236}">
+                  <a16:creationId xmlns:a16="http://schemas.microsoft.com/office/drawing/2014/main" id="{228DAB39-E97C-0C3A-FC70-1C140ED65066}"/>
+                </a:ext>
+              </a:extLst>
+            </p:cNvPr>
+            <p:cNvPicPr>
+              <a:picLocks noChangeAspect="1"/>
+            </p:cNvPicPr>
+            <p:nvPr/>
+          </p:nvPicPr>
+          <p:blipFill>
+            <a:blip r:embed="rId2">
+              <a:extLst>
+                <a:ext uri="{28A0092B-C50C-407E-A947-70E740481C1C}">
+                  <a14:useLocalDpi xmlns:a14="http://schemas.microsoft.com/office/drawing/2010/main" val="0"/>
+                </a:ext>
+              </a:extLst>
+            </a:blip>
+            <a:srcRect l="68203" b="70596"/>
+            <a:stretch>
+              <a:fillRect/>
+            </a:stretch>
+          </p:blipFill>
+          <p:spPr>
+            <a:xfrm rot="15427643" flipH="1">
+              <a:off x="5371482" y="3978842"/>
+              <a:ext cx="403782" cy="379891"/>
+            </a:xfrm>
+            <a:prstGeom prst="rect">
+              <a:avLst/>
+            </a:prstGeom>
+          </p:spPr>
+        </p:pic>
+        <p:grpSp>
+          <p:nvGrpSpPr>
+            <p:cNvPr id="1074" name="Group 1073">
+              <a:extLst>
+                <a:ext uri="{FF2B5EF4-FFF2-40B4-BE49-F238E27FC236}">
+                  <a16:creationId xmlns:a16="http://schemas.microsoft.com/office/drawing/2014/main" id="{B5874123-345C-409B-6540-C1C1A65DCD57}"/>
+                </a:ext>
+              </a:extLst>
+            </p:cNvPr>
+            <p:cNvGrpSpPr>
+              <a:grpSpLocks/>
+            </p:cNvGrpSpPr>
+            <p:nvPr/>
+          </p:nvGrpSpPr>
+          <p:grpSpPr>
+            <a:xfrm>
+              <a:off x="6209391" y="3296888"/>
+              <a:ext cx="330658" cy="431994"/>
+              <a:chOff x="6340581" y="2572446"/>
+              <a:chExt cx="330658" cy="431994"/>
+            </a:xfrm>
+          </p:grpSpPr>
+          <p:pic>
+            <p:nvPicPr>
+              <p:cNvPr id="1077" name="Picture 1076" descr="A black background with a black square&#10;&#10;AI-generated content may be incorrect.">
+                <a:extLst>
+                  <a:ext uri="{FF2B5EF4-FFF2-40B4-BE49-F238E27FC236}">
+                    <a16:creationId xmlns:a16="http://schemas.microsoft.com/office/drawing/2014/main" id="{EB7D2519-E076-C7F7-CBC4-3730D29A7CB8}"/>
+                  </a:ext>
+                </a:extLst>
+              </p:cNvPr>
+              <p:cNvPicPr>
+                <a:picLocks noChangeAspect="1"/>
+              </p:cNvPicPr>
+              <p:nvPr/>
+            </p:nvPicPr>
+            <p:blipFill>
+              <a:blip r:embed="rId2">
+                <a:extLst>
+                  <a:ext uri="{28A0092B-C50C-407E-A947-70E740481C1C}">
+                    <a14:useLocalDpi xmlns:a14="http://schemas.microsoft.com/office/drawing/2010/main" val="0"/>
+                  </a:ext>
+                </a:extLst>
+              </a:blip>
+              <a:srcRect l="10182" t="73782" r="68815" b="9209"/>
+              <a:stretch/>
+            </p:blipFill>
+            <p:spPr>
+              <a:xfrm rot="10800000" flipV="1">
+                <a:off x="6340581" y="2788443"/>
+                <a:ext cx="266701" cy="215997"/>
+              </a:xfrm>
+              <a:prstGeom prst="rect">
+                <a:avLst/>
+              </a:prstGeom>
+            </p:spPr>
+          </p:pic>
+          <p:pic>
+            <p:nvPicPr>
+              <p:cNvPr id="1078" name="Picture 1077" descr="A black background with a black square&#10;&#10;AI-generated content may be incorrect.">
+                <a:extLst>
+                  <a:ext uri="{FF2B5EF4-FFF2-40B4-BE49-F238E27FC236}">
+                    <a16:creationId xmlns:a16="http://schemas.microsoft.com/office/drawing/2014/main" id="{539B8433-F91E-EEAA-4CDB-3F0C9F76AA81}"/>
+                  </a:ext>
+                </a:extLst>
+              </p:cNvPr>
+              <p:cNvPicPr>
+                <a:picLocks noChangeAspect="1"/>
+              </p:cNvPicPr>
+              <p:nvPr/>
+            </p:nvPicPr>
+            <p:blipFill>
+              <a:blip r:embed="rId2">
+                <a:extLst>
+                  <a:ext uri="{28A0092B-C50C-407E-A947-70E740481C1C}">
+                    <a14:useLocalDpi xmlns:a14="http://schemas.microsoft.com/office/drawing/2010/main" val="0"/>
+                  </a:ext>
+                </a:extLst>
+              </a:blip>
+              <a:srcRect l="10182" t="73782" r="68815" b="9209"/>
+              <a:stretch/>
+            </p:blipFill>
+            <p:spPr>
+              <a:xfrm rot="10800000" flipH="1">
+                <a:off x="6404538" y="2572446"/>
+                <a:ext cx="266701" cy="215997"/>
+              </a:xfrm>
+              <a:prstGeom prst="rect">
+                <a:avLst/>
+              </a:prstGeom>
+            </p:spPr>
+          </p:pic>
+        </p:grpSp>
+        <p:pic>
+          <p:nvPicPr>
+            <p:cNvPr id="1075" name="Picture 1074" descr="A black background with a black square&#10;&#10;AI-generated content may be incorrect.">
+              <a:extLst>
+                <a:ext uri="{FF2B5EF4-FFF2-40B4-BE49-F238E27FC236}">
+                  <a16:creationId xmlns:a16="http://schemas.microsoft.com/office/drawing/2014/main" id="{B7089731-983B-B9CC-2338-D96DE46D5E27}"/>
+                </a:ext>
+              </a:extLst>
+            </p:cNvPr>
+            <p:cNvPicPr>
+              <a:picLocks noChangeAspect="1"/>
+            </p:cNvPicPr>
+            <p:nvPr/>
+          </p:nvPicPr>
+          <p:blipFill>
+            <a:blip r:embed="rId2">
+              <a:extLst>
+                <a:ext uri="{28A0092B-C50C-407E-A947-70E740481C1C}">
+                  <a14:useLocalDpi xmlns:a14="http://schemas.microsoft.com/office/drawing/2010/main" val="0"/>
+                </a:ext>
+              </a:extLst>
+            </a:blip>
+            <a:srcRect l="10200" t="49411" r="76847"/>
+            <a:stretch/>
+          </p:blipFill>
+          <p:spPr>
+            <a:xfrm rot="16200000" flipH="1">
+              <a:off x="6075819" y="3042733"/>
+              <a:ext cx="164481" cy="642408"/>
+            </a:xfrm>
+            <a:prstGeom prst="rect">
+              <a:avLst/>
+            </a:prstGeom>
+          </p:spPr>
+        </p:pic>
+        <p:pic>
+          <p:nvPicPr>
+            <p:cNvPr id="1076" name="Picture 1075" descr="A black background with a black square&#10;&#10;AI-generated content may be incorrect.">
+              <a:extLst>
+                <a:ext uri="{FF2B5EF4-FFF2-40B4-BE49-F238E27FC236}">
+                  <a16:creationId xmlns:a16="http://schemas.microsoft.com/office/drawing/2014/main" id="{5BF2909A-CD6C-4B93-ADEF-BF1FB8DC24A4}"/>
+                </a:ext>
+              </a:extLst>
+            </p:cNvPr>
+            <p:cNvPicPr>
+              <a:picLocks noChangeAspect="1"/>
+            </p:cNvPicPr>
+            <p:nvPr/>
+          </p:nvPicPr>
+          <p:blipFill>
+            <a:blip r:embed="rId2">
+              <a:extLst>
+                <a:ext uri="{28A0092B-C50C-407E-A947-70E740481C1C}">
+                  <a14:useLocalDpi xmlns:a14="http://schemas.microsoft.com/office/drawing/2010/main" val="0"/>
+                </a:ext>
+              </a:extLst>
+            </a:blip>
+            <a:srcRect l="10200" t="78821" r="76847" b="15154"/>
+            <a:stretch>
+              <a:fillRect/>
+            </a:stretch>
+          </p:blipFill>
+          <p:spPr>
+            <a:xfrm rot="16000379" flipV="1">
+              <a:off x="5530073" y="3492287"/>
+              <a:ext cx="177626" cy="74439"/>
+            </a:xfrm>
+            <a:prstGeom prst="rect">
+              <a:avLst/>
+            </a:prstGeom>
+          </p:spPr>
+        </p:pic>
+      </p:grpSp>
+      <p:pic>
+        <p:nvPicPr>
+          <p:cNvPr id="1081" name="Picture 1080">
+            <a:extLst>
+              <a:ext uri="{FF2B5EF4-FFF2-40B4-BE49-F238E27FC236}">
+                <a16:creationId xmlns:a16="http://schemas.microsoft.com/office/drawing/2014/main" id="{4A8F27B4-CE9A-747D-CD51-4D2C1C942199}"/>
+              </a:ext>
+            </a:extLst>
+          </p:cNvPr>
+          <p:cNvPicPr preferRelativeResize="0">
+            <a:picLocks/>
+          </p:cNvPicPr>
+          <p:nvPr/>
+        </p:nvPicPr>
+        <p:blipFill>
+          <a:blip r:embed="rId11">
+            <a:extLst>
+              <a:ext uri="{28A0092B-C50C-407E-A947-70E740481C1C}">
+                <a14:useLocalDpi xmlns:a14="http://schemas.microsoft.com/office/drawing/2010/main" val="0"/>
+              </a:ext>
+            </a:extLst>
+          </a:blip>
+          <a:stretch>
+            <a:fillRect/>
+          </a:stretch>
+        </p:blipFill>
+        <p:spPr>
+          <a:xfrm>
+            <a:off x="4510811" y="5411886"/>
+            <a:ext cx="209550" cy="183600"/>
+          </a:xfrm>
+          <a:prstGeom prst="rect">
+            <a:avLst/>
+          </a:prstGeom>
+        </p:spPr>
+      </p:pic>
+      <p:pic>
+        <p:nvPicPr>
+          <p:cNvPr id="1083" name="Picture 1082">
+            <a:extLst>
+              <a:ext uri="{FF2B5EF4-FFF2-40B4-BE49-F238E27FC236}">
+                <a16:creationId xmlns:a16="http://schemas.microsoft.com/office/drawing/2014/main" id="{ECFBFF66-BE60-5020-17C8-01ADEE29102E}"/>
+              </a:ext>
+            </a:extLst>
+          </p:cNvPr>
+          <p:cNvPicPr preferRelativeResize="0">
+            <a:picLocks/>
+          </p:cNvPicPr>
+          <p:nvPr/>
+        </p:nvPicPr>
+        <p:blipFill>
+          <a:blip r:embed="rId12">
+            <a:extLst>
+              <a:ext uri="{28A0092B-C50C-407E-A947-70E740481C1C}">
+                <a14:useLocalDpi xmlns:a14="http://schemas.microsoft.com/office/drawing/2010/main" val="0"/>
+              </a:ext>
+            </a:extLst>
+          </a:blip>
+          <a:stretch>
+            <a:fillRect/>
+          </a:stretch>
+        </p:blipFill>
+        <p:spPr>
+          <a:xfrm>
+            <a:off x="5851775" y="5411886"/>
+            <a:ext cx="207058" cy="183600"/>
+          </a:xfrm>
+          <a:prstGeom prst="rect">
+            <a:avLst/>
+          </a:prstGeom>
+        </p:spPr>
+      </p:pic>
     </p:spTree>
     <p:extLst>
       <p:ext uri="{BB962C8B-B14F-4D97-AF65-F5344CB8AC3E}">

</xml_diff>